<commit_message>
editted and added images, bib and other things
</commit_message>
<xml_diff>
--- a/Mine.pptx
+++ b/Mine.pptx
@@ -5,10 +5,10 @@
     <p:sldMasterId id="2147483648" r:id="rId1"/>
   </p:sldMasterIdLst>
   <p:notesMasterIdLst>
-    <p:notesMasterId r:id="rId19"/>
+    <p:notesMasterId r:id="rId34"/>
   </p:notesMasterIdLst>
   <p:handoutMasterIdLst>
-    <p:handoutMasterId r:id="rId20"/>
+    <p:handoutMasterId r:id="rId35"/>
   </p:handoutMasterIdLst>
   <p:sldIdLst>
     <p:sldId id="256" r:id="rId2"/>
@@ -21,13 +21,28 @@
     <p:sldId id="265" r:id="rId9"/>
     <p:sldId id="262" r:id="rId10"/>
     <p:sldId id="264" r:id="rId11"/>
-    <p:sldId id="266" r:id="rId12"/>
-    <p:sldId id="267" r:id="rId13"/>
-    <p:sldId id="273" r:id="rId14"/>
-    <p:sldId id="268" r:id="rId15"/>
-    <p:sldId id="270" r:id="rId16"/>
-    <p:sldId id="271" r:id="rId17"/>
-    <p:sldId id="269" r:id="rId18"/>
+    <p:sldId id="274" r:id="rId12"/>
+    <p:sldId id="275" r:id="rId13"/>
+    <p:sldId id="266" r:id="rId14"/>
+    <p:sldId id="276" r:id="rId15"/>
+    <p:sldId id="277" r:id="rId16"/>
+    <p:sldId id="267" r:id="rId17"/>
+    <p:sldId id="273" r:id="rId18"/>
+    <p:sldId id="282" r:id="rId19"/>
+    <p:sldId id="268" r:id="rId20"/>
+    <p:sldId id="279" r:id="rId21"/>
+    <p:sldId id="280" r:id="rId22"/>
+    <p:sldId id="281" r:id="rId23"/>
+    <p:sldId id="278" r:id="rId24"/>
+    <p:sldId id="285" r:id="rId25"/>
+    <p:sldId id="286" r:id="rId26"/>
+    <p:sldId id="287" r:id="rId27"/>
+    <p:sldId id="284" r:id="rId28"/>
+    <p:sldId id="271" r:id="rId29"/>
+    <p:sldId id="269" r:id="rId30"/>
+    <p:sldId id="288" r:id="rId31"/>
+    <p:sldId id="289" r:id="rId32"/>
+    <p:sldId id="290" r:id="rId33"/>
   </p:sldIdLst>
   <p:sldSz cx="9144000" cy="6858000" type="screen4x3"/>
   <p:notesSz cx="6858000" cy="9144000"/>
@@ -211,7 +226,7 @@
           <a:p>
             <a:fld id="{0E046A7C-6936-8840-A9D3-B0E86ECF40BA}" type="datetime1">
               <a:rPr lang="en-CA" smtClean="0"/>
-              <a:t>2016-11-06</a:t>
+              <a:t>2016-11-08</a:t>
             </a:fld>
             <a:endParaRPr lang="en-US"/>
           </a:p>
@@ -377,7 +392,7 @@
           <a:p>
             <a:fld id="{C3C48214-6885-7B48-B3E4-624658EC32B7}" type="datetime1">
               <a:rPr lang="en-CA" smtClean="0"/>
-              <a:t>2016-11-06</a:t>
+              <a:t>2016-11-08</a:t>
             </a:fld>
             <a:endParaRPr lang="en-US"/>
           </a:p>
@@ -795,7 +810,7 @@
           <a:p>
             <a:fld id="{AC8726AC-9E51-A449-A920-FE40D4E34F33}" type="slidenum">
               <a:rPr lang="en-US" smtClean="0"/>
-              <a:t>12</a:t>
+              <a:t>16</a:t>
             </a:fld>
             <a:endParaRPr lang="en-US"/>
           </a:p>
@@ -1006,7 +1021,7 @@
           <a:p>
             <a:fld id="{C8EFDC90-9F2B-6146-BB03-92C9A3451065}" type="datetime1">
               <a:rPr lang="en-CA" smtClean="0"/>
-              <a:t>2016-11-06</a:t>
+              <a:t>2016-11-08</a:t>
             </a:fld>
             <a:endParaRPr lang="en-US" dirty="0"/>
           </a:p>
@@ -1176,7 +1191,7 @@
           <a:p>
             <a:fld id="{FA542368-187A-924A-9888-29DC7A6D3419}" type="datetime1">
               <a:rPr lang="en-CA" smtClean="0"/>
-              <a:t>2016-11-06</a:t>
+              <a:t>2016-11-08</a:t>
             </a:fld>
             <a:endParaRPr lang="en-US"/>
           </a:p>
@@ -1356,7 +1371,7 @@
           <a:p>
             <a:fld id="{C3A49A68-9080-DB47-BA55-E856E12EA426}" type="datetime1">
               <a:rPr lang="en-CA" smtClean="0"/>
-              <a:t>2016-11-06</a:t>
+              <a:t>2016-11-08</a:t>
             </a:fld>
             <a:endParaRPr lang="en-US"/>
           </a:p>
@@ -1544,7 +1559,7 @@
           <a:p>
             <a:fld id="{1BC7FD92-931A-6445-9199-043FF0086614}" type="datetime1">
               <a:rPr lang="en-CA" smtClean="0"/>
-              <a:t>2016-11-06</a:t>
+              <a:t>2016-11-08</a:t>
             </a:fld>
             <a:endParaRPr lang="en-US"/>
           </a:p>
@@ -1811,7 +1826,7 @@
           <a:p>
             <a:fld id="{14CD18FB-2929-0641-B819-0560AFFE664A}" type="datetime1">
               <a:rPr lang="en-CA" smtClean="0"/>
-              <a:t>2016-11-06</a:t>
+              <a:t>2016-11-08</a:t>
             </a:fld>
             <a:endParaRPr lang="en-US"/>
           </a:p>
@@ -2164,7 +2179,7 @@
           <a:p>
             <a:fld id="{743D4868-5203-8348-9D8B-9CB4193D6848}" type="datetime1">
               <a:rPr lang="en-CA" smtClean="0"/>
-              <a:t>2016-11-06</a:t>
+              <a:t>2016-11-08</a:t>
             </a:fld>
             <a:endParaRPr lang="en-US"/>
           </a:p>
@@ -2477,7 +2492,7 @@
           <a:p>
             <a:fld id="{EDCA6A03-39C5-294F-A0D4-4D668BEF0B85}" type="datetime1">
               <a:rPr lang="en-CA" smtClean="0"/>
-              <a:t>2016-11-06</a:t>
+              <a:t>2016-11-08</a:t>
             </a:fld>
             <a:endParaRPr lang="en-US"/>
           </a:p>
@@ -2709,7 +2724,7 @@
           <a:p>
             <a:fld id="{017D5D02-FA38-794C-96CD-0F4AA63956B8}" type="datetime1">
               <a:rPr lang="en-CA" smtClean="0"/>
-              <a:t>2016-11-06</a:t>
+              <a:t>2016-11-08</a:t>
             </a:fld>
             <a:endParaRPr lang="en-US"/>
           </a:p>
@@ -2804,7 +2819,7 @@
           <a:p>
             <a:fld id="{1BF754EE-688F-2048-ACE8-D397EEA3139F}" type="datetime1">
               <a:rPr lang="en-CA" smtClean="0"/>
-              <a:t>2016-11-06</a:t>
+              <a:t>2016-11-08</a:t>
             </a:fld>
             <a:endParaRPr lang="en-US"/>
           </a:p>
@@ -3097,7 +3112,7 @@
           <a:p>
             <a:fld id="{A66D6877-7EDB-9B49-BC75-BA9EEBFF249A}" type="datetime1">
               <a:rPr lang="en-CA" smtClean="0"/>
-              <a:t>2016-11-06</a:t>
+              <a:t>2016-11-08</a:t>
             </a:fld>
             <a:endParaRPr lang="en-US"/>
           </a:p>
@@ -3371,7 +3386,7 @@
           <a:p>
             <a:fld id="{ADFC560E-77D9-424B-8F77-F85BD9379994}" type="datetime1">
               <a:rPr lang="en-CA" smtClean="0"/>
-              <a:t>2016-11-06</a:t>
+              <a:t>2016-11-08</a:t>
             </a:fld>
             <a:endParaRPr lang="en-US"/>
           </a:p>
@@ -3586,7 +3601,7 @@
           <a:p>
             <a:fld id="{F42415CA-4B37-2141-AB10-356D06213458}" type="datetime1">
               <a:rPr lang="en-CA" smtClean="0"/>
-              <a:t>2016-11-06</a:t>
+              <a:t>2016-11-08</a:t>
             </a:fld>
             <a:endParaRPr lang="en-US" dirty="0"/>
           </a:p>
@@ -4489,46 +4504,7 @@
       </p:grpSpPr>
       <p:sp>
         <p:nvSpPr>
-          <p:cNvPr id="3" name="Content Placeholder 2"/>
-          <p:cNvSpPr>
-            <a:spLocks noGrp="1"/>
-          </p:cNvSpPr>
-          <p:nvPr>
-            <p:ph idx="1"/>
-          </p:nvPr>
-        </p:nvSpPr>
-        <p:spPr/>
-        <p:txBody>
-          <a:bodyPr/>
-          <a:lstStyle/>
-          <a:p>
-            <a:r>
-              <a:rPr lang="en-US" dirty="0" smtClean="0"/>
-              <a:t>\</a:t>
-            </a:r>
-            <a:r>
-              <a:rPr lang="en-US" dirty="0" err="1" smtClean="0"/>
-              <a:t>usepackage</a:t>
-            </a:r>
-            <a:r>
-              <a:rPr lang="en-US" dirty="0" smtClean="0"/>
-              <a:t>{</a:t>
-            </a:r>
-            <a:r>
-              <a:rPr lang="en-US" dirty="0" err="1" smtClean="0"/>
-              <a:t>graphicx</a:t>
-            </a:r>
-            <a:r>
-              <a:rPr lang="en-US" dirty="0" smtClean="0"/>
-              <a:t>}</a:t>
-            </a:r>
-            <a:endParaRPr lang="en-US" dirty="0"/>
-          </a:p>
-        </p:txBody>
-      </p:sp>
-      <p:sp>
-        <p:nvSpPr>
-          <p:cNvPr id="4" name="Title 1"/>
+          <p:cNvPr id="2" name="Title 1"/>
           <p:cNvSpPr>
             <a:spLocks noGrp="1"/>
           </p:cNvSpPr>
@@ -4548,7 +4524,7 @@
           <a:p>
             <a:r>
               <a:rPr lang="en-US" dirty="0" smtClean="0"/>
-              <a:t>Images</a:t>
+              <a:t>Nested Lists</a:t>
             </a:r>
             <a:endParaRPr lang="en-US" dirty="0"/>
           </a:p>
@@ -4556,7 +4532,120 @@
       </p:sp>
       <p:sp>
         <p:nvSpPr>
-          <p:cNvPr id="5" name="Slide Number Placeholder 4"/>
+          <p:cNvPr id="3" name="Content Placeholder 2"/>
+          <p:cNvSpPr>
+            <a:spLocks noGrp="1"/>
+          </p:cNvSpPr>
+          <p:nvPr>
+            <p:ph idx="1"/>
+          </p:nvPr>
+        </p:nvSpPr>
+        <p:spPr/>
+        <p:txBody>
+          <a:bodyPr>
+            <a:normAutofit/>
+          </a:bodyPr>
+          <a:lstStyle/>
+          <a:p>
+            <a:pPr marL="0" indent="0">
+              <a:buNone/>
+            </a:pPr>
+            <a:r>
+              <a:rPr lang="en-US" dirty="0" smtClean="0"/>
+              <a:t>\</a:t>
+            </a:r>
+            <a:r>
+              <a:rPr lang="en-US" dirty="0"/>
+              <a:t>begin{enumerate}</a:t>
+            </a:r>
+          </a:p>
+          <a:p>
+            <a:pPr marL="0" indent="0">
+              <a:buNone/>
+            </a:pPr>
+            <a:r>
+              <a:rPr lang="en-US" dirty="0"/>
+              <a:t>    \item point 1</a:t>
+            </a:r>
+          </a:p>
+          <a:p>
+            <a:pPr marL="0" indent="0">
+              <a:buNone/>
+            </a:pPr>
+            <a:r>
+              <a:rPr lang="en-US" dirty="0"/>
+              <a:t>    \begin{enumerate}</a:t>
+            </a:r>
+          </a:p>
+          <a:p>
+            <a:pPr marL="0" indent="0">
+              <a:buNone/>
+            </a:pPr>
+            <a:r>
+              <a:rPr lang="en-US" dirty="0"/>
+              <a:t>	    \item nested point 1</a:t>
+            </a:r>
+          </a:p>
+          <a:p>
+            <a:pPr marL="0" indent="0">
+              <a:buNone/>
+            </a:pPr>
+            <a:r>
+              <a:rPr lang="en-US" dirty="0"/>
+              <a:t>	    \begin{enumerate}</a:t>
+            </a:r>
+          </a:p>
+          <a:p>
+            <a:pPr marL="0" indent="0">
+              <a:buNone/>
+            </a:pPr>
+            <a:r>
+              <a:rPr lang="en-US" dirty="0"/>
+              <a:t>	        \item nested nested point 1</a:t>
+            </a:r>
+          </a:p>
+          <a:p>
+            <a:pPr marL="0" indent="0">
+              <a:buNone/>
+            </a:pPr>
+            <a:r>
+              <a:rPr lang="en-US" dirty="0"/>
+              <a:t>	    \end{enumerate}</a:t>
+            </a:r>
+          </a:p>
+          <a:p>
+            <a:pPr marL="0" indent="0">
+              <a:buNone/>
+            </a:pPr>
+            <a:r>
+              <a:rPr lang="en-US" dirty="0"/>
+              <a:t>    \end{enumerate}</a:t>
+            </a:r>
+          </a:p>
+          <a:p>
+            <a:pPr marL="0" indent="0">
+              <a:buNone/>
+            </a:pPr>
+            <a:r>
+              <a:rPr lang="en-US" dirty="0"/>
+              <a:t>    \item point 2</a:t>
+            </a:r>
+          </a:p>
+          <a:p>
+            <a:pPr marL="0" indent="0">
+              <a:buNone/>
+            </a:pPr>
+            <a:r>
+              <a:rPr lang="en-US" dirty="0"/>
+              <a:t>\end{enumerate}</a:t>
+            </a:r>
+            <a:endParaRPr lang="en-US" dirty="0"/>
+          </a:p>
+        </p:txBody>
+      </p:sp>
+      <p:sp>
+        <p:nvSpPr>
+          <p:cNvPr id="6" name="Slide Number Placeholder 5"/>
           <p:cNvSpPr>
             <a:spLocks noGrp="1"/>
           </p:cNvSpPr>
@@ -4581,13 +4670,20 @@
     </p:spTree>
     <p:extLst>
       <p:ext uri="{BB962C8B-B14F-4D97-AF65-F5344CB8AC3E}">
-        <p14:creationId xmlns:p14="http://schemas.microsoft.com/office/powerpoint/2010/main" val="3471374759"/>
+        <p14:creationId xmlns:p14="http://schemas.microsoft.com/office/powerpoint/2010/main" val="2353989432"/>
       </p:ext>
     </p:extLst>
   </p:cSld>
   <p:clrMapOvr>
     <a:masterClrMapping/>
   </p:clrMapOvr>
+  <p:timing>
+    <p:tnLst>
+      <p:par>
+        <p:cTn xmlns:p14="http://schemas.microsoft.com/office/powerpoint/2010/main" id="1" dur="indefinite" restart="never" nodeType="tmRoot"/>
+      </p:par>
+    </p:tnLst>
+  </p:timing>
 </p:sld>
 </file>
 
@@ -4610,6 +4706,813 @@
       </p:grpSpPr>
       <p:sp>
         <p:nvSpPr>
+          <p:cNvPr id="2" name="Title 1"/>
+          <p:cNvSpPr>
+            <a:spLocks noGrp="1"/>
+          </p:cNvSpPr>
+          <p:nvPr>
+            <p:ph type="title"/>
+          </p:nvPr>
+        </p:nvSpPr>
+        <p:spPr>
+          <a:xfrm>
+            <a:off x="457200" y="84676"/>
+            <a:ext cx="8229600" cy="1007533"/>
+          </a:xfrm>
+        </p:spPr>
+        <p:txBody>
+          <a:bodyPr/>
+          <a:lstStyle/>
+          <a:p>
+            <a:r>
+              <a:rPr lang="en-US" dirty="0" smtClean="0"/>
+              <a:t>Nested Lists</a:t>
+            </a:r>
+            <a:endParaRPr lang="en-US" dirty="0"/>
+          </a:p>
+        </p:txBody>
+      </p:sp>
+      <p:sp>
+        <p:nvSpPr>
+          <p:cNvPr id="3" name="Content Placeholder 2"/>
+          <p:cNvSpPr>
+            <a:spLocks noGrp="1"/>
+          </p:cNvSpPr>
+          <p:nvPr>
+            <p:ph idx="1"/>
+          </p:nvPr>
+        </p:nvSpPr>
+        <p:spPr/>
+        <p:txBody>
+          <a:bodyPr>
+            <a:normAutofit/>
+          </a:bodyPr>
+          <a:lstStyle/>
+          <a:p>
+            <a:pPr marL="0" indent="0">
+              <a:buNone/>
+            </a:pPr>
+            <a:r>
+              <a:rPr lang="en-US" dirty="0" smtClean="0"/>
+              <a:t>\</a:t>
+            </a:r>
+            <a:r>
+              <a:rPr lang="en-US" dirty="0"/>
+              <a:t>begin{enumerate}</a:t>
+            </a:r>
+          </a:p>
+          <a:p>
+            <a:pPr marL="0" indent="0">
+              <a:buNone/>
+            </a:pPr>
+            <a:r>
+              <a:rPr lang="en-US" dirty="0"/>
+              <a:t>    \item point 1</a:t>
+            </a:r>
+          </a:p>
+          <a:p>
+            <a:pPr marL="0" indent="0">
+              <a:buNone/>
+            </a:pPr>
+            <a:r>
+              <a:rPr lang="en-US" dirty="0"/>
+              <a:t>    \begin{enumerate}</a:t>
+            </a:r>
+          </a:p>
+          <a:p>
+            <a:pPr marL="0" indent="0">
+              <a:buNone/>
+            </a:pPr>
+            <a:r>
+              <a:rPr lang="en-US" dirty="0"/>
+              <a:t>	    \item nested point 1</a:t>
+            </a:r>
+          </a:p>
+          <a:p>
+            <a:pPr marL="0" indent="0">
+              <a:buNone/>
+            </a:pPr>
+            <a:r>
+              <a:rPr lang="en-US" dirty="0"/>
+              <a:t>	    \begin{enumerate}</a:t>
+            </a:r>
+          </a:p>
+          <a:p>
+            <a:pPr marL="0" indent="0">
+              <a:buNone/>
+            </a:pPr>
+            <a:r>
+              <a:rPr lang="en-US" dirty="0"/>
+              <a:t>	        \item nested nested point 1</a:t>
+            </a:r>
+          </a:p>
+          <a:p>
+            <a:pPr marL="0" indent="0">
+              <a:buNone/>
+            </a:pPr>
+            <a:r>
+              <a:rPr lang="en-US" dirty="0"/>
+              <a:t>	    \end{enumerate}</a:t>
+            </a:r>
+          </a:p>
+          <a:p>
+            <a:pPr marL="0" indent="0">
+              <a:buNone/>
+            </a:pPr>
+            <a:r>
+              <a:rPr lang="en-US" dirty="0"/>
+              <a:t>    \end{enumerate}</a:t>
+            </a:r>
+          </a:p>
+          <a:p>
+            <a:pPr marL="0" indent="0">
+              <a:buNone/>
+            </a:pPr>
+            <a:r>
+              <a:rPr lang="en-US" dirty="0"/>
+              <a:t>    \item point 2</a:t>
+            </a:r>
+          </a:p>
+          <a:p>
+            <a:pPr marL="0" indent="0">
+              <a:buNone/>
+            </a:pPr>
+            <a:r>
+              <a:rPr lang="en-US" dirty="0"/>
+              <a:t>\end{enumerate}</a:t>
+            </a:r>
+            <a:endParaRPr lang="en-US" dirty="0"/>
+          </a:p>
+        </p:txBody>
+      </p:sp>
+      <p:sp>
+        <p:nvSpPr>
+          <p:cNvPr id="6" name="Slide Number Placeholder 5"/>
+          <p:cNvSpPr>
+            <a:spLocks noGrp="1"/>
+          </p:cNvSpPr>
+          <p:nvPr>
+            <p:ph type="sldNum" sz="quarter" idx="12"/>
+          </p:nvPr>
+        </p:nvSpPr>
+        <p:spPr/>
+        <p:txBody>
+          <a:bodyPr/>
+          <a:lstStyle/>
+          <a:p>
+            <a:fld id="{BA9B540C-44DA-4F69-89C9-7C84606640D3}" type="slidenum">
+              <a:rPr lang="en-US" smtClean="0"/>
+              <a:pPr/>
+              <a:t>11</a:t>
+            </a:fld>
+            <a:endParaRPr lang="en-US"/>
+          </a:p>
+        </p:txBody>
+      </p:sp>
+      <p:pic>
+        <p:nvPicPr>
+          <p:cNvPr id="7" name="Picture 6" descr="Screen Shot 2016-11-08 at 3.06.55 PM.png"/>
+          <p:cNvPicPr>
+            <a:picLocks noChangeAspect="1"/>
+          </p:cNvPicPr>
+          <p:nvPr/>
+        </p:nvPicPr>
+        <p:blipFill>
+          <a:blip r:embed="rId2">
+            <a:extLst>
+              <a:ext uri="{28A0092B-C50C-407E-A947-70E740481C1C}">
+                <a14:useLocalDpi xmlns:a14="http://schemas.microsoft.com/office/drawing/2010/main" val="0"/>
+              </a:ext>
+            </a:extLst>
+          </a:blip>
+          <a:stretch>
+            <a:fillRect/>
+          </a:stretch>
+        </p:blipFill>
+        <p:spPr>
+          <a:xfrm>
+            <a:off x="3696194" y="4809063"/>
+            <a:ext cx="4148172" cy="1921933"/>
+          </a:xfrm>
+          <a:prstGeom prst="rect">
+            <a:avLst/>
+          </a:prstGeom>
+        </p:spPr>
+      </p:pic>
+      <p:sp>
+        <p:nvSpPr>
+          <p:cNvPr id="4" name="Rectangle 3"/>
+          <p:cNvSpPr/>
+          <p:nvPr/>
+        </p:nvSpPr>
+        <p:spPr>
+          <a:xfrm>
+            <a:off x="3657597" y="4809063"/>
+            <a:ext cx="4169836" cy="1970620"/>
+          </a:xfrm>
+          <a:prstGeom prst="rect">
+            <a:avLst/>
+          </a:prstGeom>
+          <a:noFill/>
+        </p:spPr>
+        <p:style>
+          <a:lnRef idx="1">
+            <a:schemeClr val="dk1"/>
+          </a:lnRef>
+          <a:fillRef idx="3">
+            <a:schemeClr val="dk1"/>
+          </a:fillRef>
+          <a:effectRef idx="2">
+            <a:schemeClr val="dk1"/>
+          </a:effectRef>
+          <a:fontRef idx="minor">
+            <a:schemeClr val="lt1"/>
+          </a:fontRef>
+        </p:style>
+        <p:txBody>
+          <a:bodyPr rtlCol="0" anchor="ctr"/>
+          <a:lstStyle/>
+          <a:p>
+            <a:pPr algn="ctr"/>
+            <a:endParaRPr lang="en-US"/>
+          </a:p>
+        </p:txBody>
+      </p:sp>
+    </p:spTree>
+    <p:extLst>
+      <p:ext uri="{BB962C8B-B14F-4D97-AF65-F5344CB8AC3E}">
+        <p14:creationId xmlns:p14="http://schemas.microsoft.com/office/powerpoint/2010/main" val="2241457093"/>
+      </p:ext>
+    </p:extLst>
+  </p:cSld>
+  <p:clrMapOvr>
+    <a:masterClrMapping/>
+  </p:clrMapOvr>
+  <p:timing>
+    <p:tnLst>
+      <p:par>
+        <p:cTn xmlns:p14="http://schemas.microsoft.com/office/powerpoint/2010/main" id="1" dur="indefinite" restart="never" nodeType="tmRoot"/>
+      </p:par>
+    </p:tnLst>
+  </p:timing>
+</p:sld>
+</file>
+
+<file path=ppt/slides/slide13.xml><?xml version="1.0" encoding="utf-8"?>
+<p:sld xmlns:a="http://schemas.openxmlformats.org/drawingml/2006/main" xmlns:r="http://schemas.openxmlformats.org/officeDocument/2006/relationships" xmlns:p="http://schemas.openxmlformats.org/presentationml/2006/main">
+  <p:cSld>
+    <p:spTree>
+      <p:nvGrpSpPr>
+        <p:cNvPr id="1" name=""/>
+        <p:cNvGrpSpPr/>
+        <p:nvPr/>
+      </p:nvGrpSpPr>
+      <p:grpSpPr>
+        <a:xfrm>
+          <a:off x="0" y="0"/>
+          <a:ext cx="0" cy="0"/>
+          <a:chOff x="0" y="0"/>
+          <a:chExt cx="0" cy="0"/>
+        </a:xfrm>
+      </p:grpSpPr>
+      <p:sp>
+        <p:nvSpPr>
+          <p:cNvPr id="3" name="Content Placeholder 2"/>
+          <p:cNvSpPr>
+            <a:spLocks noGrp="1"/>
+          </p:cNvSpPr>
+          <p:nvPr>
+            <p:ph idx="1"/>
+          </p:nvPr>
+        </p:nvSpPr>
+        <p:spPr/>
+        <p:txBody>
+          <a:bodyPr/>
+          <a:lstStyle/>
+          <a:p>
+            <a:r>
+              <a:rPr lang="en-US" dirty="0" smtClean="0"/>
+              <a:t>\</a:t>
+            </a:r>
+            <a:r>
+              <a:rPr lang="en-US" dirty="0" err="1" smtClean="0"/>
+              <a:t>usepackage</a:t>
+            </a:r>
+            <a:r>
+              <a:rPr lang="en-US" dirty="0" smtClean="0"/>
+              <a:t>{</a:t>
+            </a:r>
+            <a:r>
+              <a:rPr lang="en-US" dirty="0" err="1" smtClean="0"/>
+              <a:t>graphicx</a:t>
+            </a:r>
+            <a:r>
+              <a:rPr lang="en-US" dirty="0" smtClean="0"/>
+              <a:t>}</a:t>
+            </a:r>
+          </a:p>
+          <a:p>
+            <a:endParaRPr lang="en-US" dirty="0"/>
+          </a:p>
+          <a:p>
+            <a:endParaRPr lang="en-US" dirty="0" smtClean="0"/>
+          </a:p>
+          <a:p>
+            <a:pPr marL="0" indent="0">
+              <a:buNone/>
+            </a:pPr>
+            <a:r>
+              <a:rPr lang="en-US" dirty="0"/>
+              <a:t>\begin{figure}</a:t>
+            </a:r>
+          </a:p>
+          <a:p>
+            <a:pPr marL="0" indent="0">
+              <a:buNone/>
+            </a:pPr>
+            <a:r>
+              <a:rPr lang="en-US" dirty="0"/>
+              <a:t>	\centering</a:t>
+            </a:r>
+          </a:p>
+          <a:p>
+            <a:pPr marL="0" indent="0">
+              <a:buNone/>
+            </a:pPr>
+            <a:r>
+              <a:rPr lang="en-US" dirty="0"/>
+              <a:t>	\</a:t>
+            </a:r>
+            <a:r>
+              <a:rPr lang="en-US" dirty="0" err="1"/>
+              <a:t>includegraphics</a:t>
+            </a:r>
+            <a:r>
+              <a:rPr lang="en-US" dirty="0"/>
+              <a:t>[scale</a:t>
+            </a:r>
+            <a:r>
+              <a:rPr lang="en-US" dirty="0" smtClean="0"/>
+              <a:t>=size]{filename}</a:t>
+            </a:r>
+            <a:endParaRPr lang="en-US" dirty="0"/>
+          </a:p>
+          <a:p>
+            <a:pPr marL="0" indent="0">
+              <a:buNone/>
+            </a:pPr>
+            <a:r>
+              <a:rPr lang="en-US" dirty="0"/>
+              <a:t>	\caption{}</a:t>
+            </a:r>
+          </a:p>
+          <a:p>
+            <a:pPr marL="0" indent="0">
+              <a:buNone/>
+            </a:pPr>
+            <a:r>
+              <a:rPr lang="en-US" dirty="0"/>
+              <a:t>	\label{</a:t>
+            </a:r>
+            <a:r>
+              <a:rPr lang="en-US" dirty="0" err="1" smtClean="0"/>
+              <a:t>fig:label</a:t>
+            </a:r>
+            <a:r>
+              <a:rPr lang="en-US" dirty="0" smtClean="0"/>
+              <a:t>}</a:t>
+            </a:r>
+            <a:endParaRPr lang="en-US" dirty="0"/>
+          </a:p>
+          <a:p>
+            <a:pPr marL="0" indent="0">
+              <a:buNone/>
+            </a:pPr>
+            <a:r>
+              <a:rPr lang="en-US" dirty="0"/>
+              <a:t>\end{figure}</a:t>
+            </a:r>
+            <a:endParaRPr lang="en-US" dirty="0"/>
+          </a:p>
+        </p:txBody>
+      </p:sp>
+      <p:sp>
+        <p:nvSpPr>
+          <p:cNvPr id="4" name="Title 1"/>
+          <p:cNvSpPr>
+            <a:spLocks noGrp="1"/>
+          </p:cNvSpPr>
+          <p:nvPr>
+            <p:ph type="title"/>
+          </p:nvPr>
+        </p:nvSpPr>
+        <p:spPr>
+          <a:xfrm>
+            <a:off x="457200" y="84676"/>
+            <a:ext cx="8229600" cy="1007533"/>
+          </a:xfrm>
+        </p:spPr>
+        <p:txBody>
+          <a:bodyPr/>
+          <a:lstStyle/>
+          <a:p>
+            <a:r>
+              <a:rPr lang="en-US" dirty="0" smtClean="0"/>
+              <a:t>Images</a:t>
+            </a:r>
+            <a:endParaRPr lang="en-US" dirty="0"/>
+          </a:p>
+        </p:txBody>
+      </p:sp>
+      <p:sp>
+        <p:nvSpPr>
+          <p:cNvPr id="5" name="Slide Number Placeholder 4"/>
+          <p:cNvSpPr>
+            <a:spLocks noGrp="1"/>
+          </p:cNvSpPr>
+          <p:nvPr>
+            <p:ph type="sldNum" sz="quarter" idx="12"/>
+          </p:nvPr>
+        </p:nvSpPr>
+        <p:spPr/>
+        <p:txBody>
+          <a:bodyPr/>
+          <a:lstStyle/>
+          <a:p>
+            <a:fld id="{BA9B540C-44DA-4F69-89C9-7C84606640D3}" type="slidenum">
+              <a:rPr lang="en-US" smtClean="0"/>
+              <a:pPr/>
+              <a:t>12</a:t>
+            </a:fld>
+            <a:endParaRPr lang="en-US"/>
+          </a:p>
+        </p:txBody>
+      </p:sp>
+    </p:spTree>
+    <p:extLst>
+      <p:ext uri="{BB962C8B-B14F-4D97-AF65-F5344CB8AC3E}">
+        <p14:creationId xmlns:p14="http://schemas.microsoft.com/office/powerpoint/2010/main" val="3471374759"/>
+      </p:ext>
+    </p:extLst>
+  </p:cSld>
+  <p:clrMapOvr>
+    <a:masterClrMapping/>
+  </p:clrMapOvr>
+  <p:timing>
+    <p:tnLst>
+      <p:par>
+        <p:cTn xmlns:p14="http://schemas.microsoft.com/office/powerpoint/2010/main" id="1" dur="indefinite" restart="never" nodeType="tmRoot"/>
+      </p:par>
+    </p:tnLst>
+  </p:timing>
+</p:sld>
+</file>
+
+<file path=ppt/slides/slide14.xml><?xml version="1.0" encoding="utf-8"?>
+<p:sld xmlns:a="http://schemas.openxmlformats.org/drawingml/2006/main" xmlns:r="http://schemas.openxmlformats.org/officeDocument/2006/relationships" xmlns:p="http://schemas.openxmlformats.org/presentationml/2006/main">
+  <p:cSld>
+    <p:spTree>
+      <p:nvGrpSpPr>
+        <p:cNvPr id="1" name=""/>
+        <p:cNvGrpSpPr/>
+        <p:nvPr/>
+      </p:nvGrpSpPr>
+      <p:grpSpPr>
+        <a:xfrm>
+          <a:off x="0" y="0"/>
+          <a:ext cx="0" cy="0"/>
+          <a:chOff x="0" y="0"/>
+          <a:chExt cx="0" cy="0"/>
+        </a:xfrm>
+      </p:grpSpPr>
+      <p:sp>
+        <p:nvSpPr>
+          <p:cNvPr id="5" name="Slide Number Placeholder 4"/>
+          <p:cNvSpPr>
+            <a:spLocks noGrp="1"/>
+          </p:cNvSpPr>
+          <p:nvPr>
+            <p:ph type="sldNum" sz="quarter" idx="12"/>
+          </p:nvPr>
+        </p:nvSpPr>
+        <p:spPr/>
+        <p:txBody>
+          <a:bodyPr/>
+          <a:lstStyle/>
+          <a:p>
+            <a:fld id="{BA9B540C-44DA-4F69-89C9-7C84606640D3}" type="slidenum">
+              <a:rPr lang="en-US" smtClean="0"/>
+              <a:pPr/>
+              <a:t>13</a:t>
+            </a:fld>
+            <a:endParaRPr lang="en-US"/>
+          </a:p>
+        </p:txBody>
+      </p:sp>
+      <p:pic>
+        <p:nvPicPr>
+          <p:cNvPr id="2" name="Picture 1" descr="test.jpg"/>
+          <p:cNvPicPr>
+            <a:picLocks noChangeAspect="1"/>
+          </p:cNvPicPr>
+          <p:nvPr/>
+        </p:nvPicPr>
+        <p:blipFill>
+          <a:blip r:embed="rId2">
+            <a:extLst>
+              <a:ext uri="{28A0092B-C50C-407E-A947-70E740481C1C}">
+                <a14:useLocalDpi xmlns:a14="http://schemas.microsoft.com/office/drawing/2010/main" val="0"/>
+              </a:ext>
+            </a:extLst>
+          </a:blip>
+          <a:stretch>
+            <a:fillRect/>
+          </a:stretch>
+        </p:blipFill>
+        <p:spPr>
+          <a:xfrm>
+            <a:off x="2333890" y="243420"/>
+            <a:ext cx="5819509" cy="6112930"/>
+          </a:xfrm>
+          <a:prstGeom prst="rect">
+            <a:avLst/>
+          </a:prstGeom>
+        </p:spPr>
+      </p:pic>
+      <p:sp>
+        <p:nvSpPr>
+          <p:cNvPr id="7" name="Oval Callout 6"/>
+          <p:cNvSpPr/>
+          <p:nvPr/>
+        </p:nvSpPr>
+        <p:spPr>
+          <a:xfrm flipH="1">
+            <a:off x="1879600" y="50810"/>
+            <a:ext cx="2912533" cy="1947333"/>
+          </a:xfrm>
+          <a:prstGeom prst="wedgeEllipseCallout">
+            <a:avLst>
+              <a:gd name="adj1" fmla="val -56298"/>
+              <a:gd name="adj2" fmla="val 49457"/>
+            </a:avLst>
+          </a:prstGeom>
+          <a:noFill/>
+          <a:ln w="28575" cmpd="sng">
+            <a:solidFill>
+              <a:schemeClr val="tx1"/>
+            </a:solidFill>
+          </a:ln>
+        </p:spPr>
+        <p:style>
+          <a:lnRef idx="1">
+            <a:schemeClr val="accent1"/>
+          </a:lnRef>
+          <a:fillRef idx="3">
+            <a:schemeClr val="accent1"/>
+          </a:fillRef>
+          <a:effectRef idx="2">
+            <a:schemeClr val="accent1"/>
+          </a:effectRef>
+          <a:fontRef idx="minor">
+            <a:schemeClr val="lt1"/>
+          </a:fontRef>
+        </p:style>
+        <p:txBody>
+          <a:bodyPr rtlCol="0" anchor="ctr"/>
+          <a:lstStyle/>
+          <a:p>
+            <a:pPr algn="ctr"/>
+            <a:endParaRPr lang="en-US"/>
+          </a:p>
+        </p:txBody>
+      </p:sp>
+      <p:sp>
+        <p:nvSpPr>
+          <p:cNvPr id="8" name="TextBox 7"/>
+          <p:cNvSpPr txBox="1"/>
+          <p:nvPr/>
+        </p:nvSpPr>
+        <p:spPr>
+          <a:xfrm>
+            <a:off x="2506133" y="457194"/>
+            <a:ext cx="1840853" cy="1200329"/>
+          </a:xfrm>
+          <a:prstGeom prst="rect">
+            <a:avLst/>
+          </a:prstGeom>
+          <a:noFill/>
+        </p:spPr>
+        <p:txBody>
+          <a:bodyPr wrap="square" rtlCol="0">
+            <a:spAutoFit/>
+          </a:bodyPr>
+          <a:lstStyle/>
+          <a:p>
+            <a:pPr algn="ctr"/>
+            <a:r>
+              <a:rPr lang="en-US" sz="3600" dirty="0" smtClean="0"/>
+              <a:t>Latex is fun!</a:t>
+            </a:r>
+            <a:endParaRPr lang="en-US" sz="3600" dirty="0"/>
+          </a:p>
+        </p:txBody>
+      </p:sp>
+      <p:pic>
+        <p:nvPicPr>
+          <p:cNvPr id="13" name="Picture 12" descr="Screen Shot 2016-11-08 at 5.10.28 PM.png"/>
+          <p:cNvPicPr>
+            <a:picLocks noChangeAspect="1"/>
+          </p:cNvPicPr>
+          <p:nvPr/>
+        </p:nvPicPr>
+        <p:blipFill>
+          <a:blip r:embed="rId3">
+            <a:extLst>
+              <a:ext uri="{28A0092B-C50C-407E-A947-70E740481C1C}">
+                <a14:useLocalDpi xmlns:a14="http://schemas.microsoft.com/office/drawing/2010/main" val="0"/>
+              </a:ext>
+            </a:extLst>
+          </a:blip>
+          <a:stretch>
+            <a:fillRect/>
+          </a:stretch>
+        </p:blipFill>
+        <p:spPr>
+          <a:xfrm>
+            <a:off x="3649133" y="6362698"/>
+            <a:ext cx="3492500" cy="381000"/>
+          </a:xfrm>
+          <a:prstGeom prst="rect">
+            <a:avLst/>
+          </a:prstGeom>
+        </p:spPr>
+      </p:pic>
+      <p:sp>
+        <p:nvSpPr>
+          <p:cNvPr id="14" name="TextBox 13"/>
+          <p:cNvSpPr txBox="1"/>
+          <p:nvPr/>
+        </p:nvSpPr>
+        <p:spPr>
+          <a:xfrm>
+            <a:off x="-33862" y="6495018"/>
+            <a:ext cx="3081865" cy="369332"/>
+          </a:xfrm>
+          <a:prstGeom prst="rect">
+            <a:avLst/>
+          </a:prstGeom>
+          <a:noFill/>
+        </p:spPr>
+        <p:txBody>
+          <a:bodyPr wrap="square" rtlCol="0">
+            <a:spAutoFit/>
+          </a:bodyPr>
+          <a:lstStyle/>
+          <a:p>
+            <a:pPr algn="ctr"/>
+            <a:r>
+              <a:rPr lang="en-US" dirty="0"/>
+              <a:t>http://</a:t>
+            </a:r>
+            <a:r>
+              <a:rPr lang="en-US" dirty="0" err="1"/>
+              <a:t>www.clipartkid.com</a:t>
+            </a:r>
+            <a:r>
+              <a:rPr lang="en-US" dirty="0"/>
+              <a:t>/</a:t>
+            </a:r>
+          </a:p>
+        </p:txBody>
+      </p:sp>
+    </p:spTree>
+    <p:extLst>
+      <p:ext uri="{BB962C8B-B14F-4D97-AF65-F5344CB8AC3E}">
+        <p14:creationId xmlns:p14="http://schemas.microsoft.com/office/powerpoint/2010/main" val="4111559577"/>
+      </p:ext>
+    </p:extLst>
+  </p:cSld>
+  <p:clrMapOvr>
+    <a:masterClrMapping/>
+  </p:clrMapOvr>
+  <p:timing>
+    <p:tnLst>
+      <p:par>
+        <p:cTn xmlns:p14="http://schemas.microsoft.com/office/powerpoint/2010/main" id="1" dur="indefinite" restart="never" nodeType="tmRoot"/>
+      </p:par>
+    </p:tnLst>
+  </p:timing>
+</p:sld>
+</file>
+
+<file path=ppt/slides/slide15.xml><?xml version="1.0" encoding="utf-8"?>
+<p:sld xmlns:a="http://schemas.openxmlformats.org/drawingml/2006/main" xmlns:r="http://schemas.openxmlformats.org/officeDocument/2006/relationships" xmlns:p="http://schemas.openxmlformats.org/presentationml/2006/main">
+  <p:cSld>
+    <p:spTree>
+      <p:nvGrpSpPr>
+        <p:cNvPr id="1" name=""/>
+        <p:cNvGrpSpPr/>
+        <p:nvPr/>
+      </p:nvGrpSpPr>
+      <p:grpSpPr>
+        <a:xfrm>
+          <a:off x="0" y="0"/>
+          <a:ext cx="0" cy="0"/>
+          <a:chOff x="0" y="0"/>
+          <a:chExt cx="0" cy="0"/>
+        </a:xfrm>
+      </p:grpSpPr>
+      <p:sp>
+        <p:nvSpPr>
+          <p:cNvPr id="4" name="Title 1"/>
+          <p:cNvSpPr>
+            <a:spLocks noGrp="1"/>
+          </p:cNvSpPr>
+          <p:nvPr>
+            <p:ph type="title"/>
+          </p:nvPr>
+        </p:nvSpPr>
+        <p:spPr>
+          <a:xfrm>
+            <a:off x="457200" y="84676"/>
+            <a:ext cx="8229600" cy="1007533"/>
+          </a:xfrm>
+        </p:spPr>
+        <p:txBody>
+          <a:bodyPr/>
+          <a:lstStyle/>
+          <a:p>
+            <a:r>
+              <a:rPr lang="en-US" dirty="0" smtClean="0"/>
+              <a:t>Tables</a:t>
+            </a:r>
+            <a:endParaRPr lang="en-US" dirty="0"/>
+          </a:p>
+        </p:txBody>
+      </p:sp>
+      <p:sp>
+        <p:nvSpPr>
+          <p:cNvPr id="5" name="Slide Number Placeholder 4"/>
+          <p:cNvSpPr>
+            <a:spLocks noGrp="1"/>
+          </p:cNvSpPr>
+          <p:nvPr>
+            <p:ph type="sldNum" sz="quarter" idx="12"/>
+          </p:nvPr>
+        </p:nvSpPr>
+        <p:spPr/>
+        <p:txBody>
+          <a:bodyPr/>
+          <a:lstStyle/>
+          <a:p>
+            <a:fld id="{BA9B540C-44DA-4F69-89C9-7C84606640D3}" type="slidenum">
+              <a:rPr lang="en-US" smtClean="0"/>
+              <a:pPr/>
+              <a:t>14</a:t>
+            </a:fld>
+            <a:endParaRPr lang="en-US"/>
+          </a:p>
+        </p:txBody>
+      </p:sp>
+    </p:spTree>
+    <p:extLst>
+      <p:ext uri="{BB962C8B-B14F-4D97-AF65-F5344CB8AC3E}">
+        <p14:creationId xmlns:p14="http://schemas.microsoft.com/office/powerpoint/2010/main" val="1108457661"/>
+      </p:ext>
+    </p:extLst>
+  </p:cSld>
+  <p:clrMapOvr>
+    <a:masterClrMapping/>
+  </p:clrMapOvr>
+  <p:timing>
+    <p:tnLst>
+      <p:par>
+        <p:cTn xmlns:p14="http://schemas.microsoft.com/office/powerpoint/2010/main" id="1" dur="indefinite" restart="never" nodeType="tmRoot"/>
+      </p:par>
+    </p:tnLst>
+  </p:timing>
+</p:sld>
+</file>
+
+<file path=ppt/slides/slide16.xml><?xml version="1.0" encoding="utf-8"?>
+<p:sld xmlns:a="http://schemas.openxmlformats.org/drawingml/2006/main" xmlns:r="http://schemas.openxmlformats.org/officeDocument/2006/relationships" xmlns:p="http://schemas.openxmlformats.org/presentationml/2006/main">
+  <p:cSld>
+    <p:spTree>
+      <p:nvGrpSpPr>
+        <p:cNvPr id="1" name=""/>
+        <p:cNvGrpSpPr/>
+        <p:nvPr/>
+      </p:nvGrpSpPr>
+      <p:grpSpPr>
+        <a:xfrm>
+          <a:off x="0" y="0"/>
+          <a:ext cx="0" cy="0"/>
+          <a:chOff x="0" y="0"/>
+          <a:chExt cx="0" cy="0"/>
+        </a:xfrm>
+      </p:grpSpPr>
+      <p:sp>
+        <p:nvSpPr>
           <p:cNvPr id="3" name="Content Placeholder 2"/>
           <p:cNvSpPr>
             <a:spLocks noGrp="1"/>
@@ -4869,7 +5772,7 @@
             <a:fld id="{BA9B540C-44DA-4F69-89C9-7C84606640D3}" type="slidenum">
               <a:rPr lang="en-US" smtClean="0"/>
               <a:pPr/>
-              <a:t>11</a:t>
+              <a:t>15</a:t>
             </a:fld>
             <a:endParaRPr lang="en-US"/>
           </a:p>
@@ -4885,10 +5788,17 @@
   <p:clrMapOvr>
     <a:masterClrMapping/>
   </p:clrMapOvr>
+  <p:timing>
+    <p:tnLst>
+      <p:par>
+        <p:cTn xmlns:p14="http://schemas.microsoft.com/office/powerpoint/2010/main" id="1" dur="indefinite" restart="never" nodeType="tmRoot"/>
+      </p:par>
+    </p:tnLst>
+  </p:timing>
 </p:sld>
 </file>
 
-<file path=ppt/slides/slide13.xml><?xml version="1.0" encoding="utf-8"?>
+<file path=ppt/slides/slide17.xml><?xml version="1.0" encoding="utf-8"?>
 <p:sld xmlns:a="http://schemas.openxmlformats.org/drawingml/2006/main" xmlns:r="http://schemas.openxmlformats.org/officeDocument/2006/relationships" xmlns:p="http://schemas.openxmlformats.org/presentationml/2006/main">
   <p:cSld>
     <p:spTree>
@@ -4981,7 +5891,7 @@
             <a:fld id="{BA9B540C-44DA-4F69-89C9-7C84606640D3}" type="slidenum">
               <a:rPr lang="en-US" smtClean="0"/>
               <a:pPr/>
-              <a:t>12</a:t>
+              <a:t>16</a:t>
             </a:fld>
             <a:endParaRPr lang="en-US"/>
           </a:p>
@@ -4997,10 +5907,17 @@
   <p:clrMapOvr>
     <a:masterClrMapping/>
   </p:clrMapOvr>
+  <p:timing>
+    <p:tnLst>
+      <p:par>
+        <p:cTn xmlns:p14="http://schemas.microsoft.com/office/powerpoint/2010/main" id="1" dur="indefinite" restart="never" nodeType="tmRoot"/>
+      </p:par>
+    </p:tnLst>
+  </p:timing>
 </p:sld>
 </file>
 
-<file path=ppt/slides/slide14.xml><?xml version="1.0" encoding="utf-8"?>
+<file path=ppt/slides/slide18.xml><?xml version="1.0" encoding="utf-8"?>
 <p:sld xmlns:a="http://schemas.openxmlformats.org/drawingml/2006/main" xmlns:r="http://schemas.openxmlformats.org/officeDocument/2006/relationships" xmlns:p="http://schemas.openxmlformats.org/presentationml/2006/main">
   <p:cSld>
     <p:spTree>
@@ -5050,19 +5967,11 @@
             </a:r>
             <a:r>
               <a:rPr lang="en-US" dirty="0" smtClean="0"/>
-              <a:t>} for math equations</a:t>
-            </a:r>
-          </a:p>
-          <a:p>
-            <a:pPr marL="0" indent="0">
-              <a:buNone/>
-            </a:pPr>
-            <a:endParaRPr lang="en-US" dirty="0"/>
-          </a:p>
-          <a:p>
-            <a:r>
-              <a:rPr lang="en-US" dirty="0" smtClean="0"/>
-              <a:t>Inline math mode can be inserted using $ math equation here$</a:t>
+              <a:t>} for math </a:t>
+            </a:r>
+            <a:r>
+              <a:rPr lang="en-US" dirty="0" smtClean="0"/>
+              <a:t>equations</a:t>
             </a:r>
           </a:p>
           <a:p>
@@ -5122,7 +6031,7 @@
             <a:fld id="{BA9B540C-44DA-4F69-89C9-7C84606640D3}" type="slidenum">
               <a:rPr lang="en-US" smtClean="0"/>
               <a:pPr/>
-              <a:t>13</a:t>
+              <a:t>17</a:t>
             </a:fld>
             <a:endParaRPr lang="en-US"/>
           </a:p>
@@ -5131,17 +6040,24 @@
     </p:spTree>
     <p:extLst>
       <p:ext uri="{BB962C8B-B14F-4D97-AF65-F5344CB8AC3E}">
-        <p14:creationId xmlns:p14="http://schemas.microsoft.com/office/powerpoint/2010/main" val="1993635300"/>
+        <p14:creationId xmlns:p14="http://schemas.microsoft.com/office/powerpoint/2010/main" val="1470340825"/>
       </p:ext>
     </p:extLst>
   </p:cSld>
   <p:clrMapOvr>
     <a:masterClrMapping/>
   </p:clrMapOvr>
+  <p:timing>
+    <p:tnLst>
+      <p:par>
+        <p:cTn xmlns:p14="http://schemas.microsoft.com/office/powerpoint/2010/main" id="1" dur="indefinite" restart="never" nodeType="tmRoot"/>
+      </p:par>
+    </p:tnLst>
+  </p:timing>
 </p:sld>
 </file>
 
-<file path=ppt/slides/slide15.xml><?xml version="1.0" encoding="utf-8"?>
+<file path=ppt/slides/slide19.xml><?xml version="1.0" encoding="utf-8"?>
 <p:sld xmlns:a="http://schemas.openxmlformats.org/drawingml/2006/main" xmlns:r="http://schemas.openxmlformats.org/officeDocument/2006/relationships" xmlns:p="http://schemas.openxmlformats.org/presentationml/2006/main">
   <p:cSld>
     <p:spTree>
@@ -5174,43 +6090,103 @@
           <a:lstStyle/>
           <a:p>
             <a:r>
-              <a:rPr lang="en-US" dirty="0" smtClean="0"/>
+              <a:rPr lang="en-US" dirty="0"/>
               <a:t>\</a:t>
             </a:r>
             <a:r>
+              <a:rPr lang="en-US" dirty="0" err="1"/>
+              <a:t>usepackage</a:t>
+            </a:r>
+            <a:r>
+              <a:rPr lang="en-US" dirty="0"/>
+              <a:t>{</a:t>
+            </a:r>
+            <a:r>
+              <a:rPr lang="en-US" dirty="0" err="1"/>
+              <a:t>amsmath</a:t>
+            </a:r>
+            <a:r>
+              <a:rPr lang="en-US" dirty="0" smtClean="0"/>
+              <a:t>} for math </a:t>
+            </a:r>
+            <a:r>
+              <a:rPr lang="en-US" dirty="0" smtClean="0"/>
+              <a:t>equations</a:t>
+            </a:r>
+          </a:p>
+          <a:p>
+            <a:endParaRPr lang="en-US" dirty="0" smtClean="0"/>
+          </a:p>
+          <a:p>
+            <a:pPr marL="0" indent="0">
+              <a:buNone/>
+            </a:pPr>
+            <a:r>
+              <a:rPr lang="en-US" b="1" dirty="0">
+                <a:solidFill>
+                  <a:schemeClr val="tx2">
+                    <a:lumMod val="75000"/>
+                  </a:schemeClr>
+                </a:solidFill>
+              </a:rPr>
+              <a:t>Example</a:t>
+            </a:r>
+            <a:r>
+              <a:rPr lang="en-US" b="1" dirty="0" smtClean="0">
+                <a:solidFill>
+                  <a:schemeClr val="tx2">
+                    <a:lumMod val="75000"/>
+                  </a:schemeClr>
+                </a:solidFill>
+              </a:rPr>
+              <a:t>:</a:t>
+            </a:r>
+            <a:endParaRPr lang="en-US" dirty="0"/>
+          </a:p>
+          <a:p>
+            <a:r>
+              <a:rPr lang="en-US" dirty="0" smtClean="0"/>
+              <a:t>\begin{equation}</a:t>
+            </a:r>
+            <a:endParaRPr lang="en-US" dirty="0"/>
+          </a:p>
+          <a:p>
+            <a:pPr marL="0" indent="0">
+              <a:buNone/>
+            </a:pPr>
+            <a:r>
+              <a:rPr lang="en-US" dirty="0" smtClean="0"/>
+              <a:t>	f(x) = \</a:t>
+            </a:r>
+            <a:r>
               <a:rPr lang="en-US" dirty="0" err="1" smtClean="0"/>
-              <a:t>textbf</a:t>
-            </a:r>
-            <a:r>
-              <a:rPr lang="en-US" dirty="0" smtClean="0"/>
-              <a:t>{text} : bold face text</a:t>
-            </a:r>
-          </a:p>
-          <a:p>
+              <a:t>frac</a:t>
+            </a:r>
+            <a:r>
+              <a:rPr lang="en-US" dirty="0" smtClean="0"/>
+              <a:t>{x^2 + 1}{5} \</a:t>
+            </a:r>
+            <a:r>
+              <a:rPr lang="en-US" dirty="0" err="1" smtClean="0"/>
+              <a:t>int</a:t>
+            </a:r>
+            <a:r>
+              <a:rPr lang="en-US" dirty="0" smtClean="0"/>
+              <a:t> x dx</a:t>
+            </a:r>
             <a:endParaRPr lang="en-US" dirty="0"/>
           </a:p>
           <a:p>
             <a:r>
               <a:rPr lang="en-US" dirty="0" smtClean="0"/>
-              <a:t>\</a:t>
-            </a:r>
-            <a:r>
-              <a:rPr lang="en-US" dirty="0" err="1" smtClean="0"/>
-              <a:t>textit</a:t>
-            </a:r>
-            <a:r>
-              <a:rPr lang="en-US" dirty="0" smtClean="0"/>
-              <a:t>{text} : italic text</a:t>
-            </a:r>
-          </a:p>
-          <a:p>
-            <a:endParaRPr lang="en-US" dirty="0"/>
-          </a:p>
-          <a:p>
-            <a:r>
-              <a:rPr lang="en-US" dirty="0" smtClean="0"/>
-              <a:t>\underlined{text} : underlined text</a:t>
-            </a:r>
+              <a:t>\end{equation}</a:t>
+            </a:r>
+            <a:endParaRPr lang="en-US" dirty="0" smtClean="0"/>
+          </a:p>
+          <a:p>
+            <a:pPr marL="0" indent="0">
+              <a:buNone/>
+            </a:pPr>
             <a:endParaRPr lang="en-US" dirty="0"/>
           </a:p>
         </p:txBody>
@@ -5237,7 +6213,7 @@
           <a:p>
             <a:r>
               <a:rPr lang="en-US" dirty="0" smtClean="0"/>
-              <a:t>Bold/ Italic/ underlined</a:t>
+              <a:t>Equations</a:t>
             </a:r>
             <a:endParaRPr lang="en-US" dirty="0"/>
           </a:p>
@@ -5261,7 +6237,7 @@
             <a:fld id="{BA9B540C-44DA-4F69-89C9-7C84606640D3}" type="slidenum">
               <a:rPr lang="en-US" smtClean="0"/>
               <a:pPr/>
-              <a:t>14</a:t>
+              <a:t>18</a:t>
             </a:fld>
             <a:endParaRPr lang="en-US"/>
           </a:p>
@@ -5270,215 +6246,20 @@
     </p:spTree>
     <p:extLst>
       <p:ext uri="{BB962C8B-B14F-4D97-AF65-F5344CB8AC3E}">
-        <p14:creationId xmlns:p14="http://schemas.microsoft.com/office/powerpoint/2010/main" val="4276272822"/>
+        <p14:creationId xmlns:p14="http://schemas.microsoft.com/office/powerpoint/2010/main" val="1993635300"/>
       </p:ext>
     </p:extLst>
   </p:cSld>
   <p:clrMapOvr>
     <a:masterClrMapping/>
   </p:clrMapOvr>
-</p:sld>
-</file>
-
-<file path=ppt/slides/slide16.xml><?xml version="1.0" encoding="utf-8"?>
-<p:sld xmlns:a="http://schemas.openxmlformats.org/drawingml/2006/main" xmlns:r="http://schemas.openxmlformats.org/officeDocument/2006/relationships" xmlns:p="http://schemas.openxmlformats.org/presentationml/2006/main">
-  <p:cSld>
-    <p:spTree>
-      <p:nvGrpSpPr>
-        <p:cNvPr id="1" name=""/>
-        <p:cNvGrpSpPr/>
-        <p:nvPr/>
-      </p:nvGrpSpPr>
-      <p:grpSpPr>
-        <a:xfrm>
-          <a:off x="0" y="0"/>
-          <a:ext cx="0" cy="0"/>
-          <a:chOff x="0" y="0"/>
-          <a:chExt cx="0" cy="0"/>
-        </a:xfrm>
-      </p:grpSpPr>
-      <p:sp>
-        <p:nvSpPr>
-          <p:cNvPr id="3" name="Content Placeholder 2"/>
-          <p:cNvSpPr>
-            <a:spLocks noGrp="1"/>
-          </p:cNvSpPr>
-          <p:nvPr>
-            <p:ph idx="1"/>
-          </p:nvPr>
-        </p:nvSpPr>
-        <p:spPr/>
-        <p:txBody>
-          <a:bodyPr/>
-          <a:lstStyle/>
-          <a:p>
-            <a:endParaRPr lang="en-US"/>
-          </a:p>
-        </p:txBody>
-      </p:sp>
-      <p:sp>
-        <p:nvSpPr>
-          <p:cNvPr id="4" name="Title 1"/>
-          <p:cNvSpPr>
-            <a:spLocks noGrp="1"/>
-          </p:cNvSpPr>
-          <p:nvPr>
-            <p:ph type="title"/>
-          </p:nvPr>
-        </p:nvSpPr>
-        <p:spPr>
-          <a:xfrm>
-            <a:off x="457200" y="84676"/>
-            <a:ext cx="8229600" cy="1007533"/>
-          </a:xfrm>
-        </p:spPr>
-        <p:txBody>
-          <a:bodyPr/>
-          <a:lstStyle/>
-          <a:p>
-            <a:r>
-              <a:rPr lang="en-US" dirty="0" smtClean="0"/>
-              <a:t>Cross-reference</a:t>
-            </a:r>
-            <a:endParaRPr lang="en-US" dirty="0"/>
-          </a:p>
-        </p:txBody>
-      </p:sp>
-      <p:sp>
-        <p:nvSpPr>
-          <p:cNvPr id="5" name="Slide Number Placeholder 4"/>
-          <p:cNvSpPr>
-            <a:spLocks noGrp="1"/>
-          </p:cNvSpPr>
-          <p:nvPr>
-            <p:ph type="sldNum" sz="quarter" idx="12"/>
-          </p:nvPr>
-        </p:nvSpPr>
-        <p:spPr/>
-        <p:txBody>
-          <a:bodyPr/>
-          <a:lstStyle/>
-          <a:p>
-            <a:fld id="{BA9B540C-44DA-4F69-89C9-7C84606640D3}" type="slidenum">
-              <a:rPr lang="en-US" smtClean="0"/>
-              <a:pPr/>
-              <a:t>15</a:t>
-            </a:fld>
-            <a:endParaRPr lang="en-US"/>
-          </a:p>
-        </p:txBody>
-      </p:sp>
-    </p:spTree>
-    <p:extLst>
-      <p:ext uri="{BB962C8B-B14F-4D97-AF65-F5344CB8AC3E}">
-        <p14:creationId xmlns:p14="http://schemas.microsoft.com/office/powerpoint/2010/main" val="939518275"/>
-      </p:ext>
-    </p:extLst>
-  </p:cSld>
-  <p:clrMapOvr>
-    <a:masterClrMapping/>
-  </p:clrMapOvr>
-</p:sld>
-</file>
-
-<file path=ppt/slides/slide17.xml><?xml version="1.0" encoding="utf-8"?>
-<p:sld xmlns:a="http://schemas.openxmlformats.org/drawingml/2006/main" xmlns:r="http://schemas.openxmlformats.org/officeDocument/2006/relationships" xmlns:p="http://schemas.openxmlformats.org/presentationml/2006/main">
-  <p:cSld>
-    <p:spTree>
-      <p:nvGrpSpPr>
-        <p:cNvPr id="1" name=""/>
-        <p:cNvGrpSpPr/>
-        <p:nvPr/>
-      </p:nvGrpSpPr>
-      <p:grpSpPr>
-        <a:xfrm>
-          <a:off x="0" y="0"/>
-          <a:ext cx="0" cy="0"/>
-          <a:chOff x="0" y="0"/>
-          <a:chExt cx="0" cy="0"/>
-        </a:xfrm>
-      </p:grpSpPr>
-      <p:sp>
-        <p:nvSpPr>
-          <p:cNvPr id="3" name="Content Placeholder 2"/>
-          <p:cNvSpPr>
-            <a:spLocks noGrp="1"/>
-          </p:cNvSpPr>
-          <p:nvPr>
-            <p:ph idx="1"/>
-          </p:nvPr>
-        </p:nvSpPr>
-        <p:spPr/>
-        <p:txBody>
-          <a:bodyPr/>
-          <a:lstStyle/>
-          <a:p>
-            <a:endParaRPr lang="en-US"/>
-          </a:p>
-        </p:txBody>
-      </p:sp>
-      <p:sp>
-        <p:nvSpPr>
-          <p:cNvPr id="4" name="Title 1"/>
-          <p:cNvSpPr>
-            <a:spLocks noGrp="1"/>
-          </p:cNvSpPr>
-          <p:nvPr>
-            <p:ph type="title"/>
-          </p:nvPr>
-        </p:nvSpPr>
-        <p:spPr>
-          <a:xfrm>
-            <a:off x="457200" y="84676"/>
-            <a:ext cx="8229600" cy="1007533"/>
-          </a:xfrm>
-        </p:spPr>
-        <p:txBody>
-          <a:bodyPr/>
-          <a:lstStyle/>
-          <a:p>
-            <a:r>
-              <a:rPr lang="en-US" dirty="0" smtClean="0"/>
-              <a:t>Bibliography</a:t>
-            </a:r>
-            <a:endParaRPr lang="en-US" dirty="0"/>
-          </a:p>
-        </p:txBody>
-      </p:sp>
-      <p:sp>
-        <p:nvSpPr>
-          <p:cNvPr id="5" name="Slide Number Placeholder 4"/>
-          <p:cNvSpPr>
-            <a:spLocks noGrp="1"/>
-          </p:cNvSpPr>
-          <p:nvPr>
-            <p:ph type="sldNum" sz="quarter" idx="12"/>
-          </p:nvPr>
-        </p:nvSpPr>
-        <p:spPr/>
-        <p:txBody>
-          <a:bodyPr/>
-          <a:lstStyle/>
-          <a:p>
-            <a:fld id="{BA9B540C-44DA-4F69-89C9-7C84606640D3}" type="slidenum">
-              <a:rPr lang="en-US" smtClean="0"/>
-              <a:pPr/>
-              <a:t>16</a:t>
-            </a:fld>
-            <a:endParaRPr lang="en-US"/>
-          </a:p>
-        </p:txBody>
-      </p:sp>
-    </p:spTree>
-    <p:extLst>
-      <p:ext uri="{BB962C8B-B14F-4D97-AF65-F5344CB8AC3E}">
-        <p14:creationId xmlns:p14="http://schemas.microsoft.com/office/powerpoint/2010/main" val="270318045"/>
-      </p:ext>
-    </p:extLst>
-  </p:cSld>
-  <p:clrMapOvr>
-    <a:masterClrMapping/>
-  </p:clrMapOvr>
+  <p:timing>
+    <p:tnLst>
+      <p:par>
+        <p:cTn xmlns:p14="http://schemas.microsoft.com/office/powerpoint/2010/main" id="1" dur="indefinite" restart="never" nodeType="tmRoot"/>
+      </p:par>
+    </p:tnLst>
+  </p:timing>
 </p:sld>
 </file>
 
@@ -5716,6 +6497,1784 @@
   <p:clrMapOvr>
     <a:masterClrMapping/>
   </p:clrMapOvr>
+  <p:timing>
+    <p:tnLst>
+      <p:par>
+        <p:cTn xmlns:p14="http://schemas.microsoft.com/office/powerpoint/2010/main" id="1" dur="indefinite" restart="never" nodeType="tmRoot"/>
+      </p:par>
+    </p:tnLst>
+  </p:timing>
+</p:sld>
+</file>
+
+<file path=ppt/slides/slide20.xml><?xml version="1.0" encoding="utf-8"?>
+<p:sld xmlns:a="http://schemas.openxmlformats.org/drawingml/2006/main" xmlns:r="http://schemas.openxmlformats.org/officeDocument/2006/relationships" xmlns:p="http://schemas.openxmlformats.org/presentationml/2006/main">
+  <p:cSld>
+    <p:spTree>
+      <p:nvGrpSpPr>
+        <p:cNvPr id="1" name=""/>
+        <p:cNvGrpSpPr/>
+        <p:nvPr/>
+      </p:nvGrpSpPr>
+      <p:grpSpPr>
+        <a:xfrm>
+          <a:off x="0" y="0"/>
+          <a:ext cx="0" cy="0"/>
+          <a:chOff x="0" y="0"/>
+          <a:chExt cx="0" cy="0"/>
+        </a:xfrm>
+      </p:grpSpPr>
+      <p:sp>
+        <p:nvSpPr>
+          <p:cNvPr id="3" name="Content Placeholder 2"/>
+          <p:cNvSpPr>
+            <a:spLocks noGrp="1"/>
+          </p:cNvSpPr>
+          <p:nvPr>
+            <p:ph idx="1"/>
+          </p:nvPr>
+        </p:nvSpPr>
+        <p:spPr/>
+        <p:txBody>
+          <a:bodyPr/>
+          <a:lstStyle/>
+          <a:p>
+            <a:r>
+              <a:rPr lang="en-US" dirty="0"/>
+              <a:t>\</a:t>
+            </a:r>
+            <a:r>
+              <a:rPr lang="en-US" dirty="0" err="1"/>
+              <a:t>usepackage</a:t>
+            </a:r>
+            <a:r>
+              <a:rPr lang="en-US" dirty="0"/>
+              <a:t>{</a:t>
+            </a:r>
+            <a:r>
+              <a:rPr lang="en-US" dirty="0" err="1"/>
+              <a:t>amsmath</a:t>
+            </a:r>
+            <a:r>
+              <a:rPr lang="en-US" dirty="0" smtClean="0"/>
+              <a:t>} for math </a:t>
+            </a:r>
+            <a:r>
+              <a:rPr lang="en-US" dirty="0" smtClean="0"/>
+              <a:t>equations</a:t>
+            </a:r>
+          </a:p>
+          <a:p>
+            <a:endParaRPr lang="en-US" dirty="0" smtClean="0"/>
+          </a:p>
+          <a:p>
+            <a:pPr marL="0" indent="0">
+              <a:buNone/>
+            </a:pPr>
+            <a:r>
+              <a:rPr lang="en-US" b="1" dirty="0">
+                <a:solidFill>
+                  <a:schemeClr val="tx2">
+                    <a:lumMod val="75000"/>
+                  </a:schemeClr>
+                </a:solidFill>
+              </a:rPr>
+              <a:t>Example</a:t>
+            </a:r>
+            <a:r>
+              <a:rPr lang="en-US" b="1" dirty="0" smtClean="0">
+                <a:solidFill>
+                  <a:schemeClr val="tx2">
+                    <a:lumMod val="75000"/>
+                  </a:schemeClr>
+                </a:solidFill>
+              </a:rPr>
+              <a:t>:</a:t>
+            </a:r>
+            <a:endParaRPr lang="en-US" dirty="0"/>
+          </a:p>
+          <a:p>
+            <a:r>
+              <a:rPr lang="en-US" dirty="0" smtClean="0"/>
+              <a:t>\begin{equation}</a:t>
+            </a:r>
+            <a:endParaRPr lang="en-US" dirty="0"/>
+          </a:p>
+          <a:p>
+            <a:pPr marL="0" indent="0">
+              <a:buNone/>
+            </a:pPr>
+            <a:r>
+              <a:rPr lang="en-US" dirty="0" smtClean="0"/>
+              <a:t>	f(x) = \</a:t>
+            </a:r>
+            <a:r>
+              <a:rPr lang="en-US" dirty="0" err="1" smtClean="0"/>
+              <a:t>frac</a:t>
+            </a:r>
+            <a:r>
+              <a:rPr lang="en-US" dirty="0" smtClean="0"/>
+              <a:t>{x^2 + 1}{5} \</a:t>
+            </a:r>
+            <a:r>
+              <a:rPr lang="en-US" dirty="0" err="1" smtClean="0"/>
+              <a:t>int</a:t>
+            </a:r>
+            <a:r>
+              <a:rPr lang="en-US" dirty="0" smtClean="0"/>
+              <a:t> x dx</a:t>
+            </a:r>
+            <a:endParaRPr lang="en-US" dirty="0"/>
+          </a:p>
+          <a:p>
+            <a:r>
+              <a:rPr lang="en-US" dirty="0" smtClean="0"/>
+              <a:t>\end{equation}</a:t>
+            </a:r>
+            <a:endParaRPr lang="en-US" dirty="0" smtClean="0"/>
+          </a:p>
+          <a:p>
+            <a:pPr marL="0" indent="0">
+              <a:buNone/>
+            </a:pPr>
+            <a:endParaRPr lang="en-US" dirty="0"/>
+          </a:p>
+        </p:txBody>
+      </p:sp>
+      <p:sp>
+        <p:nvSpPr>
+          <p:cNvPr id="4" name="Title 1"/>
+          <p:cNvSpPr>
+            <a:spLocks noGrp="1"/>
+          </p:cNvSpPr>
+          <p:nvPr>
+            <p:ph type="title"/>
+          </p:nvPr>
+        </p:nvSpPr>
+        <p:spPr>
+          <a:xfrm>
+            <a:off x="457200" y="84676"/>
+            <a:ext cx="8229600" cy="1007533"/>
+          </a:xfrm>
+        </p:spPr>
+        <p:txBody>
+          <a:bodyPr/>
+          <a:lstStyle/>
+          <a:p>
+            <a:r>
+              <a:rPr lang="en-US" dirty="0" smtClean="0"/>
+              <a:t>Equations</a:t>
+            </a:r>
+            <a:endParaRPr lang="en-US" dirty="0"/>
+          </a:p>
+        </p:txBody>
+      </p:sp>
+      <p:sp>
+        <p:nvSpPr>
+          <p:cNvPr id="5" name="Slide Number Placeholder 4"/>
+          <p:cNvSpPr>
+            <a:spLocks noGrp="1"/>
+          </p:cNvSpPr>
+          <p:nvPr>
+            <p:ph type="sldNum" sz="quarter" idx="12"/>
+          </p:nvPr>
+        </p:nvSpPr>
+        <p:spPr/>
+        <p:txBody>
+          <a:bodyPr/>
+          <a:lstStyle/>
+          <a:p>
+            <a:fld id="{BA9B540C-44DA-4F69-89C9-7C84606640D3}" type="slidenum">
+              <a:rPr lang="en-US" smtClean="0"/>
+              <a:pPr/>
+              <a:t>19</a:t>
+            </a:fld>
+            <a:endParaRPr lang="en-US"/>
+          </a:p>
+        </p:txBody>
+      </p:sp>
+      <p:pic>
+        <p:nvPicPr>
+          <p:cNvPr id="2" name="Picture 1" descr="Screen Shot 2016-11-08 at 5.17.57 PM.png"/>
+          <p:cNvPicPr>
+            <a:picLocks noChangeAspect="1"/>
+          </p:cNvPicPr>
+          <p:nvPr/>
+        </p:nvPicPr>
+        <p:blipFill rotWithShape="1">
+          <a:blip r:embed="rId2">
+            <a:extLst>
+              <a:ext uri="{28A0092B-C50C-407E-A947-70E740481C1C}">
+                <a14:useLocalDpi xmlns:a14="http://schemas.microsoft.com/office/drawing/2010/main" val="0"/>
+              </a:ext>
+            </a:extLst>
+          </a:blip>
+          <a:srcRect r="55602"/>
+          <a:stretch/>
+        </p:blipFill>
+        <p:spPr>
+          <a:xfrm>
+            <a:off x="2302934" y="4526403"/>
+            <a:ext cx="4064000" cy="1599760"/>
+          </a:xfrm>
+          <a:prstGeom prst="rect">
+            <a:avLst/>
+          </a:prstGeom>
+        </p:spPr>
+      </p:pic>
+    </p:spTree>
+    <p:extLst>
+      <p:ext uri="{BB962C8B-B14F-4D97-AF65-F5344CB8AC3E}">
+        <p14:creationId xmlns:p14="http://schemas.microsoft.com/office/powerpoint/2010/main" val="1610396644"/>
+      </p:ext>
+    </p:extLst>
+  </p:cSld>
+  <p:clrMapOvr>
+    <a:masterClrMapping/>
+  </p:clrMapOvr>
+  <p:timing>
+    <p:tnLst>
+      <p:par>
+        <p:cTn xmlns:p14="http://schemas.microsoft.com/office/powerpoint/2010/main" id="1" dur="indefinite" restart="never" nodeType="tmRoot"/>
+      </p:par>
+    </p:tnLst>
+  </p:timing>
+</p:sld>
+</file>
+
+<file path=ppt/slides/slide21.xml><?xml version="1.0" encoding="utf-8"?>
+<p:sld xmlns:a="http://schemas.openxmlformats.org/drawingml/2006/main" xmlns:r="http://schemas.openxmlformats.org/officeDocument/2006/relationships" xmlns:p="http://schemas.openxmlformats.org/presentationml/2006/main">
+  <p:cSld>
+    <p:spTree>
+      <p:nvGrpSpPr>
+        <p:cNvPr id="1" name=""/>
+        <p:cNvGrpSpPr/>
+        <p:nvPr/>
+      </p:nvGrpSpPr>
+      <p:grpSpPr>
+        <a:xfrm>
+          <a:off x="0" y="0"/>
+          <a:ext cx="0" cy="0"/>
+          <a:chOff x="0" y="0"/>
+          <a:chExt cx="0" cy="0"/>
+        </a:xfrm>
+      </p:grpSpPr>
+      <p:sp>
+        <p:nvSpPr>
+          <p:cNvPr id="3" name="Content Placeholder 2"/>
+          <p:cNvSpPr>
+            <a:spLocks noGrp="1"/>
+          </p:cNvSpPr>
+          <p:nvPr>
+            <p:ph idx="1"/>
+          </p:nvPr>
+        </p:nvSpPr>
+        <p:spPr/>
+        <p:txBody>
+          <a:bodyPr/>
+          <a:lstStyle/>
+          <a:p>
+            <a:r>
+              <a:rPr lang="en-US" dirty="0" smtClean="0"/>
+              <a:t>Inline </a:t>
+            </a:r>
+            <a:r>
+              <a:rPr lang="en-US" dirty="0" smtClean="0"/>
+              <a:t>math mode can be inserted using $ math equation here</a:t>
+            </a:r>
+            <a:r>
+              <a:rPr lang="en-US" dirty="0" smtClean="0"/>
+              <a:t>$</a:t>
+            </a:r>
+          </a:p>
+          <a:p>
+            <a:pPr marL="0" indent="0">
+              <a:buNone/>
+            </a:pPr>
+            <a:endParaRPr lang="en-US" dirty="0" smtClean="0"/>
+          </a:p>
+        </p:txBody>
+      </p:sp>
+      <p:sp>
+        <p:nvSpPr>
+          <p:cNvPr id="4" name="Title 1"/>
+          <p:cNvSpPr>
+            <a:spLocks noGrp="1"/>
+          </p:cNvSpPr>
+          <p:nvPr>
+            <p:ph type="title"/>
+          </p:nvPr>
+        </p:nvSpPr>
+        <p:spPr>
+          <a:xfrm>
+            <a:off x="457200" y="84676"/>
+            <a:ext cx="8229600" cy="1007533"/>
+          </a:xfrm>
+        </p:spPr>
+        <p:txBody>
+          <a:bodyPr/>
+          <a:lstStyle/>
+          <a:p>
+            <a:r>
+              <a:rPr lang="en-US" dirty="0" smtClean="0"/>
+              <a:t>Equations</a:t>
+            </a:r>
+            <a:endParaRPr lang="en-US" dirty="0"/>
+          </a:p>
+        </p:txBody>
+      </p:sp>
+      <p:sp>
+        <p:nvSpPr>
+          <p:cNvPr id="5" name="Slide Number Placeholder 4"/>
+          <p:cNvSpPr>
+            <a:spLocks noGrp="1"/>
+          </p:cNvSpPr>
+          <p:nvPr>
+            <p:ph type="sldNum" sz="quarter" idx="12"/>
+          </p:nvPr>
+        </p:nvSpPr>
+        <p:spPr/>
+        <p:txBody>
+          <a:bodyPr/>
+          <a:lstStyle/>
+          <a:p>
+            <a:fld id="{BA9B540C-44DA-4F69-89C9-7C84606640D3}" type="slidenum">
+              <a:rPr lang="en-US" smtClean="0"/>
+              <a:pPr/>
+              <a:t>20</a:t>
+            </a:fld>
+            <a:endParaRPr lang="en-US"/>
+          </a:p>
+        </p:txBody>
+      </p:sp>
+    </p:spTree>
+    <p:extLst>
+      <p:ext uri="{BB962C8B-B14F-4D97-AF65-F5344CB8AC3E}">
+        <p14:creationId xmlns:p14="http://schemas.microsoft.com/office/powerpoint/2010/main" val="956291851"/>
+      </p:ext>
+    </p:extLst>
+  </p:cSld>
+  <p:clrMapOvr>
+    <a:masterClrMapping/>
+  </p:clrMapOvr>
+  <p:timing>
+    <p:tnLst>
+      <p:par>
+        <p:cTn xmlns:p14="http://schemas.microsoft.com/office/powerpoint/2010/main" id="1" dur="indefinite" restart="never" nodeType="tmRoot"/>
+      </p:par>
+    </p:tnLst>
+  </p:timing>
+</p:sld>
+</file>
+
+<file path=ppt/slides/slide22.xml><?xml version="1.0" encoding="utf-8"?>
+<p:sld xmlns:a="http://schemas.openxmlformats.org/drawingml/2006/main" xmlns:r="http://schemas.openxmlformats.org/officeDocument/2006/relationships" xmlns:p="http://schemas.openxmlformats.org/presentationml/2006/main">
+  <p:cSld>
+    <p:spTree>
+      <p:nvGrpSpPr>
+        <p:cNvPr id="1" name=""/>
+        <p:cNvGrpSpPr/>
+        <p:nvPr/>
+      </p:nvGrpSpPr>
+      <p:grpSpPr>
+        <a:xfrm>
+          <a:off x="0" y="0"/>
+          <a:ext cx="0" cy="0"/>
+          <a:chOff x="0" y="0"/>
+          <a:chExt cx="0" cy="0"/>
+        </a:xfrm>
+      </p:grpSpPr>
+      <p:sp>
+        <p:nvSpPr>
+          <p:cNvPr id="3" name="Content Placeholder 2"/>
+          <p:cNvSpPr>
+            <a:spLocks noGrp="1"/>
+          </p:cNvSpPr>
+          <p:nvPr>
+            <p:ph idx="1"/>
+          </p:nvPr>
+        </p:nvSpPr>
+        <p:spPr/>
+        <p:txBody>
+          <a:bodyPr/>
+          <a:lstStyle/>
+          <a:p>
+            <a:r>
+              <a:rPr lang="en-US" dirty="0" smtClean="0"/>
+              <a:t>Inline </a:t>
+            </a:r>
+            <a:r>
+              <a:rPr lang="en-US" dirty="0" smtClean="0"/>
+              <a:t>math mode can be inserted using $ math equation here</a:t>
+            </a:r>
+            <a:r>
+              <a:rPr lang="en-US" dirty="0" smtClean="0"/>
+              <a:t>$</a:t>
+            </a:r>
+          </a:p>
+          <a:p>
+            <a:pPr marL="0" indent="0">
+              <a:buNone/>
+            </a:pPr>
+            <a:endParaRPr lang="en-US" dirty="0" smtClean="0"/>
+          </a:p>
+          <a:p>
+            <a:pPr marL="0" indent="0">
+              <a:buNone/>
+            </a:pPr>
+            <a:r>
+              <a:rPr lang="en-US" b="1" dirty="0" smtClean="0">
+                <a:solidFill>
+                  <a:schemeClr val="tx2">
+                    <a:lumMod val="75000"/>
+                  </a:schemeClr>
+                </a:solidFill>
+              </a:rPr>
+              <a:t>Example:</a:t>
+            </a:r>
+            <a:endParaRPr lang="en-US" b="1" dirty="0">
+              <a:solidFill>
+                <a:schemeClr val="tx2">
+                  <a:lumMod val="75000"/>
+                </a:schemeClr>
+              </a:solidFill>
+            </a:endParaRPr>
+          </a:p>
+          <a:p>
+            <a:pPr marL="0" indent="0">
+              <a:buNone/>
+            </a:pPr>
+            <a:r>
+              <a:rPr lang="en-US" dirty="0"/>
+              <a:t>We can use inline math such as $f(x) = 2x^3 + 5x$ in </a:t>
+            </a:r>
+            <a:r>
+              <a:rPr lang="en-US" dirty="0" smtClean="0"/>
+              <a:t>between </a:t>
+            </a:r>
+            <a:r>
+              <a:rPr lang="en-US" dirty="0"/>
+              <a:t>text.</a:t>
+            </a:r>
+            <a:endParaRPr lang="en-US" dirty="0" smtClean="0"/>
+          </a:p>
+          <a:p>
+            <a:endParaRPr lang="en-US" dirty="0"/>
+          </a:p>
+          <a:p>
+            <a:pPr marL="0" indent="0">
+              <a:buNone/>
+            </a:pPr>
+            <a:endParaRPr lang="en-US" dirty="0"/>
+          </a:p>
+        </p:txBody>
+      </p:sp>
+      <p:sp>
+        <p:nvSpPr>
+          <p:cNvPr id="4" name="Title 1"/>
+          <p:cNvSpPr>
+            <a:spLocks noGrp="1"/>
+          </p:cNvSpPr>
+          <p:nvPr>
+            <p:ph type="title"/>
+          </p:nvPr>
+        </p:nvSpPr>
+        <p:spPr>
+          <a:xfrm>
+            <a:off x="457200" y="84676"/>
+            <a:ext cx="8229600" cy="1007533"/>
+          </a:xfrm>
+        </p:spPr>
+        <p:txBody>
+          <a:bodyPr/>
+          <a:lstStyle/>
+          <a:p>
+            <a:r>
+              <a:rPr lang="en-US" dirty="0" smtClean="0"/>
+              <a:t>Equations</a:t>
+            </a:r>
+            <a:endParaRPr lang="en-US" dirty="0"/>
+          </a:p>
+        </p:txBody>
+      </p:sp>
+      <p:sp>
+        <p:nvSpPr>
+          <p:cNvPr id="5" name="Slide Number Placeholder 4"/>
+          <p:cNvSpPr>
+            <a:spLocks noGrp="1"/>
+          </p:cNvSpPr>
+          <p:nvPr>
+            <p:ph type="sldNum" sz="quarter" idx="12"/>
+          </p:nvPr>
+        </p:nvSpPr>
+        <p:spPr/>
+        <p:txBody>
+          <a:bodyPr/>
+          <a:lstStyle/>
+          <a:p>
+            <a:fld id="{BA9B540C-44DA-4F69-89C9-7C84606640D3}" type="slidenum">
+              <a:rPr lang="en-US" smtClean="0"/>
+              <a:pPr/>
+              <a:t>21</a:t>
+            </a:fld>
+            <a:endParaRPr lang="en-US"/>
+          </a:p>
+        </p:txBody>
+      </p:sp>
+    </p:spTree>
+    <p:extLst>
+      <p:ext uri="{BB962C8B-B14F-4D97-AF65-F5344CB8AC3E}">
+        <p14:creationId xmlns:p14="http://schemas.microsoft.com/office/powerpoint/2010/main" val="3404430301"/>
+      </p:ext>
+    </p:extLst>
+  </p:cSld>
+  <p:clrMapOvr>
+    <a:masterClrMapping/>
+  </p:clrMapOvr>
+  <p:timing>
+    <p:tnLst>
+      <p:par>
+        <p:cTn xmlns:p14="http://schemas.microsoft.com/office/powerpoint/2010/main" id="1" dur="indefinite" restart="never" nodeType="tmRoot"/>
+      </p:par>
+    </p:tnLst>
+  </p:timing>
+</p:sld>
+</file>
+
+<file path=ppt/slides/slide23.xml><?xml version="1.0" encoding="utf-8"?>
+<p:sld xmlns:a="http://schemas.openxmlformats.org/drawingml/2006/main" xmlns:r="http://schemas.openxmlformats.org/officeDocument/2006/relationships" xmlns:p="http://schemas.openxmlformats.org/presentationml/2006/main">
+  <p:cSld>
+    <p:spTree>
+      <p:nvGrpSpPr>
+        <p:cNvPr id="1" name=""/>
+        <p:cNvGrpSpPr/>
+        <p:nvPr/>
+      </p:nvGrpSpPr>
+      <p:grpSpPr>
+        <a:xfrm>
+          <a:off x="0" y="0"/>
+          <a:ext cx="0" cy="0"/>
+          <a:chOff x="0" y="0"/>
+          <a:chExt cx="0" cy="0"/>
+        </a:xfrm>
+      </p:grpSpPr>
+      <p:sp>
+        <p:nvSpPr>
+          <p:cNvPr id="3" name="Content Placeholder 2"/>
+          <p:cNvSpPr>
+            <a:spLocks noGrp="1"/>
+          </p:cNvSpPr>
+          <p:nvPr>
+            <p:ph idx="1"/>
+          </p:nvPr>
+        </p:nvSpPr>
+        <p:spPr/>
+        <p:txBody>
+          <a:bodyPr/>
+          <a:lstStyle/>
+          <a:p>
+            <a:r>
+              <a:rPr lang="en-US" dirty="0" smtClean="0"/>
+              <a:t>Inline </a:t>
+            </a:r>
+            <a:r>
+              <a:rPr lang="en-US" dirty="0" smtClean="0"/>
+              <a:t>math mode can be inserted using $ math equation here</a:t>
+            </a:r>
+            <a:r>
+              <a:rPr lang="en-US" dirty="0" smtClean="0"/>
+              <a:t>$</a:t>
+            </a:r>
+          </a:p>
+          <a:p>
+            <a:endParaRPr lang="en-US" dirty="0" smtClean="0"/>
+          </a:p>
+          <a:p>
+            <a:pPr marL="0" indent="0">
+              <a:buNone/>
+            </a:pPr>
+            <a:r>
+              <a:rPr lang="en-US" b="1" dirty="0">
+                <a:solidFill>
+                  <a:schemeClr val="tx2">
+                    <a:lumMod val="75000"/>
+                  </a:schemeClr>
+                </a:solidFill>
+              </a:rPr>
+              <a:t>Example</a:t>
+            </a:r>
+            <a:r>
+              <a:rPr lang="en-US" b="1" dirty="0" smtClean="0">
+                <a:solidFill>
+                  <a:schemeClr val="tx2">
+                    <a:lumMod val="75000"/>
+                  </a:schemeClr>
+                </a:solidFill>
+              </a:rPr>
+              <a:t>:</a:t>
+            </a:r>
+            <a:endParaRPr lang="en-US" dirty="0"/>
+          </a:p>
+          <a:p>
+            <a:pPr marL="0" indent="0">
+              <a:buNone/>
+            </a:pPr>
+            <a:r>
+              <a:rPr lang="en-US" dirty="0"/>
+              <a:t>We can use inline math such as $f(x) = 2x^3 + 5x$ in </a:t>
+            </a:r>
+            <a:r>
+              <a:rPr lang="en-US" dirty="0" smtClean="0"/>
+              <a:t>between </a:t>
+            </a:r>
+            <a:r>
+              <a:rPr lang="en-US" dirty="0"/>
+              <a:t>text.</a:t>
+            </a:r>
+            <a:endParaRPr lang="en-US" dirty="0" smtClean="0"/>
+          </a:p>
+          <a:p>
+            <a:endParaRPr lang="en-US" dirty="0"/>
+          </a:p>
+          <a:p>
+            <a:pPr marL="0" indent="0">
+              <a:buNone/>
+            </a:pPr>
+            <a:endParaRPr lang="en-US" dirty="0"/>
+          </a:p>
+        </p:txBody>
+      </p:sp>
+      <p:sp>
+        <p:nvSpPr>
+          <p:cNvPr id="4" name="Title 1"/>
+          <p:cNvSpPr>
+            <a:spLocks noGrp="1"/>
+          </p:cNvSpPr>
+          <p:nvPr>
+            <p:ph type="title"/>
+          </p:nvPr>
+        </p:nvSpPr>
+        <p:spPr>
+          <a:xfrm>
+            <a:off x="457200" y="84676"/>
+            <a:ext cx="8229600" cy="1007533"/>
+          </a:xfrm>
+        </p:spPr>
+        <p:txBody>
+          <a:bodyPr/>
+          <a:lstStyle/>
+          <a:p>
+            <a:r>
+              <a:rPr lang="en-US" dirty="0" smtClean="0"/>
+              <a:t>Equations</a:t>
+            </a:r>
+            <a:endParaRPr lang="en-US" dirty="0"/>
+          </a:p>
+        </p:txBody>
+      </p:sp>
+      <p:sp>
+        <p:nvSpPr>
+          <p:cNvPr id="5" name="Slide Number Placeholder 4"/>
+          <p:cNvSpPr>
+            <a:spLocks noGrp="1"/>
+          </p:cNvSpPr>
+          <p:nvPr>
+            <p:ph type="sldNum" sz="quarter" idx="12"/>
+          </p:nvPr>
+        </p:nvSpPr>
+        <p:spPr/>
+        <p:txBody>
+          <a:bodyPr/>
+          <a:lstStyle/>
+          <a:p>
+            <a:fld id="{BA9B540C-44DA-4F69-89C9-7C84606640D3}" type="slidenum">
+              <a:rPr lang="en-US" smtClean="0"/>
+              <a:pPr/>
+              <a:t>22</a:t>
+            </a:fld>
+            <a:endParaRPr lang="en-US"/>
+          </a:p>
+        </p:txBody>
+      </p:sp>
+      <p:pic>
+        <p:nvPicPr>
+          <p:cNvPr id="2" name="Picture 1" descr="Screen Shot 2016-11-08 at 5.22.11 PM.png"/>
+          <p:cNvPicPr>
+            <a:picLocks noChangeAspect="1"/>
+          </p:cNvPicPr>
+          <p:nvPr/>
+        </p:nvPicPr>
+        <p:blipFill>
+          <a:blip r:embed="rId2">
+            <a:extLst>
+              <a:ext uri="{28A0092B-C50C-407E-A947-70E740481C1C}">
+                <a14:useLocalDpi xmlns:a14="http://schemas.microsoft.com/office/drawing/2010/main" val="0"/>
+              </a:ext>
+            </a:extLst>
+          </a:blip>
+          <a:stretch>
+            <a:fillRect/>
+          </a:stretch>
+        </p:blipFill>
+        <p:spPr>
+          <a:xfrm>
+            <a:off x="0" y="4847167"/>
+            <a:ext cx="9144000" cy="480701"/>
+          </a:xfrm>
+          <a:prstGeom prst="rect">
+            <a:avLst/>
+          </a:prstGeom>
+        </p:spPr>
+      </p:pic>
+    </p:spTree>
+    <p:extLst>
+      <p:ext uri="{BB962C8B-B14F-4D97-AF65-F5344CB8AC3E}">
+        <p14:creationId xmlns:p14="http://schemas.microsoft.com/office/powerpoint/2010/main" val="1196651011"/>
+      </p:ext>
+    </p:extLst>
+  </p:cSld>
+  <p:clrMapOvr>
+    <a:masterClrMapping/>
+  </p:clrMapOvr>
+  <p:timing>
+    <p:tnLst>
+      <p:par>
+        <p:cTn xmlns:p14="http://schemas.microsoft.com/office/powerpoint/2010/main" id="1" dur="indefinite" restart="never" nodeType="tmRoot"/>
+      </p:par>
+    </p:tnLst>
+  </p:timing>
+</p:sld>
+</file>
+
+<file path=ppt/slides/slide24.xml><?xml version="1.0" encoding="utf-8"?>
+<p:sld xmlns:a="http://schemas.openxmlformats.org/drawingml/2006/main" xmlns:r="http://schemas.openxmlformats.org/officeDocument/2006/relationships" xmlns:p="http://schemas.openxmlformats.org/presentationml/2006/main">
+  <p:cSld>
+    <p:spTree>
+      <p:nvGrpSpPr>
+        <p:cNvPr id="1" name=""/>
+        <p:cNvGrpSpPr/>
+        <p:nvPr/>
+      </p:nvGrpSpPr>
+      <p:grpSpPr>
+        <a:xfrm>
+          <a:off x="0" y="0"/>
+          <a:ext cx="0" cy="0"/>
+          <a:chOff x="0" y="0"/>
+          <a:chExt cx="0" cy="0"/>
+        </a:xfrm>
+      </p:grpSpPr>
+      <p:sp>
+        <p:nvSpPr>
+          <p:cNvPr id="4" name="Title 1"/>
+          <p:cNvSpPr>
+            <a:spLocks noGrp="1"/>
+          </p:cNvSpPr>
+          <p:nvPr>
+            <p:ph type="title"/>
+          </p:nvPr>
+        </p:nvSpPr>
+        <p:spPr>
+          <a:xfrm>
+            <a:off x="457200" y="84676"/>
+            <a:ext cx="8229600" cy="1007533"/>
+          </a:xfrm>
+        </p:spPr>
+        <p:txBody>
+          <a:bodyPr/>
+          <a:lstStyle/>
+          <a:p>
+            <a:r>
+              <a:rPr lang="en-US" dirty="0" smtClean="0"/>
+              <a:t>Bold/ Italic/ underlined</a:t>
+            </a:r>
+            <a:endParaRPr lang="en-US" dirty="0"/>
+          </a:p>
+        </p:txBody>
+      </p:sp>
+      <p:sp>
+        <p:nvSpPr>
+          <p:cNvPr id="5" name="Slide Number Placeholder 4"/>
+          <p:cNvSpPr>
+            <a:spLocks noGrp="1"/>
+          </p:cNvSpPr>
+          <p:nvPr>
+            <p:ph type="sldNum" sz="quarter" idx="12"/>
+          </p:nvPr>
+        </p:nvSpPr>
+        <p:spPr/>
+        <p:txBody>
+          <a:bodyPr/>
+          <a:lstStyle/>
+          <a:p>
+            <a:fld id="{BA9B540C-44DA-4F69-89C9-7C84606640D3}" type="slidenum">
+              <a:rPr lang="en-US" smtClean="0"/>
+              <a:pPr/>
+              <a:t>23</a:t>
+            </a:fld>
+            <a:endParaRPr lang="en-US"/>
+          </a:p>
+        </p:txBody>
+      </p:sp>
+    </p:spTree>
+    <p:extLst>
+      <p:ext uri="{BB962C8B-B14F-4D97-AF65-F5344CB8AC3E}">
+        <p14:creationId xmlns:p14="http://schemas.microsoft.com/office/powerpoint/2010/main" val="3388965631"/>
+      </p:ext>
+    </p:extLst>
+  </p:cSld>
+  <p:clrMapOvr>
+    <a:masterClrMapping/>
+  </p:clrMapOvr>
+  <p:timing>
+    <p:tnLst>
+      <p:par>
+        <p:cTn xmlns:p14="http://schemas.microsoft.com/office/powerpoint/2010/main" id="1" dur="indefinite" restart="never" nodeType="tmRoot"/>
+      </p:par>
+    </p:tnLst>
+  </p:timing>
+</p:sld>
+</file>
+
+<file path=ppt/slides/slide25.xml><?xml version="1.0" encoding="utf-8"?>
+<p:sld xmlns:a="http://schemas.openxmlformats.org/drawingml/2006/main" xmlns:r="http://schemas.openxmlformats.org/officeDocument/2006/relationships" xmlns:p="http://schemas.openxmlformats.org/presentationml/2006/main">
+  <p:cSld>
+    <p:spTree>
+      <p:nvGrpSpPr>
+        <p:cNvPr id="1" name=""/>
+        <p:cNvGrpSpPr/>
+        <p:nvPr/>
+      </p:nvGrpSpPr>
+      <p:grpSpPr>
+        <a:xfrm>
+          <a:off x="0" y="0"/>
+          <a:ext cx="0" cy="0"/>
+          <a:chOff x="0" y="0"/>
+          <a:chExt cx="0" cy="0"/>
+        </a:xfrm>
+      </p:grpSpPr>
+      <p:sp>
+        <p:nvSpPr>
+          <p:cNvPr id="3" name="Content Placeholder 2"/>
+          <p:cNvSpPr>
+            <a:spLocks noGrp="1"/>
+          </p:cNvSpPr>
+          <p:nvPr>
+            <p:ph idx="1"/>
+          </p:nvPr>
+        </p:nvSpPr>
+        <p:spPr>
+          <a:xfrm>
+            <a:off x="728128" y="2421465"/>
+            <a:ext cx="8229600" cy="3789363"/>
+          </a:xfrm>
+        </p:spPr>
+        <p:txBody>
+          <a:bodyPr/>
+          <a:lstStyle/>
+          <a:p>
+            <a:r>
+              <a:rPr lang="en-US" dirty="0" smtClean="0"/>
+              <a:t>\</a:t>
+            </a:r>
+            <a:r>
+              <a:rPr lang="en-US" dirty="0" err="1" smtClean="0"/>
+              <a:t>textbf</a:t>
+            </a:r>
+            <a:r>
+              <a:rPr lang="en-US" dirty="0" smtClean="0"/>
+              <a:t>{text} : bold face text</a:t>
+            </a:r>
+          </a:p>
+          <a:p>
+            <a:pPr marL="0" indent="0">
+              <a:buNone/>
+            </a:pPr>
+            <a:endParaRPr lang="en-US" dirty="0"/>
+          </a:p>
+        </p:txBody>
+      </p:sp>
+      <p:sp>
+        <p:nvSpPr>
+          <p:cNvPr id="4" name="Title 1"/>
+          <p:cNvSpPr>
+            <a:spLocks noGrp="1"/>
+          </p:cNvSpPr>
+          <p:nvPr>
+            <p:ph type="title"/>
+          </p:nvPr>
+        </p:nvSpPr>
+        <p:spPr>
+          <a:xfrm>
+            <a:off x="457200" y="84676"/>
+            <a:ext cx="8229600" cy="1007533"/>
+          </a:xfrm>
+        </p:spPr>
+        <p:txBody>
+          <a:bodyPr/>
+          <a:lstStyle/>
+          <a:p>
+            <a:r>
+              <a:rPr lang="en-US" dirty="0" smtClean="0"/>
+              <a:t>Bold/ Italic/ underlined</a:t>
+            </a:r>
+            <a:endParaRPr lang="en-US" dirty="0"/>
+          </a:p>
+        </p:txBody>
+      </p:sp>
+      <p:sp>
+        <p:nvSpPr>
+          <p:cNvPr id="5" name="Slide Number Placeholder 4"/>
+          <p:cNvSpPr>
+            <a:spLocks noGrp="1"/>
+          </p:cNvSpPr>
+          <p:nvPr>
+            <p:ph type="sldNum" sz="quarter" idx="12"/>
+          </p:nvPr>
+        </p:nvSpPr>
+        <p:spPr/>
+        <p:txBody>
+          <a:bodyPr/>
+          <a:lstStyle/>
+          <a:p>
+            <a:fld id="{BA9B540C-44DA-4F69-89C9-7C84606640D3}" type="slidenum">
+              <a:rPr lang="en-US" smtClean="0"/>
+              <a:pPr/>
+              <a:t>24</a:t>
+            </a:fld>
+            <a:endParaRPr lang="en-US"/>
+          </a:p>
+        </p:txBody>
+      </p:sp>
+      <p:pic>
+        <p:nvPicPr>
+          <p:cNvPr id="2" name="Picture 1" descr="Screen Shot 2016-11-08 at 5.37.30 PM.png"/>
+          <p:cNvPicPr>
+            <a:picLocks noChangeAspect="1"/>
+          </p:cNvPicPr>
+          <p:nvPr/>
+        </p:nvPicPr>
+        <p:blipFill rotWithShape="1">
+          <a:blip r:embed="rId2">
+            <a:extLst>
+              <a:ext uri="{28A0092B-C50C-407E-A947-70E740481C1C}">
+                <a14:useLocalDpi xmlns:a14="http://schemas.microsoft.com/office/drawing/2010/main" val="0"/>
+              </a:ext>
+            </a:extLst>
+          </a:blip>
+          <a:srcRect b="65829"/>
+          <a:stretch/>
+        </p:blipFill>
+        <p:spPr>
+          <a:xfrm>
+            <a:off x="6544727" y="2302934"/>
+            <a:ext cx="1765300" cy="863599"/>
+          </a:xfrm>
+          <a:prstGeom prst="rect">
+            <a:avLst/>
+          </a:prstGeom>
+        </p:spPr>
+      </p:pic>
+    </p:spTree>
+    <p:extLst>
+      <p:ext uri="{BB962C8B-B14F-4D97-AF65-F5344CB8AC3E}">
+        <p14:creationId xmlns:p14="http://schemas.microsoft.com/office/powerpoint/2010/main" val="3714022494"/>
+      </p:ext>
+    </p:extLst>
+  </p:cSld>
+  <p:clrMapOvr>
+    <a:masterClrMapping/>
+  </p:clrMapOvr>
+  <p:timing>
+    <p:tnLst>
+      <p:par>
+        <p:cTn xmlns:p14="http://schemas.microsoft.com/office/powerpoint/2010/main" id="1" dur="indefinite" restart="never" nodeType="tmRoot"/>
+      </p:par>
+    </p:tnLst>
+  </p:timing>
+</p:sld>
+</file>
+
+<file path=ppt/slides/slide26.xml><?xml version="1.0" encoding="utf-8"?>
+<p:sld xmlns:a="http://schemas.openxmlformats.org/drawingml/2006/main" xmlns:r="http://schemas.openxmlformats.org/officeDocument/2006/relationships" xmlns:p="http://schemas.openxmlformats.org/presentationml/2006/main">
+  <p:cSld>
+    <p:spTree>
+      <p:nvGrpSpPr>
+        <p:cNvPr id="1" name=""/>
+        <p:cNvGrpSpPr/>
+        <p:nvPr/>
+      </p:nvGrpSpPr>
+      <p:grpSpPr>
+        <a:xfrm>
+          <a:off x="0" y="0"/>
+          <a:ext cx="0" cy="0"/>
+          <a:chOff x="0" y="0"/>
+          <a:chExt cx="0" cy="0"/>
+        </a:xfrm>
+      </p:grpSpPr>
+      <p:sp>
+        <p:nvSpPr>
+          <p:cNvPr id="3" name="Content Placeholder 2"/>
+          <p:cNvSpPr>
+            <a:spLocks noGrp="1"/>
+          </p:cNvSpPr>
+          <p:nvPr>
+            <p:ph idx="1"/>
+          </p:nvPr>
+        </p:nvSpPr>
+        <p:spPr>
+          <a:xfrm>
+            <a:off x="728128" y="2421465"/>
+            <a:ext cx="8229600" cy="3789363"/>
+          </a:xfrm>
+        </p:spPr>
+        <p:txBody>
+          <a:bodyPr/>
+          <a:lstStyle/>
+          <a:p>
+            <a:r>
+              <a:rPr lang="en-US" dirty="0" smtClean="0"/>
+              <a:t>\</a:t>
+            </a:r>
+            <a:r>
+              <a:rPr lang="en-US" dirty="0" err="1" smtClean="0"/>
+              <a:t>textbf</a:t>
+            </a:r>
+            <a:r>
+              <a:rPr lang="en-US" dirty="0" smtClean="0"/>
+              <a:t>{text} : bold face text</a:t>
+            </a:r>
+          </a:p>
+          <a:p>
+            <a:endParaRPr lang="en-US" dirty="0"/>
+          </a:p>
+          <a:p>
+            <a:r>
+              <a:rPr lang="en-US" dirty="0" smtClean="0"/>
+              <a:t>\</a:t>
+            </a:r>
+            <a:r>
+              <a:rPr lang="en-US" dirty="0" err="1" smtClean="0"/>
+              <a:t>textit</a:t>
+            </a:r>
+            <a:r>
+              <a:rPr lang="en-US" dirty="0" smtClean="0"/>
+              <a:t>{text} : italic text</a:t>
+            </a:r>
+          </a:p>
+          <a:p>
+            <a:pPr marL="0" indent="0">
+              <a:buNone/>
+            </a:pPr>
+            <a:endParaRPr lang="en-US" dirty="0"/>
+          </a:p>
+        </p:txBody>
+      </p:sp>
+      <p:sp>
+        <p:nvSpPr>
+          <p:cNvPr id="4" name="Title 1"/>
+          <p:cNvSpPr>
+            <a:spLocks noGrp="1"/>
+          </p:cNvSpPr>
+          <p:nvPr>
+            <p:ph type="title"/>
+          </p:nvPr>
+        </p:nvSpPr>
+        <p:spPr>
+          <a:xfrm>
+            <a:off x="457200" y="84676"/>
+            <a:ext cx="8229600" cy="1007533"/>
+          </a:xfrm>
+        </p:spPr>
+        <p:txBody>
+          <a:bodyPr/>
+          <a:lstStyle/>
+          <a:p>
+            <a:r>
+              <a:rPr lang="en-US" dirty="0" smtClean="0"/>
+              <a:t>Bold/ Italic/ underlined</a:t>
+            </a:r>
+            <a:endParaRPr lang="en-US" dirty="0"/>
+          </a:p>
+        </p:txBody>
+      </p:sp>
+      <p:sp>
+        <p:nvSpPr>
+          <p:cNvPr id="5" name="Slide Number Placeholder 4"/>
+          <p:cNvSpPr>
+            <a:spLocks noGrp="1"/>
+          </p:cNvSpPr>
+          <p:nvPr>
+            <p:ph type="sldNum" sz="quarter" idx="12"/>
+          </p:nvPr>
+        </p:nvSpPr>
+        <p:spPr/>
+        <p:txBody>
+          <a:bodyPr/>
+          <a:lstStyle/>
+          <a:p>
+            <a:fld id="{BA9B540C-44DA-4F69-89C9-7C84606640D3}" type="slidenum">
+              <a:rPr lang="en-US" smtClean="0"/>
+              <a:pPr/>
+              <a:t>25</a:t>
+            </a:fld>
+            <a:endParaRPr lang="en-US"/>
+          </a:p>
+        </p:txBody>
+      </p:sp>
+      <p:pic>
+        <p:nvPicPr>
+          <p:cNvPr id="2" name="Picture 1" descr="Screen Shot 2016-11-08 at 5.37.30 PM.png"/>
+          <p:cNvPicPr>
+            <a:picLocks noChangeAspect="1"/>
+          </p:cNvPicPr>
+          <p:nvPr/>
+        </p:nvPicPr>
+        <p:blipFill rotWithShape="1">
+          <a:blip r:embed="rId2">
+            <a:extLst>
+              <a:ext uri="{28A0092B-C50C-407E-A947-70E740481C1C}">
+                <a14:useLocalDpi xmlns:a14="http://schemas.microsoft.com/office/drawing/2010/main" val="0"/>
+              </a:ext>
+            </a:extLst>
+          </a:blip>
+          <a:srcRect b="31659"/>
+          <a:stretch/>
+        </p:blipFill>
+        <p:spPr>
+          <a:xfrm>
+            <a:off x="6544727" y="2302934"/>
+            <a:ext cx="1765300" cy="1727199"/>
+          </a:xfrm>
+          <a:prstGeom prst="rect">
+            <a:avLst/>
+          </a:prstGeom>
+        </p:spPr>
+      </p:pic>
+    </p:spTree>
+    <p:extLst>
+      <p:ext uri="{BB962C8B-B14F-4D97-AF65-F5344CB8AC3E}">
+        <p14:creationId xmlns:p14="http://schemas.microsoft.com/office/powerpoint/2010/main" val="3714022494"/>
+      </p:ext>
+    </p:extLst>
+  </p:cSld>
+  <p:clrMapOvr>
+    <a:masterClrMapping/>
+  </p:clrMapOvr>
+  <p:timing>
+    <p:tnLst>
+      <p:par>
+        <p:cTn xmlns:p14="http://schemas.microsoft.com/office/powerpoint/2010/main" id="1" dur="indefinite" restart="never" nodeType="tmRoot"/>
+      </p:par>
+    </p:tnLst>
+  </p:timing>
+</p:sld>
+</file>
+
+<file path=ppt/slides/slide27.xml><?xml version="1.0" encoding="utf-8"?>
+<p:sld xmlns:a="http://schemas.openxmlformats.org/drawingml/2006/main" xmlns:r="http://schemas.openxmlformats.org/officeDocument/2006/relationships" xmlns:p="http://schemas.openxmlformats.org/presentationml/2006/main">
+  <p:cSld>
+    <p:spTree>
+      <p:nvGrpSpPr>
+        <p:cNvPr id="1" name=""/>
+        <p:cNvGrpSpPr/>
+        <p:nvPr/>
+      </p:nvGrpSpPr>
+      <p:grpSpPr>
+        <a:xfrm>
+          <a:off x="0" y="0"/>
+          <a:ext cx="0" cy="0"/>
+          <a:chOff x="0" y="0"/>
+          <a:chExt cx="0" cy="0"/>
+        </a:xfrm>
+      </p:grpSpPr>
+      <p:sp>
+        <p:nvSpPr>
+          <p:cNvPr id="3" name="Content Placeholder 2"/>
+          <p:cNvSpPr>
+            <a:spLocks noGrp="1"/>
+          </p:cNvSpPr>
+          <p:nvPr>
+            <p:ph idx="1"/>
+          </p:nvPr>
+        </p:nvSpPr>
+        <p:spPr>
+          <a:xfrm>
+            <a:off x="728128" y="2421465"/>
+            <a:ext cx="8229600" cy="3789363"/>
+          </a:xfrm>
+        </p:spPr>
+        <p:txBody>
+          <a:bodyPr/>
+          <a:lstStyle/>
+          <a:p>
+            <a:r>
+              <a:rPr lang="en-US" dirty="0" smtClean="0"/>
+              <a:t>\</a:t>
+            </a:r>
+            <a:r>
+              <a:rPr lang="en-US" dirty="0" err="1" smtClean="0"/>
+              <a:t>textbf</a:t>
+            </a:r>
+            <a:r>
+              <a:rPr lang="en-US" dirty="0" smtClean="0"/>
+              <a:t>{text} : bold face text</a:t>
+            </a:r>
+          </a:p>
+          <a:p>
+            <a:endParaRPr lang="en-US" dirty="0"/>
+          </a:p>
+          <a:p>
+            <a:r>
+              <a:rPr lang="en-US" dirty="0" smtClean="0"/>
+              <a:t>\</a:t>
+            </a:r>
+            <a:r>
+              <a:rPr lang="en-US" dirty="0" err="1" smtClean="0"/>
+              <a:t>textit</a:t>
+            </a:r>
+            <a:r>
+              <a:rPr lang="en-US" dirty="0" smtClean="0"/>
+              <a:t>{text} : italic text</a:t>
+            </a:r>
+          </a:p>
+          <a:p>
+            <a:endParaRPr lang="en-US" dirty="0"/>
+          </a:p>
+          <a:p>
+            <a:r>
+              <a:rPr lang="en-US" dirty="0" smtClean="0"/>
+              <a:t>\underlined{text} : underlined text</a:t>
+            </a:r>
+            <a:endParaRPr lang="en-US" dirty="0"/>
+          </a:p>
+        </p:txBody>
+      </p:sp>
+      <p:sp>
+        <p:nvSpPr>
+          <p:cNvPr id="4" name="Title 1"/>
+          <p:cNvSpPr>
+            <a:spLocks noGrp="1"/>
+          </p:cNvSpPr>
+          <p:nvPr>
+            <p:ph type="title"/>
+          </p:nvPr>
+        </p:nvSpPr>
+        <p:spPr>
+          <a:xfrm>
+            <a:off x="457200" y="84676"/>
+            <a:ext cx="8229600" cy="1007533"/>
+          </a:xfrm>
+        </p:spPr>
+        <p:txBody>
+          <a:bodyPr/>
+          <a:lstStyle/>
+          <a:p>
+            <a:r>
+              <a:rPr lang="en-US" dirty="0" smtClean="0"/>
+              <a:t>Bold/ Italic/ underlined</a:t>
+            </a:r>
+            <a:endParaRPr lang="en-US" dirty="0"/>
+          </a:p>
+        </p:txBody>
+      </p:sp>
+      <p:sp>
+        <p:nvSpPr>
+          <p:cNvPr id="5" name="Slide Number Placeholder 4"/>
+          <p:cNvSpPr>
+            <a:spLocks noGrp="1"/>
+          </p:cNvSpPr>
+          <p:nvPr>
+            <p:ph type="sldNum" sz="quarter" idx="12"/>
+          </p:nvPr>
+        </p:nvSpPr>
+        <p:spPr/>
+        <p:txBody>
+          <a:bodyPr/>
+          <a:lstStyle/>
+          <a:p>
+            <a:fld id="{BA9B540C-44DA-4F69-89C9-7C84606640D3}" type="slidenum">
+              <a:rPr lang="en-US" smtClean="0"/>
+              <a:pPr/>
+              <a:t>26</a:t>
+            </a:fld>
+            <a:endParaRPr lang="en-US"/>
+          </a:p>
+        </p:txBody>
+      </p:sp>
+      <p:pic>
+        <p:nvPicPr>
+          <p:cNvPr id="2" name="Picture 1" descr="Screen Shot 2016-11-08 at 5.37.30 PM.png"/>
+          <p:cNvPicPr>
+            <a:picLocks noChangeAspect="1"/>
+          </p:cNvPicPr>
+          <p:nvPr/>
+        </p:nvPicPr>
+        <p:blipFill>
+          <a:blip r:embed="rId2">
+            <a:extLst>
+              <a:ext uri="{28A0092B-C50C-407E-A947-70E740481C1C}">
+                <a14:useLocalDpi xmlns:a14="http://schemas.microsoft.com/office/drawing/2010/main" val="0"/>
+              </a:ext>
+            </a:extLst>
+          </a:blip>
+          <a:stretch>
+            <a:fillRect/>
+          </a:stretch>
+        </p:blipFill>
+        <p:spPr>
+          <a:xfrm>
+            <a:off x="6544727" y="2302934"/>
+            <a:ext cx="1765300" cy="2527300"/>
+          </a:xfrm>
+          <a:prstGeom prst="rect">
+            <a:avLst/>
+          </a:prstGeom>
+        </p:spPr>
+      </p:pic>
+    </p:spTree>
+    <p:extLst>
+      <p:ext uri="{BB962C8B-B14F-4D97-AF65-F5344CB8AC3E}">
+        <p14:creationId xmlns:p14="http://schemas.microsoft.com/office/powerpoint/2010/main" val="1715298743"/>
+      </p:ext>
+    </p:extLst>
+  </p:cSld>
+  <p:clrMapOvr>
+    <a:masterClrMapping/>
+  </p:clrMapOvr>
+  <p:timing>
+    <p:tnLst>
+      <p:par>
+        <p:cTn xmlns:p14="http://schemas.microsoft.com/office/powerpoint/2010/main" id="1" dur="indefinite" restart="never" nodeType="tmRoot"/>
+      </p:par>
+    </p:tnLst>
+  </p:timing>
+</p:sld>
+</file>
+
+<file path=ppt/slides/slide28.xml><?xml version="1.0" encoding="utf-8"?>
+<p:sld xmlns:a="http://schemas.openxmlformats.org/drawingml/2006/main" xmlns:r="http://schemas.openxmlformats.org/officeDocument/2006/relationships" xmlns:p="http://schemas.openxmlformats.org/presentationml/2006/main">
+  <p:cSld>
+    <p:spTree>
+      <p:nvGrpSpPr>
+        <p:cNvPr id="1" name=""/>
+        <p:cNvGrpSpPr/>
+        <p:nvPr/>
+      </p:nvGrpSpPr>
+      <p:grpSpPr>
+        <a:xfrm>
+          <a:off x="0" y="0"/>
+          <a:ext cx="0" cy="0"/>
+          <a:chOff x="0" y="0"/>
+          <a:chExt cx="0" cy="0"/>
+        </a:xfrm>
+      </p:grpSpPr>
+      <p:sp>
+        <p:nvSpPr>
+          <p:cNvPr id="3" name="Content Placeholder 2"/>
+          <p:cNvSpPr>
+            <a:spLocks noGrp="1"/>
+          </p:cNvSpPr>
+          <p:nvPr>
+            <p:ph idx="1"/>
+          </p:nvPr>
+        </p:nvSpPr>
+        <p:spPr/>
+        <p:txBody>
+          <a:bodyPr>
+            <a:normAutofit lnSpcReduction="10000"/>
+          </a:bodyPr>
+          <a:lstStyle/>
+          <a:p>
+            <a:r>
+              <a:rPr lang="en-US" dirty="0" smtClean="0"/>
+              <a:t>Use \label{} to reference </a:t>
+            </a:r>
+            <a:r>
+              <a:rPr lang="en-US" dirty="0" smtClean="0"/>
+              <a:t>figures, tables, equations, sections, </a:t>
+            </a:r>
+            <a:r>
+              <a:rPr lang="en-US" dirty="0" err="1" smtClean="0"/>
+              <a:t>etc</a:t>
+            </a:r>
+            <a:endParaRPr lang="en-US" dirty="0" smtClean="0"/>
+          </a:p>
+          <a:p>
+            <a:endParaRPr lang="en-US" dirty="0" smtClean="0"/>
+          </a:p>
+          <a:p>
+            <a:r>
+              <a:rPr lang="en-US" sz="3200" dirty="0" smtClean="0"/>
+              <a:t>For reference:</a:t>
+            </a:r>
+            <a:endParaRPr lang="en-US" sz="3200" dirty="0"/>
+          </a:p>
+          <a:p>
+            <a:pPr marL="0" indent="0">
+              <a:buNone/>
+            </a:pPr>
+            <a:r>
+              <a:rPr lang="en-US" dirty="0" smtClean="0"/>
+              <a:t>	\label{</a:t>
+            </a:r>
+            <a:r>
+              <a:rPr lang="en-US" dirty="0" err="1" smtClean="0"/>
+              <a:t>fig:labelname</a:t>
+            </a:r>
+            <a:r>
+              <a:rPr lang="en-US" dirty="0" smtClean="0"/>
+              <a:t>}</a:t>
+            </a:r>
+          </a:p>
+          <a:p>
+            <a:endParaRPr lang="en-US" dirty="0"/>
+          </a:p>
+          <a:p>
+            <a:r>
+              <a:rPr lang="en-US" sz="3200" dirty="0" smtClean="0"/>
+              <a:t>For calling the label:</a:t>
+            </a:r>
+            <a:endParaRPr lang="en-US" sz="3200" dirty="0"/>
+          </a:p>
+          <a:p>
+            <a:pPr marL="0" indent="0">
+              <a:buNone/>
+            </a:pPr>
+            <a:r>
+              <a:rPr lang="en-US" dirty="0" smtClean="0"/>
+              <a:t>	\ref{</a:t>
+            </a:r>
+            <a:r>
+              <a:rPr lang="en-US" dirty="0" err="1" smtClean="0"/>
+              <a:t>fig:labelname</a:t>
+            </a:r>
+            <a:r>
+              <a:rPr lang="en-US" dirty="0" smtClean="0"/>
+              <a:t>}</a:t>
+            </a:r>
+          </a:p>
+          <a:p>
+            <a:pPr marL="0" indent="0">
+              <a:buNone/>
+            </a:pPr>
+            <a:endParaRPr lang="en-US" dirty="0"/>
+          </a:p>
+          <a:p>
+            <a:pPr marL="0" indent="0">
+              <a:buNone/>
+            </a:pPr>
+            <a:r>
+              <a:rPr lang="en-US" dirty="0" smtClean="0"/>
+              <a:t>fig, sec, </a:t>
+            </a:r>
+            <a:r>
+              <a:rPr lang="en-US" dirty="0" err="1" smtClean="0"/>
+              <a:t>eq</a:t>
+            </a:r>
+            <a:r>
+              <a:rPr lang="en-US" dirty="0" smtClean="0"/>
+              <a:t>, </a:t>
+            </a:r>
+            <a:r>
+              <a:rPr lang="en-US" dirty="0" err="1" smtClean="0"/>
+              <a:t>etc</a:t>
+            </a:r>
+            <a:endParaRPr lang="en-US" dirty="0" smtClean="0"/>
+          </a:p>
+        </p:txBody>
+      </p:sp>
+      <p:sp>
+        <p:nvSpPr>
+          <p:cNvPr id="4" name="Title 1"/>
+          <p:cNvSpPr>
+            <a:spLocks noGrp="1"/>
+          </p:cNvSpPr>
+          <p:nvPr>
+            <p:ph type="title"/>
+          </p:nvPr>
+        </p:nvSpPr>
+        <p:spPr>
+          <a:xfrm>
+            <a:off x="457200" y="84676"/>
+            <a:ext cx="8229600" cy="1007533"/>
+          </a:xfrm>
+        </p:spPr>
+        <p:txBody>
+          <a:bodyPr/>
+          <a:lstStyle/>
+          <a:p>
+            <a:r>
+              <a:rPr lang="en-US" dirty="0" smtClean="0"/>
+              <a:t>Cross-reference</a:t>
+            </a:r>
+            <a:endParaRPr lang="en-US" dirty="0"/>
+          </a:p>
+        </p:txBody>
+      </p:sp>
+      <p:sp>
+        <p:nvSpPr>
+          <p:cNvPr id="5" name="Slide Number Placeholder 4"/>
+          <p:cNvSpPr>
+            <a:spLocks noGrp="1"/>
+          </p:cNvSpPr>
+          <p:nvPr>
+            <p:ph type="sldNum" sz="quarter" idx="12"/>
+          </p:nvPr>
+        </p:nvSpPr>
+        <p:spPr/>
+        <p:txBody>
+          <a:bodyPr/>
+          <a:lstStyle/>
+          <a:p>
+            <a:fld id="{BA9B540C-44DA-4F69-89C9-7C84606640D3}" type="slidenum">
+              <a:rPr lang="en-US" smtClean="0"/>
+              <a:pPr/>
+              <a:t>27</a:t>
+            </a:fld>
+            <a:endParaRPr lang="en-US"/>
+          </a:p>
+        </p:txBody>
+      </p:sp>
+    </p:spTree>
+    <p:extLst>
+      <p:ext uri="{BB962C8B-B14F-4D97-AF65-F5344CB8AC3E}">
+        <p14:creationId xmlns:p14="http://schemas.microsoft.com/office/powerpoint/2010/main" val="939518275"/>
+      </p:ext>
+    </p:extLst>
+  </p:cSld>
+  <p:clrMapOvr>
+    <a:masterClrMapping/>
+  </p:clrMapOvr>
+  <p:timing>
+    <p:tnLst>
+      <p:par>
+        <p:cTn xmlns:p14="http://schemas.microsoft.com/office/powerpoint/2010/main" id="1" dur="indefinite" restart="never" nodeType="tmRoot"/>
+      </p:par>
+    </p:tnLst>
+  </p:timing>
+</p:sld>
+</file>
+
+<file path=ppt/slides/slide29.xml><?xml version="1.0" encoding="utf-8"?>
+<p:sld xmlns:a="http://schemas.openxmlformats.org/drawingml/2006/main" xmlns:r="http://schemas.openxmlformats.org/officeDocument/2006/relationships" xmlns:p="http://schemas.openxmlformats.org/presentationml/2006/main">
+  <p:cSld>
+    <p:spTree>
+      <p:nvGrpSpPr>
+        <p:cNvPr id="1" name=""/>
+        <p:cNvGrpSpPr/>
+        <p:nvPr/>
+      </p:nvGrpSpPr>
+      <p:grpSpPr>
+        <a:xfrm>
+          <a:off x="0" y="0"/>
+          <a:ext cx="0" cy="0"/>
+          <a:chOff x="0" y="0"/>
+          <a:chExt cx="0" cy="0"/>
+        </a:xfrm>
+      </p:grpSpPr>
+      <p:sp>
+        <p:nvSpPr>
+          <p:cNvPr id="3" name="Content Placeholder 2"/>
+          <p:cNvSpPr>
+            <a:spLocks noGrp="1"/>
+          </p:cNvSpPr>
+          <p:nvPr>
+            <p:ph idx="1"/>
+          </p:nvPr>
+        </p:nvSpPr>
+        <p:spPr/>
+        <p:txBody>
+          <a:bodyPr/>
+          <a:lstStyle/>
+          <a:p>
+            <a:pPr marL="0" indent="0">
+              <a:buNone/>
+            </a:pPr>
+            <a:r>
+              <a:rPr lang="en-US" b="1" dirty="0" smtClean="0">
+                <a:solidFill>
+                  <a:schemeClr val="tx2">
+                    <a:lumMod val="75000"/>
+                  </a:schemeClr>
+                </a:solidFill>
+              </a:rPr>
+              <a:t>Method 1:</a:t>
+            </a:r>
+            <a:endParaRPr lang="en-US" dirty="0" smtClean="0"/>
+          </a:p>
+          <a:p>
+            <a:pPr marL="0" indent="0">
+              <a:buNone/>
+            </a:pPr>
+            <a:r>
+              <a:rPr lang="en-US" dirty="0" smtClean="0"/>
+              <a:t>\</a:t>
+            </a:r>
+            <a:r>
+              <a:rPr lang="en-US" dirty="0"/>
+              <a:t>begin{</a:t>
+            </a:r>
+            <a:r>
+              <a:rPr lang="en-US" dirty="0" err="1"/>
+              <a:t>thebibliography</a:t>
+            </a:r>
+            <a:r>
+              <a:rPr lang="en-US" dirty="0"/>
+              <a:t>}</a:t>
+            </a:r>
+            <a:r>
+              <a:rPr lang="en-US" dirty="0" smtClean="0"/>
+              <a:t>{} </a:t>
+            </a:r>
+          </a:p>
+          <a:p>
+            <a:pPr marL="0" indent="0">
+              <a:buNone/>
+            </a:pPr>
+            <a:r>
+              <a:rPr lang="en-US" dirty="0" smtClean="0"/>
+              <a:t>	\</a:t>
+            </a:r>
+            <a:r>
+              <a:rPr lang="en-US" dirty="0" err="1"/>
+              <a:t>bibitem</a:t>
+            </a:r>
+            <a:r>
+              <a:rPr lang="en-US" dirty="0" smtClean="0"/>
+              <a:t>{reference 1}</a:t>
+            </a:r>
+          </a:p>
+          <a:p>
+            <a:pPr marL="0" indent="0">
+              <a:buNone/>
+            </a:pPr>
+            <a:r>
+              <a:rPr lang="en-US" dirty="0"/>
+              <a:t>	</a:t>
+            </a:r>
+            <a:r>
+              <a:rPr lang="en-US" dirty="0" smtClean="0"/>
+              <a:t>\</a:t>
+            </a:r>
+            <a:r>
+              <a:rPr lang="en-US" dirty="0" err="1"/>
+              <a:t>bibitem</a:t>
+            </a:r>
+            <a:r>
+              <a:rPr lang="en-US" dirty="0" smtClean="0"/>
+              <a:t>{reference 2} </a:t>
+            </a:r>
+            <a:endParaRPr lang="en-US" dirty="0"/>
+          </a:p>
+          <a:p>
+            <a:pPr marL="0" indent="0">
+              <a:buNone/>
+            </a:pPr>
+            <a:r>
+              <a:rPr lang="en-US" dirty="0"/>
+              <a:t>\</a:t>
+            </a:r>
+            <a:r>
+              <a:rPr lang="en-US" dirty="0" smtClean="0"/>
+              <a:t>end{</a:t>
+            </a:r>
+            <a:r>
+              <a:rPr lang="en-US" dirty="0" err="1"/>
+              <a:t>thebibliography</a:t>
+            </a:r>
+            <a:r>
+              <a:rPr lang="en-US" dirty="0" smtClean="0"/>
+              <a:t>}</a:t>
+            </a:r>
+          </a:p>
+          <a:p>
+            <a:pPr marL="0" indent="0">
+              <a:buNone/>
+            </a:pPr>
+            <a:endParaRPr lang="en-US" dirty="0"/>
+          </a:p>
+          <a:p>
+            <a:r>
+              <a:rPr lang="en-US" dirty="0" smtClean="0"/>
+              <a:t>We can </a:t>
+            </a:r>
+            <a:r>
+              <a:rPr lang="en-US" dirty="0"/>
+              <a:t>cite it as: \cite{reference 1}</a:t>
+            </a:r>
+            <a:endParaRPr lang="en-US" dirty="0"/>
+          </a:p>
+        </p:txBody>
+      </p:sp>
+      <p:sp>
+        <p:nvSpPr>
+          <p:cNvPr id="4" name="Title 1"/>
+          <p:cNvSpPr>
+            <a:spLocks noGrp="1"/>
+          </p:cNvSpPr>
+          <p:nvPr>
+            <p:ph type="title"/>
+          </p:nvPr>
+        </p:nvSpPr>
+        <p:spPr>
+          <a:xfrm>
+            <a:off x="457200" y="84676"/>
+            <a:ext cx="8229600" cy="1007533"/>
+          </a:xfrm>
+        </p:spPr>
+        <p:txBody>
+          <a:bodyPr/>
+          <a:lstStyle/>
+          <a:p>
+            <a:r>
+              <a:rPr lang="en-US" dirty="0" smtClean="0"/>
+              <a:t>Bibliography</a:t>
+            </a:r>
+            <a:endParaRPr lang="en-US" dirty="0"/>
+          </a:p>
+        </p:txBody>
+      </p:sp>
+      <p:sp>
+        <p:nvSpPr>
+          <p:cNvPr id="5" name="Slide Number Placeholder 4"/>
+          <p:cNvSpPr>
+            <a:spLocks noGrp="1"/>
+          </p:cNvSpPr>
+          <p:nvPr>
+            <p:ph type="sldNum" sz="quarter" idx="12"/>
+          </p:nvPr>
+        </p:nvSpPr>
+        <p:spPr/>
+        <p:txBody>
+          <a:bodyPr/>
+          <a:lstStyle/>
+          <a:p>
+            <a:fld id="{BA9B540C-44DA-4F69-89C9-7C84606640D3}" type="slidenum">
+              <a:rPr lang="en-US" smtClean="0"/>
+              <a:pPr/>
+              <a:t>28</a:t>
+            </a:fld>
+            <a:endParaRPr lang="en-US"/>
+          </a:p>
+        </p:txBody>
+      </p:sp>
+    </p:spTree>
+    <p:extLst>
+      <p:ext uri="{BB962C8B-B14F-4D97-AF65-F5344CB8AC3E}">
+        <p14:creationId xmlns:p14="http://schemas.microsoft.com/office/powerpoint/2010/main" val="270318045"/>
+      </p:ext>
+    </p:extLst>
+  </p:cSld>
+  <p:clrMapOvr>
+    <a:masterClrMapping/>
+  </p:clrMapOvr>
+  <p:timing>
+    <p:tnLst>
+      <p:par>
+        <p:cTn xmlns:p14="http://schemas.microsoft.com/office/powerpoint/2010/main" id="1" dur="indefinite" restart="never" nodeType="tmRoot"/>
+      </p:par>
+    </p:tnLst>
+  </p:timing>
 </p:sld>
 </file>
 
@@ -5882,6 +8441,468 @@
     <p:extLst>
       <p:ext uri="{BB962C8B-B14F-4D97-AF65-F5344CB8AC3E}">
         <p14:creationId xmlns:p14="http://schemas.microsoft.com/office/powerpoint/2010/main" val="2660987844"/>
+      </p:ext>
+    </p:extLst>
+  </p:cSld>
+  <p:clrMapOvr>
+    <a:masterClrMapping/>
+  </p:clrMapOvr>
+  <p:timing>
+    <p:tnLst>
+      <p:par>
+        <p:cTn xmlns:p14="http://schemas.microsoft.com/office/powerpoint/2010/main" id="1" dur="indefinite" restart="never" nodeType="tmRoot"/>
+      </p:par>
+    </p:tnLst>
+  </p:timing>
+</p:sld>
+</file>
+
+<file path=ppt/slides/slide30.xml><?xml version="1.0" encoding="utf-8"?>
+<p:sld xmlns:a="http://schemas.openxmlformats.org/drawingml/2006/main" xmlns:r="http://schemas.openxmlformats.org/officeDocument/2006/relationships" xmlns:p="http://schemas.openxmlformats.org/presentationml/2006/main">
+  <p:cSld>
+    <p:spTree>
+      <p:nvGrpSpPr>
+        <p:cNvPr id="1" name=""/>
+        <p:cNvGrpSpPr/>
+        <p:nvPr/>
+      </p:nvGrpSpPr>
+      <p:grpSpPr>
+        <a:xfrm>
+          <a:off x="0" y="0"/>
+          <a:ext cx="0" cy="0"/>
+          <a:chOff x="0" y="0"/>
+          <a:chExt cx="0" cy="0"/>
+        </a:xfrm>
+      </p:grpSpPr>
+      <p:sp>
+        <p:nvSpPr>
+          <p:cNvPr id="3" name="Content Placeholder 2"/>
+          <p:cNvSpPr>
+            <a:spLocks noGrp="1"/>
+          </p:cNvSpPr>
+          <p:nvPr>
+            <p:ph idx="1"/>
+          </p:nvPr>
+        </p:nvSpPr>
+        <p:spPr/>
+        <p:txBody>
+          <a:bodyPr/>
+          <a:lstStyle/>
+          <a:p>
+            <a:pPr marL="0" indent="0">
+              <a:buNone/>
+            </a:pPr>
+            <a:r>
+              <a:rPr lang="en-US" b="1" dirty="0" smtClean="0">
+                <a:solidFill>
+                  <a:schemeClr val="tx2">
+                    <a:lumMod val="75000"/>
+                  </a:schemeClr>
+                </a:solidFill>
+              </a:rPr>
+              <a:t>Method 2: </a:t>
+            </a:r>
+          </a:p>
+          <a:p>
+            <a:pPr marL="0" indent="0">
+              <a:buNone/>
+            </a:pPr>
+            <a:r>
+              <a:rPr lang="en-US" dirty="0" smtClean="0"/>
+              <a:t>Using a separate .bib file:</a:t>
+            </a:r>
+          </a:p>
+          <a:p>
+            <a:pPr marL="0" indent="0">
+              <a:buNone/>
+            </a:pPr>
+            <a:endParaRPr lang="en-US" dirty="0"/>
+          </a:p>
+          <a:p>
+            <a:pPr marL="0" indent="0">
+              <a:buNone/>
+            </a:pPr>
+            <a:endParaRPr lang="en-US" dirty="0" smtClean="0"/>
+          </a:p>
+        </p:txBody>
+      </p:sp>
+      <p:sp>
+        <p:nvSpPr>
+          <p:cNvPr id="4" name="Title 1"/>
+          <p:cNvSpPr>
+            <a:spLocks noGrp="1"/>
+          </p:cNvSpPr>
+          <p:nvPr>
+            <p:ph type="title"/>
+          </p:nvPr>
+        </p:nvSpPr>
+        <p:spPr>
+          <a:xfrm>
+            <a:off x="457200" y="84676"/>
+            <a:ext cx="8229600" cy="1007533"/>
+          </a:xfrm>
+        </p:spPr>
+        <p:txBody>
+          <a:bodyPr/>
+          <a:lstStyle/>
+          <a:p>
+            <a:r>
+              <a:rPr lang="en-US" dirty="0" smtClean="0"/>
+              <a:t>Bibliography</a:t>
+            </a:r>
+            <a:endParaRPr lang="en-US" dirty="0"/>
+          </a:p>
+        </p:txBody>
+      </p:sp>
+      <p:sp>
+        <p:nvSpPr>
+          <p:cNvPr id="5" name="Slide Number Placeholder 4"/>
+          <p:cNvSpPr>
+            <a:spLocks noGrp="1"/>
+          </p:cNvSpPr>
+          <p:nvPr>
+            <p:ph type="sldNum" sz="quarter" idx="12"/>
+          </p:nvPr>
+        </p:nvSpPr>
+        <p:spPr/>
+        <p:txBody>
+          <a:bodyPr/>
+          <a:lstStyle/>
+          <a:p>
+            <a:fld id="{BA9B540C-44DA-4F69-89C9-7C84606640D3}" type="slidenum">
+              <a:rPr lang="en-US" smtClean="0"/>
+              <a:pPr/>
+              <a:t>29</a:t>
+            </a:fld>
+            <a:endParaRPr lang="en-US"/>
+          </a:p>
+        </p:txBody>
+      </p:sp>
+    </p:spTree>
+    <p:extLst>
+      <p:ext uri="{BB962C8B-B14F-4D97-AF65-F5344CB8AC3E}">
+        <p14:creationId xmlns:p14="http://schemas.microsoft.com/office/powerpoint/2010/main" val="1769806893"/>
+      </p:ext>
+    </p:extLst>
+  </p:cSld>
+  <p:clrMapOvr>
+    <a:masterClrMapping/>
+  </p:clrMapOvr>
+  <p:timing>
+    <p:tnLst>
+      <p:par>
+        <p:cTn xmlns:p14="http://schemas.microsoft.com/office/powerpoint/2010/main" id="1" dur="indefinite" restart="never" nodeType="tmRoot"/>
+      </p:par>
+    </p:tnLst>
+  </p:timing>
+</p:sld>
+</file>
+
+<file path=ppt/slides/slide31.xml><?xml version="1.0" encoding="utf-8"?>
+<p:sld xmlns:a="http://schemas.openxmlformats.org/drawingml/2006/main" xmlns:r="http://schemas.openxmlformats.org/officeDocument/2006/relationships" xmlns:p="http://schemas.openxmlformats.org/presentationml/2006/main">
+  <p:cSld>
+    <p:spTree>
+      <p:nvGrpSpPr>
+        <p:cNvPr id="1" name=""/>
+        <p:cNvGrpSpPr/>
+        <p:nvPr/>
+      </p:nvGrpSpPr>
+      <p:grpSpPr>
+        <a:xfrm>
+          <a:off x="0" y="0"/>
+          <a:ext cx="0" cy="0"/>
+          <a:chOff x="0" y="0"/>
+          <a:chExt cx="0" cy="0"/>
+        </a:xfrm>
+      </p:grpSpPr>
+      <p:sp>
+        <p:nvSpPr>
+          <p:cNvPr id="4" name="Title 1"/>
+          <p:cNvSpPr>
+            <a:spLocks noGrp="1"/>
+          </p:cNvSpPr>
+          <p:nvPr>
+            <p:ph type="title"/>
+          </p:nvPr>
+        </p:nvSpPr>
+        <p:spPr>
+          <a:xfrm>
+            <a:off x="457200" y="84676"/>
+            <a:ext cx="8229600" cy="1007533"/>
+          </a:xfrm>
+        </p:spPr>
+        <p:txBody>
+          <a:bodyPr/>
+          <a:lstStyle/>
+          <a:p>
+            <a:r>
+              <a:rPr lang="en-US" dirty="0" smtClean="0"/>
+              <a:t>Bibliography</a:t>
+            </a:r>
+            <a:endParaRPr lang="en-US" dirty="0"/>
+          </a:p>
+        </p:txBody>
+      </p:sp>
+      <p:sp>
+        <p:nvSpPr>
+          <p:cNvPr id="5" name="Slide Number Placeholder 4"/>
+          <p:cNvSpPr>
+            <a:spLocks noGrp="1"/>
+          </p:cNvSpPr>
+          <p:nvPr>
+            <p:ph type="sldNum" sz="quarter" idx="12"/>
+          </p:nvPr>
+        </p:nvSpPr>
+        <p:spPr/>
+        <p:txBody>
+          <a:bodyPr/>
+          <a:lstStyle/>
+          <a:p>
+            <a:fld id="{BA9B540C-44DA-4F69-89C9-7C84606640D3}" type="slidenum">
+              <a:rPr lang="en-US" smtClean="0"/>
+              <a:pPr/>
+              <a:t>30</a:t>
+            </a:fld>
+            <a:endParaRPr lang="en-US"/>
+          </a:p>
+        </p:txBody>
+      </p:sp>
+      <p:pic>
+        <p:nvPicPr>
+          <p:cNvPr id="2" name="Picture 1" descr="Screen Shot 2016-11-08 at 6.38.44 PM.png"/>
+          <p:cNvPicPr>
+            <a:picLocks noChangeAspect="1"/>
+          </p:cNvPicPr>
+          <p:nvPr/>
+        </p:nvPicPr>
+        <p:blipFill>
+          <a:blip r:embed="rId2">
+            <a:extLst>
+              <a:ext uri="{28A0092B-C50C-407E-A947-70E740481C1C}">
+                <a14:useLocalDpi xmlns:a14="http://schemas.microsoft.com/office/drawing/2010/main" val="0"/>
+              </a:ext>
+            </a:extLst>
+          </a:blip>
+          <a:stretch>
+            <a:fillRect/>
+          </a:stretch>
+        </p:blipFill>
+        <p:spPr>
+          <a:xfrm>
+            <a:off x="423355" y="1203549"/>
+            <a:ext cx="8369285" cy="5190079"/>
+          </a:xfrm>
+          <a:prstGeom prst="rect">
+            <a:avLst/>
+          </a:prstGeom>
+        </p:spPr>
+      </p:pic>
+    </p:spTree>
+    <p:extLst>
+      <p:ext uri="{BB962C8B-B14F-4D97-AF65-F5344CB8AC3E}">
+        <p14:creationId xmlns:p14="http://schemas.microsoft.com/office/powerpoint/2010/main" val="905333000"/>
+      </p:ext>
+    </p:extLst>
+  </p:cSld>
+  <p:clrMapOvr>
+    <a:masterClrMapping/>
+  </p:clrMapOvr>
+  <p:timing>
+    <p:tnLst>
+      <p:par>
+        <p:cTn xmlns:p14="http://schemas.microsoft.com/office/powerpoint/2010/main" id="1" dur="indefinite" restart="never" nodeType="tmRoot"/>
+      </p:par>
+    </p:tnLst>
+  </p:timing>
+</p:sld>
+</file>
+
+<file path=ppt/slides/slide32.xml><?xml version="1.0" encoding="utf-8"?>
+<p:sld xmlns:a="http://schemas.openxmlformats.org/drawingml/2006/main" xmlns:r="http://schemas.openxmlformats.org/officeDocument/2006/relationships" xmlns:p="http://schemas.openxmlformats.org/presentationml/2006/main">
+  <p:cSld>
+    <p:spTree>
+      <p:nvGrpSpPr>
+        <p:cNvPr id="1" name=""/>
+        <p:cNvGrpSpPr/>
+        <p:nvPr/>
+      </p:nvGrpSpPr>
+      <p:grpSpPr>
+        <a:xfrm>
+          <a:off x="0" y="0"/>
+          <a:ext cx="0" cy="0"/>
+          <a:chOff x="0" y="0"/>
+          <a:chExt cx="0" cy="0"/>
+        </a:xfrm>
+      </p:grpSpPr>
+      <p:sp>
+        <p:nvSpPr>
+          <p:cNvPr id="4" name="Title 1"/>
+          <p:cNvSpPr>
+            <a:spLocks noGrp="1"/>
+          </p:cNvSpPr>
+          <p:nvPr>
+            <p:ph type="title"/>
+          </p:nvPr>
+        </p:nvSpPr>
+        <p:spPr>
+          <a:xfrm>
+            <a:off x="457200" y="84676"/>
+            <a:ext cx="8229600" cy="1007533"/>
+          </a:xfrm>
+        </p:spPr>
+        <p:txBody>
+          <a:bodyPr/>
+          <a:lstStyle/>
+          <a:p>
+            <a:r>
+              <a:rPr lang="en-US" dirty="0" smtClean="0"/>
+              <a:t>Bibliography</a:t>
+            </a:r>
+            <a:endParaRPr lang="en-US" dirty="0"/>
+          </a:p>
+        </p:txBody>
+      </p:sp>
+      <p:sp>
+        <p:nvSpPr>
+          <p:cNvPr id="5" name="Slide Number Placeholder 4"/>
+          <p:cNvSpPr>
+            <a:spLocks noGrp="1"/>
+          </p:cNvSpPr>
+          <p:nvPr>
+            <p:ph type="sldNum" sz="quarter" idx="12"/>
+          </p:nvPr>
+        </p:nvSpPr>
+        <p:spPr/>
+        <p:txBody>
+          <a:bodyPr/>
+          <a:lstStyle/>
+          <a:p>
+            <a:fld id="{BA9B540C-44DA-4F69-89C9-7C84606640D3}" type="slidenum">
+              <a:rPr lang="en-US" smtClean="0"/>
+              <a:pPr/>
+              <a:t>31</a:t>
+            </a:fld>
+            <a:endParaRPr lang="en-US"/>
+          </a:p>
+        </p:txBody>
+      </p:sp>
+      <p:pic>
+        <p:nvPicPr>
+          <p:cNvPr id="2" name="Picture 1" descr="Screen Shot 2016-11-08 at 6.38.44 PM.png"/>
+          <p:cNvPicPr>
+            <a:picLocks noChangeAspect="1"/>
+          </p:cNvPicPr>
+          <p:nvPr/>
+        </p:nvPicPr>
+        <p:blipFill>
+          <a:blip r:embed="rId2">
+            <a:extLst>
+              <a:ext uri="{28A0092B-C50C-407E-A947-70E740481C1C}">
+                <a14:useLocalDpi xmlns:a14="http://schemas.microsoft.com/office/drawing/2010/main" val="0"/>
+              </a:ext>
+            </a:extLst>
+          </a:blip>
+          <a:stretch>
+            <a:fillRect/>
+          </a:stretch>
+        </p:blipFill>
+        <p:spPr>
+          <a:xfrm>
+            <a:off x="423355" y="1203549"/>
+            <a:ext cx="8369285" cy="5190079"/>
+          </a:xfrm>
+          <a:prstGeom prst="rect">
+            <a:avLst/>
+          </a:prstGeom>
+        </p:spPr>
+      </p:pic>
+      <p:sp>
+        <p:nvSpPr>
+          <p:cNvPr id="3" name="Rounded Rectangle 2"/>
+          <p:cNvSpPr/>
+          <p:nvPr/>
+        </p:nvSpPr>
+        <p:spPr>
+          <a:xfrm>
+            <a:off x="1388533" y="1203548"/>
+            <a:ext cx="914400" cy="328927"/>
+          </a:xfrm>
+          <a:prstGeom prst="roundRect">
+            <a:avLst/>
+          </a:prstGeom>
+          <a:noFill/>
+          <a:ln w="28575" cmpd="sng">
+            <a:solidFill>
+              <a:srgbClr val="FF0000"/>
+            </a:solidFill>
+          </a:ln>
+        </p:spPr>
+        <p:style>
+          <a:lnRef idx="1">
+            <a:schemeClr val="accent1"/>
+          </a:lnRef>
+          <a:fillRef idx="3">
+            <a:schemeClr val="accent1"/>
+          </a:fillRef>
+          <a:effectRef idx="2">
+            <a:schemeClr val="accent1"/>
+          </a:effectRef>
+          <a:fontRef idx="minor">
+            <a:schemeClr val="lt1"/>
+          </a:fontRef>
+        </p:style>
+        <p:txBody>
+          <a:bodyPr rtlCol="0" anchor="ctr"/>
+          <a:lstStyle/>
+          <a:p>
+            <a:pPr algn="ctr"/>
+            <a:endParaRPr lang="en-US"/>
+          </a:p>
+        </p:txBody>
+      </p:sp>
+      <p:sp>
+        <p:nvSpPr>
+          <p:cNvPr id="6" name="TextBox 5"/>
+          <p:cNvSpPr txBox="1"/>
+          <p:nvPr/>
+        </p:nvSpPr>
+        <p:spPr>
+          <a:xfrm>
+            <a:off x="2201342" y="1041410"/>
+            <a:ext cx="2946399" cy="461665"/>
+          </a:xfrm>
+          <a:prstGeom prst="rect">
+            <a:avLst/>
+          </a:prstGeom>
+          <a:noFill/>
+        </p:spPr>
+        <p:txBody>
+          <a:bodyPr wrap="square" rtlCol="0">
+            <a:spAutoFit/>
+          </a:bodyPr>
+          <a:lstStyle/>
+          <a:p>
+            <a:pPr algn="ctr"/>
+            <a:r>
+              <a:rPr lang="en-US" sz="2400" b="1" dirty="0" smtClean="0">
+                <a:solidFill>
+                  <a:srgbClr val="FF0000"/>
+                </a:solidFill>
+              </a:rPr>
+              <a:t>Reference name</a:t>
+            </a:r>
+            <a:endParaRPr lang="en-US" sz="2400" b="1" dirty="0">
+              <a:solidFill>
+                <a:srgbClr val="FF0000"/>
+              </a:solidFill>
+            </a:endParaRPr>
+          </a:p>
+        </p:txBody>
+      </p:sp>
+    </p:spTree>
+    <p:extLst>
+      <p:ext uri="{BB962C8B-B14F-4D97-AF65-F5344CB8AC3E}">
+        <p14:creationId xmlns:p14="http://schemas.microsoft.com/office/powerpoint/2010/main" val="3747057279"/>
       </p:ext>
     </p:extLst>
   </p:cSld>

</xml_diff>

<commit_message>
final verison of the slides and instruction for the session
</commit_message>
<xml_diff>
--- a/Mine.pptx
+++ b/Mine.pptx
@@ -1,14 +1,14 @@
 
 <file path=ppt/presentation.xml><?xml version="1.0" encoding="utf-8"?>
-<p:presentation xmlns:a="http://schemas.openxmlformats.org/drawingml/2006/main" xmlns:r="http://schemas.openxmlformats.org/officeDocument/2006/relationships" xmlns:p="http://schemas.openxmlformats.org/presentationml/2006/main" firstSlideNum="0" showSpecialPlsOnTitleSld="0" saveSubsetFonts="1">
+<p:presentation xmlns:a="http://schemas.openxmlformats.org/drawingml/2006/main" xmlns:r="http://schemas.openxmlformats.org/officeDocument/2006/relationships" xmlns:p="http://schemas.openxmlformats.org/presentationml/2006/main" saveSubsetFonts="1">
   <p:sldMasterIdLst>
     <p:sldMasterId id="2147483648" r:id="rId1"/>
   </p:sldMasterIdLst>
   <p:notesMasterIdLst>
-    <p:notesMasterId r:id="rId43"/>
+    <p:notesMasterId r:id="rId47"/>
   </p:notesMasterIdLst>
   <p:handoutMasterIdLst>
-    <p:handoutMasterId r:id="rId44"/>
+    <p:handoutMasterId r:id="rId48"/>
   </p:handoutMasterIdLst>
   <p:sldIdLst>
     <p:sldId id="256" r:id="rId2"/>
@@ -30,16 +30,16 @@
     <p:sldId id="295" r:id="rId18"/>
     <p:sldId id="266" r:id="rId19"/>
     <p:sldId id="276" r:id="rId20"/>
-    <p:sldId id="277" r:id="rId21"/>
-    <p:sldId id="267" r:id="rId22"/>
-    <p:sldId id="273" r:id="rId23"/>
-    <p:sldId id="282" r:id="rId24"/>
-    <p:sldId id="268" r:id="rId25"/>
-    <p:sldId id="279" r:id="rId26"/>
-    <p:sldId id="280" r:id="rId27"/>
-    <p:sldId id="281" r:id="rId28"/>
-    <p:sldId id="278" r:id="rId29"/>
-    <p:sldId id="300" r:id="rId30"/>
+    <p:sldId id="282" r:id="rId21"/>
+    <p:sldId id="268" r:id="rId22"/>
+    <p:sldId id="279" r:id="rId23"/>
+    <p:sldId id="280" r:id="rId24"/>
+    <p:sldId id="281" r:id="rId25"/>
+    <p:sldId id="278" r:id="rId26"/>
+    <p:sldId id="301" r:id="rId27"/>
+    <p:sldId id="300" r:id="rId28"/>
+    <p:sldId id="302" r:id="rId29"/>
+    <p:sldId id="303" r:id="rId30"/>
     <p:sldId id="285" r:id="rId31"/>
     <p:sldId id="286" r:id="rId32"/>
     <p:sldId id="287" r:id="rId33"/>
@@ -52,6 +52,10 @@
     <p:sldId id="292" r:id="rId40"/>
     <p:sldId id="293" r:id="rId41"/>
     <p:sldId id="294" r:id="rId42"/>
+    <p:sldId id="305" r:id="rId43"/>
+    <p:sldId id="304" r:id="rId44"/>
+    <p:sldId id="267" r:id="rId45"/>
+    <p:sldId id="273" r:id="rId46"/>
   </p:sldIdLst>
   <p:sldSz cx="9144000" cy="6858000" type="screen4x3"/>
   <p:notesSz cx="6858000" cy="9144000"/>
@@ -735,7 +739,7 @@
           <a:p>
             <a:fld id="{AC8726AC-9E51-A449-A920-FE40D4E34F33}" type="slidenum">
               <a:rPr lang="en-US" smtClean="0"/>
-              <a:t>0</a:t>
+              <a:t>1</a:t>
             </a:fld>
             <a:endParaRPr lang="en-US"/>
           </a:p>
@@ -819,7 +823,7 @@
           <a:p>
             <a:fld id="{AC8726AC-9E51-A449-A920-FE40D4E34F33}" type="slidenum">
               <a:rPr lang="en-US" smtClean="0"/>
-              <a:t>21</a:t>
+              <a:t>45</a:t>
             </a:fld>
             <a:endParaRPr lang="en-US"/>
           </a:p>
@@ -1028,9 +1032,9 @@
           <a:bodyPr/>
           <a:lstStyle/>
           <a:p>
-            <a:fld id="{C8EFDC90-9F2B-6146-BB03-92C9A3451065}" type="datetime1">
+            <a:fld id="{4AB6F5EE-C689-DE4B-A2C5-8067C968C992}" type="datetime1">
               <a:rPr lang="en-CA" smtClean="0"/>
-              <a:t>2016-11-08</a:t>
+              <a:t>2016-11-09</a:t>
             </a:fld>
             <a:endParaRPr lang="en-US" dirty="0"/>
           </a:p>
@@ -1198,9 +1202,9 @@
           <a:bodyPr/>
           <a:lstStyle/>
           <a:p>
-            <a:fld id="{FA542368-187A-924A-9888-29DC7A6D3419}" type="datetime1">
+            <a:fld id="{5F0E7816-CDA1-9147-BC09-F9D67AF9B7BD}" type="datetime1">
               <a:rPr lang="en-CA" smtClean="0"/>
-              <a:t>2016-11-08</a:t>
+              <a:t>2016-11-09</a:t>
             </a:fld>
             <a:endParaRPr lang="en-US"/>
           </a:p>
@@ -1378,9 +1382,9 @@
           <a:bodyPr/>
           <a:lstStyle/>
           <a:p>
-            <a:fld id="{C3A49A68-9080-DB47-BA55-E856E12EA426}" type="datetime1">
+            <a:fld id="{90E0ECA1-42E3-8F44-820D-0CB5B201654D}" type="datetime1">
               <a:rPr lang="en-CA" smtClean="0"/>
-              <a:t>2016-11-08</a:t>
+              <a:t>2016-11-09</a:t>
             </a:fld>
             <a:endParaRPr lang="en-US"/>
           </a:p>
@@ -1566,9 +1570,9 @@
           <a:bodyPr/>
           <a:lstStyle/>
           <a:p>
-            <a:fld id="{1BC7FD92-931A-6445-9199-043FF0086614}" type="datetime1">
+            <a:fld id="{1E2DEBAA-8D62-1F47-98EB-ECFE11E7B186}" type="datetime1">
               <a:rPr lang="en-CA" smtClean="0"/>
-              <a:t>2016-11-08</a:t>
+              <a:t>2016-11-09</a:t>
             </a:fld>
             <a:endParaRPr lang="en-US"/>
           </a:p>
@@ -1833,9 +1837,9 @@
           <a:bodyPr/>
           <a:lstStyle/>
           <a:p>
-            <a:fld id="{14CD18FB-2929-0641-B819-0560AFFE664A}" type="datetime1">
+            <a:fld id="{AD26F807-D8D6-C545-956D-1D79B63DEC15}" type="datetime1">
               <a:rPr lang="en-CA" smtClean="0"/>
-              <a:t>2016-11-08</a:t>
+              <a:t>2016-11-09</a:t>
             </a:fld>
             <a:endParaRPr lang="en-US"/>
           </a:p>
@@ -2186,9 +2190,9 @@
           <a:bodyPr/>
           <a:lstStyle/>
           <a:p>
-            <a:fld id="{743D4868-5203-8348-9D8B-9CB4193D6848}" type="datetime1">
+            <a:fld id="{CEC54379-C617-5741-BE36-22C8EB1E1EC1}" type="datetime1">
               <a:rPr lang="en-CA" smtClean="0"/>
-              <a:t>2016-11-08</a:t>
+              <a:t>2016-11-09</a:t>
             </a:fld>
             <a:endParaRPr lang="en-US"/>
           </a:p>
@@ -2499,9 +2503,9 @@
           <a:bodyPr/>
           <a:lstStyle/>
           <a:p>
-            <a:fld id="{EDCA6A03-39C5-294F-A0D4-4D668BEF0B85}" type="datetime1">
+            <a:fld id="{9CE9307B-13AC-5D4F-A1B3-9E5512947C5B}" type="datetime1">
               <a:rPr lang="en-CA" smtClean="0"/>
-              <a:t>2016-11-08</a:t>
+              <a:t>2016-11-09</a:t>
             </a:fld>
             <a:endParaRPr lang="en-US"/>
           </a:p>
@@ -2731,9 +2735,9 @@
           <a:bodyPr/>
           <a:lstStyle/>
           <a:p>
-            <a:fld id="{017D5D02-FA38-794C-96CD-0F4AA63956B8}" type="datetime1">
+            <a:fld id="{0597B4DC-2A19-C84F-8EB2-CF9A89C04444}" type="datetime1">
               <a:rPr lang="en-CA" smtClean="0"/>
-              <a:t>2016-11-08</a:t>
+              <a:t>2016-11-09</a:t>
             </a:fld>
             <a:endParaRPr lang="en-US"/>
           </a:p>
@@ -2826,9 +2830,9 @@
           <a:bodyPr/>
           <a:lstStyle/>
           <a:p>
-            <a:fld id="{1BF754EE-688F-2048-ACE8-D397EEA3139F}" type="datetime1">
+            <a:fld id="{D2DB61D6-8DFA-404A-AB74-C9E787C6976B}" type="datetime1">
               <a:rPr lang="en-CA" smtClean="0"/>
-              <a:t>2016-11-08</a:t>
+              <a:t>2016-11-09</a:t>
             </a:fld>
             <a:endParaRPr lang="en-US"/>
           </a:p>
@@ -3119,9 +3123,9 @@
           <a:bodyPr/>
           <a:lstStyle/>
           <a:p>
-            <a:fld id="{A66D6877-7EDB-9B49-BC75-BA9EEBFF249A}" type="datetime1">
+            <a:fld id="{1B1A4E6A-0DC7-5047-BDEF-6070D12B5C80}" type="datetime1">
               <a:rPr lang="en-CA" smtClean="0"/>
-              <a:t>2016-11-08</a:t>
+              <a:t>2016-11-09</a:t>
             </a:fld>
             <a:endParaRPr lang="en-US"/>
           </a:p>
@@ -3393,9 +3397,9 @@
           <a:bodyPr/>
           <a:lstStyle/>
           <a:p>
-            <a:fld id="{ADFC560E-77D9-424B-8F77-F85BD9379994}" type="datetime1">
+            <a:fld id="{2CD36CA6-96F5-5346-9B7E-B09F447B3606}" type="datetime1">
               <a:rPr lang="en-CA" smtClean="0"/>
-              <a:t>2016-11-08</a:t>
+              <a:t>2016-11-09</a:t>
             </a:fld>
             <a:endParaRPr lang="en-US"/>
           </a:p>
@@ -3608,9 +3612,9 @@
             </a:lvl1pPr>
           </a:lstStyle>
           <a:p>
-            <a:fld id="{F42415CA-4B37-2141-AB10-356D06213458}" type="datetime1">
+            <a:fld id="{9AFE54E6-BCF4-9B4E-8EA1-83C124BD4A8D}" type="datetime1">
               <a:rPr lang="en-CA" smtClean="0"/>
-              <a:t>2016-11-08</a:t>
+              <a:t>2016-11-09</a:t>
             </a:fld>
             <a:endParaRPr lang="en-US" dirty="0"/>
           </a:p>
@@ -4216,6 +4220,30 @@
           </a:p>
         </p:txBody>
       </p:sp>
+      <p:sp>
+        <p:nvSpPr>
+          <p:cNvPr id="4" name="Slide Number Placeholder 3"/>
+          <p:cNvSpPr>
+            <a:spLocks noGrp="1"/>
+          </p:cNvSpPr>
+          <p:nvPr>
+            <p:ph type="sldNum" sz="quarter" idx="11"/>
+          </p:nvPr>
+        </p:nvSpPr>
+        <p:spPr/>
+        <p:txBody>
+          <a:bodyPr/>
+          <a:lstStyle/>
+          <a:p>
+            <a:fld id="{BA9B540C-44DA-4F69-89C9-7C84606640D3}" type="slidenum">
+              <a:rPr lang="en-US" smtClean="0"/>
+              <a:pPr/>
+              <a:t>1</a:t>
+            </a:fld>
+            <a:endParaRPr lang="en-US" dirty="0"/>
+          </a:p>
+        </p:txBody>
+      </p:sp>
     </p:spTree>
     <p:extLst>
       <p:ext uri="{BB962C8B-B14F-4D97-AF65-F5344CB8AC3E}">
@@ -4431,30 +4459,6 @@
       </p:sp>
       <p:sp>
         <p:nvSpPr>
-          <p:cNvPr id="6" name="Slide Number Placeholder 5"/>
-          <p:cNvSpPr>
-            <a:spLocks noGrp="1"/>
-          </p:cNvSpPr>
-          <p:nvPr>
-            <p:ph type="sldNum" sz="quarter" idx="12"/>
-          </p:nvPr>
-        </p:nvSpPr>
-        <p:spPr/>
-        <p:txBody>
-          <a:bodyPr/>
-          <a:lstStyle/>
-          <a:p>
-            <a:fld id="{BA9B540C-44DA-4F69-89C9-7C84606640D3}" type="slidenum">
-              <a:rPr lang="en-US" smtClean="0"/>
-              <a:pPr/>
-              <a:t>9</a:t>
-            </a:fld>
-            <a:endParaRPr lang="en-US"/>
-          </a:p>
-        </p:txBody>
-      </p:sp>
-      <p:sp>
-        <p:nvSpPr>
           <p:cNvPr id="7" name="Rectangle 6"/>
           <p:cNvSpPr/>
           <p:nvPr/>
@@ -4533,6 +4537,30 @@
                 <a:srgbClr val="C70016"/>
               </a:solidFill>
             </a:endParaRPr>
+          </a:p>
+        </p:txBody>
+      </p:sp>
+      <p:sp>
+        <p:nvSpPr>
+          <p:cNvPr id="4" name="Slide Number Placeholder 3"/>
+          <p:cNvSpPr>
+            <a:spLocks noGrp="1"/>
+          </p:cNvSpPr>
+          <p:nvPr>
+            <p:ph type="sldNum" sz="quarter" idx="12"/>
+          </p:nvPr>
+        </p:nvSpPr>
+        <p:spPr/>
+        <p:txBody>
+          <a:bodyPr/>
+          <a:lstStyle/>
+          <a:p>
+            <a:fld id="{BA9B540C-44DA-4F69-89C9-7C84606640D3}" type="slidenum">
+              <a:rPr lang="en-US" smtClean="0"/>
+              <a:pPr/>
+              <a:t>10</a:t>
+            </a:fld>
+            <a:endParaRPr lang="en-US"/>
           </a:p>
         </p:txBody>
       </p:sp>
@@ -4772,7 +4800,7 @@
       </p:sp>
       <p:sp>
         <p:nvSpPr>
-          <p:cNvPr id="7" name="Slide Number Placeholder 6"/>
+          <p:cNvPr id="2" name="Slide Number Placeholder 1"/>
           <p:cNvSpPr>
             <a:spLocks noGrp="1"/>
           </p:cNvSpPr>
@@ -4788,7 +4816,7 @@
             <a:fld id="{BA9B540C-44DA-4F69-89C9-7C84606640D3}" type="slidenum">
               <a:rPr lang="en-US" smtClean="0"/>
               <a:pPr/>
-              <a:t>10</a:t>
+              <a:t>11</a:t>
             </a:fld>
             <a:endParaRPr lang="en-US"/>
           </a:p>
@@ -4861,7 +4889,7 @@
       </p:sp>
       <p:sp>
         <p:nvSpPr>
-          <p:cNvPr id="6" name="Slide Number Placeholder 5"/>
+          <p:cNvPr id="3" name="Slide Number Placeholder 2"/>
           <p:cNvSpPr>
             <a:spLocks noGrp="1"/>
           </p:cNvSpPr>
@@ -4877,7 +4905,7 @@
             <a:fld id="{BA9B540C-44DA-4F69-89C9-7C84606640D3}" type="slidenum">
               <a:rPr lang="en-US" smtClean="0"/>
               <a:pPr/>
-              <a:t>11</a:t>
+              <a:t>12</a:t>
             </a:fld>
             <a:endParaRPr lang="en-US"/>
           </a:p>
@@ -5046,7 +5074,7 @@
       </p:pic>
       <p:sp>
         <p:nvSpPr>
-          <p:cNvPr id="5" name="Slide Number Placeholder 4"/>
+          <p:cNvPr id="6" name="Slide Number Placeholder 5"/>
           <p:cNvSpPr>
             <a:spLocks noGrp="1"/>
           </p:cNvSpPr>
@@ -5062,7 +5090,7 @@
             <a:fld id="{BA9B540C-44DA-4F69-89C9-7C84606640D3}" type="slidenum">
               <a:rPr lang="en-US" smtClean="0"/>
               <a:pPr/>
-              <a:t>12</a:t>
+              <a:t>13</a:t>
             </a:fld>
             <a:endParaRPr lang="en-US"/>
           </a:p>
@@ -5304,7 +5332,7 @@
       </p:pic>
       <p:sp>
         <p:nvSpPr>
-          <p:cNvPr id="6" name="Slide Number Placeholder 5"/>
+          <p:cNvPr id="7" name="Slide Number Placeholder 6"/>
           <p:cNvSpPr>
             <a:spLocks noGrp="1"/>
           </p:cNvSpPr>
@@ -5320,7 +5348,7 @@
             <a:fld id="{BA9B540C-44DA-4F69-89C9-7C84606640D3}" type="slidenum">
               <a:rPr lang="en-US" smtClean="0"/>
               <a:pPr/>
-              <a:t>13</a:t>
+              <a:t>14</a:t>
             </a:fld>
             <a:endParaRPr lang="en-US"/>
           </a:p>
@@ -5505,7 +5533,7 @@
       </p:sp>
       <p:sp>
         <p:nvSpPr>
-          <p:cNvPr id="6" name="Slide Number Placeholder 5"/>
+          <p:cNvPr id="4" name="Slide Number Placeholder 3"/>
           <p:cNvSpPr>
             <a:spLocks noGrp="1"/>
           </p:cNvSpPr>
@@ -5521,7 +5549,7 @@
             <a:fld id="{BA9B540C-44DA-4F69-89C9-7C84606640D3}" type="slidenum">
               <a:rPr lang="en-US" smtClean="0"/>
               <a:pPr/>
-              <a:t>14</a:t>
+              <a:t>15</a:t>
             </a:fld>
             <a:endParaRPr lang="en-US"/>
           </a:p>
@@ -5704,30 +5732,6 @@
           </a:p>
         </p:txBody>
       </p:sp>
-      <p:sp>
-        <p:nvSpPr>
-          <p:cNvPr id="6" name="Slide Number Placeholder 5"/>
-          <p:cNvSpPr>
-            <a:spLocks noGrp="1"/>
-          </p:cNvSpPr>
-          <p:nvPr>
-            <p:ph type="sldNum" sz="quarter" idx="12"/>
-          </p:nvPr>
-        </p:nvSpPr>
-        <p:spPr/>
-        <p:txBody>
-          <a:bodyPr/>
-          <a:lstStyle/>
-          <a:p>
-            <a:fld id="{BA9B540C-44DA-4F69-89C9-7C84606640D3}" type="slidenum">
-              <a:rPr lang="en-US" smtClean="0"/>
-              <a:pPr/>
-              <a:t>15</a:t>
-            </a:fld>
-            <a:endParaRPr lang="en-US"/>
-          </a:p>
-        </p:txBody>
-      </p:sp>
       <p:pic>
         <p:nvPicPr>
           <p:cNvPr id="7" name="Picture 6" descr="Screen Shot 2016-11-08 at 3.06.55 PM.png"/>
@@ -5793,6 +5797,30 @@
           <a:lstStyle/>
           <a:p>
             <a:pPr algn="ctr"/>
+            <a:endParaRPr lang="en-US"/>
+          </a:p>
+        </p:txBody>
+      </p:sp>
+      <p:sp>
+        <p:nvSpPr>
+          <p:cNvPr id="5" name="Slide Number Placeholder 4"/>
+          <p:cNvSpPr>
+            <a:spLocks noGrp="1"/>
+          </p:cNvSpPr>
+          <p:nvPr>
+            <p:ph type="sldNum" sz="quarter" idx="12"/>
+          </p:nvPr>
+        </p:nvSpPr>
+        <p:spPr/>
+        <p:txBody>
+          <a:bodyPr/>
+          <a:lstStyle/>
+          <a:p>
+            <a:fld id="{BA9B540C-44DA-4F69-89C9-7C84606640D3}" type="slidenum">
+              <a:rPr lang="en-US" smtClean="0"/>
+              <a:pPr/>
+              <a:t>16</a:t>
+            </a:fld>
             <a:endParaRPr lang="en-US"/>
           </a:p>
         </p:txBody>
@@ -5993,7 +6021,7 @@
       </p:sp>
       <p:sp>
         <p:nvSpPr>
-          <p:cNvPr id="5" name="Slide Number Placeholder 4"/>
+          <p:cNvPr id="7" name="Slide Number Placeholder 6"/>
           <p:cNvSpPr>
             <a:spLocks noGrp="1"/>
           </p:cNvSpPr>
@@ -6009,7 +6037,7 @@
             <a:fld id="{BA9B540C-44DA-4F69-89C9-7C84606640D3}" type="slidenum">
               <a:rPr lang="en-US" smtClean="0"/>
               <a:pPr/>
-              <a:t>16</a:t>
+              <a:t>17</a:t>
             </a:fld>
             <a:endParaRPr lang="en-US"/>
           </a:p>
@@ -6225,30 +6253,6 @@
               <a:t>Images</a:t>
             </a:r>
             <a:endParaRPr lang="en-US" dirty="0"/>
-          </a:p>
-        </p:txBody>
-      </p:sp>
-      <p:sp>
-        <p:nvSpPr>
-          <p:cNvPr id="5" name="Slide Number Placeholder 4"/>
-          <p:cNvSpPr>
-            <a:spLocks noGrp="1"/>
-          </p:cNvSpPr>
-          <p:nvPr>
-            <p:ph type="sldNum" sz="quarter" idx="12"/>
-          </p:nvPr>
-        </p:nvSpPr>
-        <p:spPr/>
-        <p:txBody>
-          <a:bodyPr/>
-          <a:lstStyle/>
-          <a:p>
-            <a:fld id="{BA9B540C-44DA-4F69-89C9-7C84606640D3}" type="slidenum">
-              <a:rPr lang="en-US" smtClean="0"/>
-              <a:pPr/>
-              <a:t>17</a:t>
-            </a:fld>
-            <a:endParaRPr lang="en-US"/>
           </a:p>
         </p:txBody>
       </p:sp>
@@ -6410,6 +6414,30 @@
           </a:fontRef>
         </p:style>
       </p:cxnSp>
+      <p:sp>
+        <p:nvSpPr>
+          <p:cNvPr id="11" name="Slide Number Placeholder 10"/>
+          <p:cNvSpPr>
+            <a:spLocks noGrp="1"/>
+          </p:cNvSpPr>
+          <p:nvPr>
+            <p:ph type="sldNum" sz="quarter" idx="12"/>
+          </p:nvPr>
+        </p:nvSpPr>
+        <p:spPr/>
+        <p:txBody>
+          <a:bodyPr/>
+          <a:lstStyle/>
+          <a:p>
+            <a:fld id="{BA9B540C-44DA-4F69-89C9-7C84606640D3}" type="slidenum">
+              <a:rPr lang="en-US" smtClean="0"/>
+              <a:pPr/>
+              <a:t>18</a:t>
+            </a:fld>
+            <a:endParaRPr lang="en-US"/>
+          </a:p>
+        </p:txBody>
+      </p:sp>
     </p:spTree>
     <p:extLst>
       <p:ext uri="{BB962C8B-B14F-4D97-AF65-F5344CB8AC3E}">
@@ -6447,30 +6475,6 @@
           <a:chExt cx="0" cy="0"/>
         </a:xfrm>
       </p:grpSpPr>
-      <p:sp>
-        <p:nvSpPr>
-          <p:cNvPr id="5" name="Slide Number Placeholder 4"/>
-          <p:cNvSpPr>
-            <a:spLocks noGrp="1"/>
-          </p:cNvSpPr>
-          <p:nvPr>
-            <p:ph type="sldNum" sz="quarter" idx="12"/>
-          </p:nvPr>
-        </p:nvSpPr>
-        <p:spPr/>
-        <p:txBody>
-          <a:bodyPr/>
-          <a:lstStyle/>
-          <a:p>
-            <a:fld id="{BA9B540C-44DA-4F69-89C9-7C84606640D3}" type="slidenum">
-              <a:rPr lang="en-US" smtClean="0"/>
-              <a:pPr/>
-              <a:t>18</a:t>
-            </a:fld>
-            <a:endParaRPr lang="en-US"/>
-          </a:p>
-        </p:txBody>
-      </p:sp>
       <p:pic>
         <p:nvPicPr>
           <p:cNvPr id="2" name="Picture 1" descr="test.jpg"/>
@@ -6644,6 +6648,30 @@
               <a:rPr lang="en-US" dirty="0"/>
               <a:t>/</a:t>
             </a:r>
+          </a:p>
+        </p:txBody>
+      </p:sp>
+      <p:sp>
+        <p:nvSpPr>
+          <p:cNvPr id="3" name="Slide Number Placeholder 2"/>
+          <p:cNvSpPr>
+            <a:spLocks noGrp="1"/>
+          </p:cNvSpPr>
+          <p:nvPr>
+            <p:ph type="sldNum" sz="quarter" idx="12"/>
+          </p:nvPr>
+        </p:nvSpPr>
+        <p:spPr/>
+        <p:txBody>
+          <a:bodyPr/>
+          <a:lstStyle/>
+          <a:p>
+            <a:fld id="{BA9B540C-44DA-4F69-89C9-7C84606640D3}" type="slidenum">
+              <a:rPr lang="en-US" smtClean="0"/>
+              <a:pPr/>
+              <a:t>19</a:t>
+            </a:fld>
+            <a:endParaRPr lang="en-US"/>
           </a:p>
         </p:txBody>
       </p:sp>
@@ -6869,7 +6897,7 @@
       </p:sp>
       <p:sp>
         <p:nvSpPr>
-          <p:cNvPr id="5" name="Slide Number Placeholder 4"/>
+          <p:cNvPr id="2" name="Slide Number Placeholder 1"/>
           <p:cNvSpPr>
             <a:spLocks noGrp="1"/>
           </p:cNvSpPr>
@@ -6885,7 +6913,7 @@
             <a:fld id="{BA9B540C-44DA-4F69-89C9-7C84606640D3}" type="slidenum">
               <a:rPr lang="en-US" smtClean="0"/>
               <a:pPr/>
-              <a:t>1</a:t>
+              <a:t>2</a:t>
             </a:fld>
             <a:endParaRPr lang="en-US"/>
           </a:p>
@@ -6930,6 +6958,45 @@
       </p:grpSpPr>
       <p:sp>
         <p:nvSpPr>
+          <p:cNvPr id="3" name="Content Placeholder 2"/>
+          <p:cNvSpPr>
+            <a:spLocks noGrp="1"/>
+          </p:cNvSpPr>
+          <p:nvPr>
+            <p:ph idx="1"/>
+          </p:nvPr>
+        </p:nvSpPr>
+        <p:spPr/>
+        <p:txBody>
+          <a:bodyPr/>
+          <a:lstStyle/>
+          <a:p>
+            <a:r>
+              <a:rPr lang="en-US" dirty="0"/>
+              <a:t>\usepackage{</a:t>
+            </a:r>
+            <a:r>
+              <a:rPr lang="en-US" dirty="0" err="1"/>
+              <a:t>amsmath</a:t>
+            </a:r>
+            <a:r>
+              <a:rPr lang="en-US" dirty="0" smtClean="0"/>
+              <a:t>} for math equations</a:t>
+            </a:r>
+          </a:p>
+          <a:p>
+            <a:endParaRPr lang="en-US" dirty="0"/>
+          </a:p>
+          <a:p>
+            <a:pPr marL="0" indent="0">
+              <a:buNone/>
+            </a:pPr>
+            <a:endParaRPr lang="en-US" dirty="0"/>
+          </a:p>
+        </p:txBody>
+      </p:sp>
+      <p:sp>
+        <p:nvSpPr>
           <p:cNvPr id="4" name="Title 1"/>
           <p:cNvSpPr>
             <a:spLocks noGrp="1"/>
@@ -6950,7 +7017,7 @@
           <a:p>
             <a:r>
               <a:rPr lang="en-US" dirty="0" smtClean="0"/>
-              <a:t>Tables</a:t>
+              <a:t>Equations</a:t>
             </a:r>
             <a:endParaRPr lang="en-US" dirty="0"/>
           </a:p>
@@ -6958,7 +7025,7 @@
       </p:sp>
       <p:sp>
         <p:nvSpPr>
-          <p:cNvPr id="5" name="Slide Number Placeholder 4"/>
+          <p:cNvPr id="2" name="Slide Number Placeholder 1"/>
           <p:cNvSpPr>
             <a:spLocks noGrp="1"/>
           </p:cNvSpPr>
@@ -6974,7 +7041,7 @@
             <a:fld id="{BA9B540C-44DA-4F69-89C9-7C84606640D3}" type="slidenum">
               <a:rPr lang="en-US" smtClean="0"/>
               <a:pPr/>
-              <a:t>19</a:t>
+              <a:t>20</a:t>
             </a:fld>
             <a:endParaRPr lang="en-US"/>
           </a:p>
@@ -6983,7 +7050,7 @@
     </p:spTree>
     <p:extLst>
       <p:ext uri="{BB962C8B-B14F-4D97-AF65-F5344CB8AC3E}">
-        <p14:creationId xmlns:p14="http://schemas.microsoft.com/office/powerpoint/2010/main" val="1108457661"/>
+        <p14:creationId xmlns:p14="http://schemas.microsoft.com/office/powerpoint/2010/main" val="1470340825"/>
       </p:ext>
     </p:extLst>
   </p:cSld>
@@ -7027,139 +7094,57 @@
             <p:ph idx="1"/>
           </p:nvPr>
         </p:nvSpPr>
-        <p:spPr>
-          <a:xfrm>
-            <a:off x="457200" y="1092209"/>
-            <a:ext cx="8229600" cy="5376323"/>
-          </a:xfrm>
-        </p:spPr>
-        <p:txBody>
-          <a:bodyPr>
-            <a:normAutofit fontScale="77500" lnSpcReduction="20000"/>
-          </a:bodyPr>
-          <a:lstStyle/>
-          <a:p>
-            <a:pPr marL="0" indent="0">
-              <a:buNone/>
-            </a:pPr>
+        <p:spPr/>
+        <p:txBody>
+          <a:bodyPr/>
+          <a:lstStyle/>
+          <a:p>
             <a:r>
               <a:rPr lang="en-US" dirty="0"/>
-              <a:t>\begin{table}[h!]</a:t>
-            </a:r>
-          </a:p>
-          <a:p>
-            <a:pPr marL="0" indent="0">
-              <a:buNone/>
-            </a:pPr>
-            <a:r>
-              <a:rPr lang="en-US" dirty="0"/>
-              <a:t>\caption{Title} % title of Table</a:t>
-            </a:r>
-          </a:p>
-          <a:p>
-            <a:pPr marL="0" indent="0">
-              <a:buNone/>
-            </a:pPr>
-            <a:r>
-              <a:rPr lang="en-US" dirty="0"/>
-              <a:t>\</a:t>
-            </a:r>
-            <a:r>
-              <a:rPr lang="en-US" dirty="0" smtClean="0"/>
-              <a:t>centering       </a:t>
-            </a:r>
-            <a:r>
-              <a:rPr lang="en-US" dirty="0"/>
-              <a:t>% used for centering table</a:t>
-            </a:r>
-          </a:p>
-          <a:p>
-            <a:pPr marL="0" indent="0">
-              <a:buNone/>
-            </a:pPr>
-            <a:r>
-              <a:rPr lang="en-US" dirty="0"/>
-              <a:t>\begin{tabular}{| c | c | c | c | } % centered columns (4 columns)</a:t>
-            </a:r>
-          </a:p>
-          <a:p>
-            <a:pPr marL="0" indent="0">
-              <a:buNone/>
-            </a:pPr>
-            <a:r>
-              <a:rPr lang="en-US" dirty="0"/>
-              <a:t>\</a:t>
+              <a:t>\usepackage{</a:t>
             </a:r>
             <a:r>
               <a:rPr lang="en-US" dirty="0" err="1"/>
-              <a:t>hline</a:t>
-            </a:r>
-            <a:r>
-              <a:rPr lang="en-US" dirty="0"/>
-              <a:t> %inserts double horizontal lines</a:t>
-            </a:r>
-          </a:p>
-          <a:p>
-            <a:pPr marL="0" indent="0">
-              <a:buNone/>
-            </a:pPr>
-            <a:r>
-              <a:rPr lang="en-US" dirty="0"/>
-              <a:t> &amp;  Column 1 &amp;  Column 2 &amp; Column 3  \\ [0.5ex] % inserts table</a:t>
-            </a:r>
-          </a:p>
-          <a:p>
-            <a:pPr marL="0" indent="0">
-              <a:buNone/>
-            </a:pPr>
+              <a:t>amsmath</a:t>
+            </a:r>
+            <a:r>
+              <a:rPr lang="en-US" dirty="0" smtClean="0"/>
+              <a:t>} for math equations</a:t>
+            </a:r>
+          </a:p>
+          <a:p>
+            <a:endParaRPr lang="en-US" dirty="0" smtClean="0"/>
+          </a:p>
+          <a:p>
+            <a:pPr marL="0" indent="0">
+              <a:buNone/>
+            </a:pPr>
+            <a:r>
+              <a:rPr lang="en-US" b="1" dirty="0">
+                <a:solidFill>
+                  <a:schemeClr val="tx2">
+                    <a:lumMod val="75000"/>
+                  </a:schemeClr>
+                </a:solidFill>
+              </a:rPr>
+              <a:t>Example</a:t>
+            </a:r>
+            <a:r>
+              <a:rPr lang="en-US" b="1" dirty="0" smtClean="0">
+                <a:solidFill>
+                  <a:schemeClr val="tx2">
+                    <a:lumMod val="75000"/>
+                  </a:schemeClr>
+                </a:solidFill>
+              </a:rPr>
+              <a:t>:</a:t>
+            </a:r>
             <a:endParaRPr lang="en-US" dirty="0"/>
           </a:p>
           <a:p>
-            <a:pPr marL="0" indent="0">
-              <a:buNone/>
-            </a:pPr>
-            <a:r>
-              <a:rPr lang="en-US" dirty="0"/>
-              <a:t>%heading</a:t>
-            </a:r>
-          </a:p>
-          <a:p>
-            <a:pPr marL="0" indent="0">
-              <a:buNone/>
-            </a:pPr>
-            <a:r>
-              <a:rPr lang="en-US" dirty="0"/>
-              <a:t>\</a:t>
-            </a:r>
-            <a:r>
-              <a:rPr lang="en-US" dirty="0" err="1"/>
-              <a:t>hline</a:t>
-            </a:r>
-            <a:r>
-              <a:rPr lang="en-US" dirty="0"/>
-              <a:t> % inserts single horizontal line</a:t>
-            </a:r>
-          </a:p>
-          <a:p>
-            <a:pPr marL="0" indent="0">
-              <a:buNone/>
-            </a:pPr>
-            <a:r>
-              <a:rPr lang="en-US" dirty="0"/>
-              <a:t>                   </a:t>
-            </a:r>
-          </a:p>
-          <a:p>
-            <a:pPr marL="0" indent="0">
-              <a:buNone/>
-            </a:pPr>
-            <a:r>
-              <a:rPr lang="en-US" dirty="0"/>
-              <a:t>Row 1 &amp; 1 &amp;  2  &amp;  3   \\ \</a:t>
-            </a:r>
-            <a:r>
-              <a:rPr lang="en-US" dirty="0" err="1"/>
-              <a:t>hline</a:t>
+            <a:r>
+              <a:rPr lang="en-US" dirty="0" smtClean="0"/>
+              <a:t>\begin{equation}</a:t>
             </a:r>
             <a:endParaRPr lang="en-US" dirty="0"/>
           </a:p>
@@ -7168,67 +7153,38 @@
               <a:buNone/>
             </a:pPr>
             <a:r>
-              <a:rPr lang="en-US" dirty="0"/>
-              <a:t>Row 2 &amp; 4 &amp;  5  &amp;  6   \\ \</a:t>
-            </a:r>
-            <a:r>
-              <a:rPr lang="en-US" dirty="0" err="1"/>
-              <a:t>hline</a:t>
+              <a:rPr lang="en-US" dirty="0" smtClean="0"/>
+              <a:t>	f(x) = \</a:t>
+            </a:r>
+            <a:r>
+              <a:rPr lang="en-US" dirty="0" err="1" smtClean="0"/>
+              <a:t>frac</a:t>
+            </a:r>
+            <a:r>
+              <a:rPr lang="en-US" dirty="0" smtClean="0"/>
+              <a:t>{x^2 + 1}{5} \</a:t>
+            </a:r>
+            <a:r>
+              <a:rPr lang="en-US" dirty="0" err="1" smtClean="0"/>
+              <a:t>int</a:t>
+            </a:r>
+            <a:r>
+              <a:rPr lang="en-US" dirty="0" smtClean="0"/>
+              <a:t> x dx</a:t>
             </a:r>
             <a:endParaRPr lang="en-US" dirty="0"/>
           </a:p>
           <a:p>
-            <a:pPr marL="0" indent="0">
-              <a:buNone/>
-            </a:pPr>
-            <a:r>
-              <a:rPr lang="en-US" dirty="0"/>
-              <a:t>Ro2 3 &amp; 7 &amp;  8  &amp;   9  \\%[1ex] %adds vertical space</a:t>
-            </a:r>
-          </a:p>
-          <a:p>
-            <a:pPr marL="0" indent="0">
-              <a:buNone/>
-            </a:pPr>
-            <a:r>
-              <a:rPr lang="en-US" dirty="0"/>
-              <a:t>\</a:t>
-            </a:r>
-            <a:r>
-              <a:rPr lang="en-US" dirty="0" err="1"/>
-              <a:t>hline</a:t>
-            </a:r>
-            <a:r>
-              <a:rPr lang="en-US" dirty="0"/>
-              <a:t> %inserts single line</a:t>
-            </a:r>
-          </a:p>
-          <a:p>
-            <a:pPr marL="0" indent="0">
-              <a:buNone/>
-            </a:pPr>
-            <a:r>
-              <a:rPr lang="en-US" dirty="0"/>
-              <a:t>\end{tabular}</a:t>
-            </a:r>
-          </a:p>
-          <a:p>
-            <a:pPr marL="0" indent="0">
-              <a:buNone/>
-            </a:pPr>
-            <a:r>
-              <a:rPr lang="en-US" dirty="0"/>
-              <a:t>\label{table:table1} % is used to refer this table in the text</a:t>
-            </a:r>
-          </a:p>
-          <a:p>
-            <a:pPr marL="0" indent="0">
-              <a:buNone/>
-            </a:pPr>
-            <a:r>
-              <a:rPr lang="en-US" dirty="0"/>
-              <a:t>\end{table}</a:t>
-            </a:r>
+            <a:r>
+              <a:rPr lang="en-US" dirty="0" smtClean="0"/>
+              <a:t>\end{equation}</a:t>
+            </a:r>
+          </a:p>
+          <a:p>
+            <a:pPr marL="0" indent="0">
+              <a:buNone/>
+            </a:pPr>
+            <a:endParaRPr lang="en-US" dirty="0"/>
           </a:p>
         </p:txBody>
       </p:sp>
@@ -7254,7 +7210,7 @@
           <a:p>
             <a:r>
               <a:rPr lang="en-US" dirty="0" smtClean="0"/>
-              <a:t>Tables</a:t>
+              <a:t>Equations</a:t>
             </a:r>
             <a:endParaRPr lang="en-US" dirty="0"/>
           </a:p>
@@ -7262,7 +7218,7 @@
       </p:sp>
       <p:sp>
         <p:nvSpPr>
-          <p:cNvPr id="5" name="Slide Number Placeholder 4"/>
+          <p:cNvPr id="2" name="Slide Number Placeholder 1"/>
           <p:cNvSpPr>
             <a:spLocks noGrp="1"/>
           </p:cNvSpPr>
@@ -7278,7 +7234,7 @@
             <a:fld id="{BA9B540C-44DA-4F69-89C9-7C84606640D3}" type="slidenum">
               <a:rPr lang="en-US" smtClean="0"/>
               <a:pPr/>
-              <a:t>20</a:t>
+              <a:t>21</a:t>
             </a:fld>
             <a:endParaRPr lang="en-US"/>
           </a:p>
@@ -7287,7 +7243,7 @@
     </p:spTree>
     <p:extLst>
       <p:ext uri="{BB962C8B-B14F-4D97-AF65-F5344CB8AC3E}">
-        <p14:creationId xmlns:p14="http://schemas.microsoft.com/office/powerpoint/2010/main" val="2862636576"/>
+        <p14:creationId xmlns:p14="http://schemas.microsoft.com/office/powerpoint/2010/main" val="1993635300"/>
       </p:ext>
     </p:extLst>
   </p:cSld>
@@ -7323,6 +7279,110 @@
       </p:grpSpPr>
       <p:sp>
         <p:nvSpPr>
+          <p:cNvPr id="3" name="Content Placeholder 2"/>
+          <p:cNvSpPr>
+            <a:spLocks noGrp="1"/>
+          </p:cNvSpPr>
+          <p:nvPr>
+            <p:ph idx="1"/>
+          </p:nvPr>
+        </p:nvSpPr>
+        <p:spPr/>
+        <p:txBody>
+          <a:bodyPr/>
+          <a:lstStyle/>
+          <a:p>
+            <a:r>
+              <a:rPr lang="en-US" dirty="0"/>
+              <a:t>\usepackage{</a:t>
+            </a:r>
+            <a:r>
+              <a:rPr lang="en-US" dirty="0" err="1"/>
+              <a:t>amsmath</a:t>
+            </a:r>
+            <a:r>
+              <a:rPr lang="en-US" dirty="0" smtClean="0"/>
+              <a:t>} for math equations</a:t>
+            </a:r>
+          </a:p>
+          <a:p>
+            <a:endParaRPr lang="en-US" dirty="0" smtClean="0"/>
+          </a:p>
+          <a:p>
+            <a:pPr marL="0" indent="0">
+              <a:buNone/>
+            </a:pPr>
+            <a:r>
+              <a:rPr lang="en-US" b="1" dirty="0">
+                <a:solidFill>
+                  <a:schemeClr val="tx2">
+                    <a:lumMod val="75000"/>
+                  </a:schemeClr>
+                </a:solidFill>
+              </a:rPr>
+              <a:t>Example</a:t>
+            </a:r>
+            <a:r>
+              <a:rPr lang="en-US" b="1" dirty="0" smtClean="0">
+                <a:solidFill>
+                  <a:schemeClr val="tx2">
+                    <a:lumMod val="75000"/>
+                  </a:schemeClr>
+                </a:solidFill>
+              </a:rPr>
+              <a:t>:</a:t>
+            </a:r>
+            <a:endParaRPr lang="en-US" dirty="0"/>
+          </a:p>
+          <a:p>
+            <a:r>
+              <a:rPr lang="en-US" dirty="0" smtClean="0"/>
+              <a:t>\begin{equation}</a:t>
+            </a:r>
+            <a:endParaRPr lang="en-US" dirty="0"/>
+          </a:p>
+          <a:p>
+            <a:pPr marL="0" indent="0">
+              <a:buNone/>
+            </a:pPr>
+            <a:r>
+              <a:rPr lang="en-US" dirty="0" smtClean="0"/>
+              <a:t>	f(x) = \</a:t>
+            </a:r>
+            <a:r>
+              <a:rPr lang="en-US" dirty="0" err="1" smtClean="0"/>
+              <a:t>frac</a:t>
+            </a:r>
+            <a:r>
+              <a:rPr lang="en-US" dirty="0" smtClean="0"/>
+              <a:t>{x^2 + 1}{5} \</a:t>
+            </a:r>
+            <a:r>
+              <a:rPr lang="en-US" dirty="0" err="1" smtClean="0"/>
+              <a:t>int</a:t>
+            </a:r>
+            <a:r>
+              <a:rPr lang="en-US" dirty="0" smtClean="0"/>
+              <a:t> x dx</a:t>
+            </a:r>
+            <a:endParaRPr lang="en-US" dirty="0"/>
+          </a:p>
+          <a:p>
+            <a:r>
+              <a:rPr lang="en-US" dirty="0" smtClean="0"/>
+              <a:t>\end{equation}</a:t>
+            </a:r>
+          </a:p>
+          <a:p>
+            <a:pPr marL="0" indent="0">
+              <a:buNone/>
+            </a:pPr>
+            <a:endParaRPr lang="en-US" dirty="0"/>
+          </a:p>
+        </p:txBody>
+      </p:sp>
+      <p:sp>
+        <p:nvSpPr>
           <p:cNvPr id="4" name="Title 1"/>
           <p:cNvSpPr>
             <a:spLocks noGrp="1"/>
@@ -7343,7 +7403,7 @@
           <a:p>
             <a:r>
               <a:rPr lang="en-US" dirty="0" smtClean="0"/>
-              <a:t>Tables</a:t>
+              <a:t>Equations</a:t>
             </a:r>
             <a:endParaRPr lang="en-US" dirty="0"/>
           </a:p>
@@ -7351,28 +7411,27 @@
       </p:sp>
       <p:pic>
         <p:nvPicPr>
-          <p:cNvPr id="5" name="Picture 4" descr="Screen Shot 2016-11-06 at 12.48.57 AM.png"/>
+          <p:cNvPr id="2" name="Picture 1" descr="Screen Shot 2016-11-08 at 5.17.57 PM.png"/>
           <p:cNvPicPr>
             <a:picLocks noChangeAspect="1"/>
           </p:cNvPicPr>
           <p:nvPr/>
         </p:nvPicPr>
-        <p:blipFill>
-          <a:blip r:embed="rId3">
+        <p:blipFill rotWithShape="1">
+          <a:blip r:embed="rId2">
             <a:extLst>
               <a:ext uri="{28A0092B-C50C-407E-A947-70E740481C1C}">
                 <a14:useLocalDpi xmlns:a14="http://schemas.microsoft.com/office/drawing/2010/main" val="0"/>
               </a:ext>
             </a:extLst>
           </a:blip>
-          <a:stretch>
-            <a:fillRect/>
-          </a:stretch>
+          <a:srcRect r="55602"/>
+          <a:stretch/>
         </p:blipFill>
         <p:spPr>
           <a:xfrm>
-            <a:off x="237071" y="1828080"/>
-            <a:ext cx="8686800" cy="3364523"/>
+            <a:off x="2302934" y="4526403"/>
+            <a:ext cx="4064000" cy="1599760"/>
           </a:xfrm>
           <a:prstGeom prst="rect">
             <a:avLst/>
@@ -7397,7 +7456,7 @@
             <a:fld id="{BA9B540C-44DA-4F69-89C9-7C84606640D3}" type="slidenum">
               <a:rPr lang="en-US" smtClean="0"/>
               <a:pPr/>
-              <a:t>21</a:t>
+              <a:t>22</a:t>
             </a:fld>
             <a:endParaRPr lang="en-US"/>
           </a:p>
@@ -7406,7 +7465,7 @@
     </p:spTree>
     <p:extLst>
       <p:ext uri="{BB962C8B-B14F-4D97-AF65-F5344CB8AC3E}">
-        <p14:creationId xmlns:p14="http://schemas.microsoft.com/office/powerpoint/2010/main" val="994163287"/>
+        <p14:creationId xmlns:p14="http://schemas.microsoft.com/office/powerpoint/2010/main" val="1610396644"/>
       </p:ext>
     </p:extLst>
   </p:cSld>
@@ -7456,26 +7515,15 @@
           <a:lstStyle/>
           <a:p>
             <a:r>
-              <a:rPr lang="en-US" dirty="0"/>
-              <a:t>\usepackage{</a:t>
-            </a:r>
-            <a:r>
-              <a:rPr lang="en-US" dirty="0" err="1"/>
-              <a:t>amsmath</a:t>
-            </a:r>
-            <a:r>
-              <a:rPr lang="en-US" dirty="0" smtClean="0"/>
-              <a:t>} for math equations</a:t>
-            </a:r>
-          </a:p>
-          <a:p>
-            <a:endParaRPr lang="en-US" dirty="0"/>
-          </a:p>
-          <a:p>
-            <a:pPr marL="0" indent="0">
-              <a:buNone/>
-            </a:pPr>
-            <a:endParaRPr lang="en-US" dirty="0"/>
+              <a:rPr lang="en-US" dirty="0" smtClean="0"/>
+              <a:t>Inline math mode can be inserted using $ math equation here$</a:t>
+            </a:r>
+          </a:p>
+          <a:p>
+            <a:pPr marL="0" indent="0">
+              <a:buNone/>
+            </a:pPr>
+            <a:endParaRPr lang="en-US" dirty="0" smtClean="0"/>
           </a:p>
         </p:txBody>
       </p:sp>
@@ -7509,7 +7557,7 @@
       </p:sp>
       <p:sp>
         <p:nvSpPr>
-          <p:cNvPr id="5" name="Slide Number Placeholder 4"/>
+          <p:cNvPr id="2" name="Slide Number Placeholder 1"/>
           <p:cNvSpPr>
             <a:spLocks noGrp="1"/>
           </p:cNvSpPr>
@@ -7525,7 +7573,7 @@
             <a:fld id="{BA9B540C-44DA-4F69-89C9-7C84606640D3}" type="slidenum">
               <a:rPr lang="en-US" smtClean="0"/>
               <a:pPr/>
-              <a:t>22</a:t>
+              <a:t>23</a:t>
             </a:fld>
             <a:endParaRPr lang="en-US"/>
           </a:p>
@@ -7534,7 +7582,7 @@
     </p:spTree>
     <p:extLst>
       <p:ext uri="{BB962C8B-B14F-4D97-AF65-F5344CB8AC3E}">
-        <p14:creationId xmlns:p14="http://schemas.microsoft.com/office/powerpoint/2010/main" val="1470340825"/>
+        <p14:creationId xmlns:p14="http://schemas.microsoft.com/office/powerpoint/2010/main" val="956291851"/>
       </p:ext>
     </p:extLst>
   </p:cSld>
@@ -7584,35 +7632,20 @@
           <a:lstStyle/>
           <a:p>
             <a:r>
-              <a:rPr lang="en-US" dirty="0"/>
-              <a:t>\usepackage{</a:t>
-            </a:r>
-            <a:r>
-              <a:rPr lang="en-US" dirty="0" err="1"/>
-              <a:t>amsmath</a:t>
-            </a:r>
-            <a:r>
-              <a:rPr lang="en-US" dirty="0" smtClean="0"/>
-              <a:t>} for math equations</a:t>
-            </a:r>
-          </a:p>
-          <a:p>
+              <a:rPr lang="en-US" dirty="0" smtClean="0"/>
+              <a:t>Inline math mode can be inserted using $ math equation here$</a:t>
+            </a:r>
+          </a:p>
+          <a:p>
+            <a:pPr marL="0" indent="0">
+              <a:buNone/>
+            </a:pPr>
             <a:endParaRPr lang="en-US" dirty="0" smtClean="0"/>
           </a:p>
           <a:p>
             <a:pPr marL="0" indent="0">
               <a:buNone/>
             </a:pPr>
-            <a:r>
-              <a:rPr lang="en-US" b="1" dirty="0">
-                <a:solidFill>
-                  <a:schemeClr val="tx2">
-                    <a:lumMod val="75000"/>
-                  </a:schemeClr>
-                </a:solidFill>
-              </a:rPr>
-              <a:t>Example</a:t>
-            </a:r>
             <a:r>
               <a:rPr lang="en-US" b="1" dirty="0" smtClean="0">
                 <a:solidFill>
@@ -7621,48 +7654,36 @@
                   </a:schemeClr>
                 </a:solidFill>
               </a:rPr>
-              <a:t>:</a:t>
-            </a:r>
+              <a:t>Example:</a:t>
+            </a:r>
+            <a:endParaRPr lang="en-US" b="1" dirty="0">
+              <a:solidFill>
+                <a:schemeClr val="tx2">
+                  <a:lumMod val="75000"/>
+                </a:schemeClr>
+              </a:solidFill>
+            </a:endParaRPr>
+          </a:p>
+          <a:p>
+            <a:pPr marL="0" indent="0">
+              <a:buNone/>
+            </a:pPr>
+            <a:r>
+              <a:rPr lang="en-US" dirty="0"/>
+              <a:t>We can use inline math such as $f(x) = 2x^3 + 5x$ in </a:t>
+            </a:r>
+            <a:r>
+              <a:rPr lang="en-US" dirty="0" smtClean="0"/>
+              <a:t>between </a:t>
+            </a:r>
+            <a:r>
+              <a:rPr lang="en-US" dirty="0"/>
+              <a:t>text.</a:t>
+            </a:r>
+            <a:endParaRPr lang="en-US" dirty="0" smtClean="0"/>
+          </a:p>
+          <a:p>
             <a:endParaRPr lang="en-US" dirty="0"/>
-          </a:p>
-          <a:p>
-            <a:r>
-              <a:rPr lang="en-US" dirty="0" smtClean="0"/>
-              <a:t>\begin{equation}</a:t>
-            </a:r>
-            <a:endParaRPr lang="en-US" dirty="0"/>
-          </a:p>
-          <a:p>
-            <a:pPr marL="0" indent="0">
-              <a:buNone/>
-            </a:pPr>
-            <a:r>
-              <a:rPr lang="en-US" dirty="0" smtClean="0"/>
-              <a:t>	f(x) = \</a:t>
-            </a:r>
-            <a:r>
-              <a:rPr lang="en-US" dirty="0" err="1" smtClean="0"/>
-              <a:t>frac</a:t>
-            </a:r>
-            <a:r>
-              <a:rPr lang="en-US" dirty="0" smtClean="0"/>
-              <a:t>{x^2 + 1}{5} \</a:t>
-            </a:r>
-            <a:r>
-              <a:rPr lang="en-US" dirty="0" err="1" smtClean="0"/>
-              <a:t>int</a:t>
-            </a:r>
-            <a:r>
-              <a:rPr lang="en-US" dirty="0" smtClean="0"/>
-              <a:t> x dx</a:t>
-            </a:r>
-            <a:endParaRPr lang="en-US" dirty="0"/>
-          </a:p>
-          <a:p>
-            <a:r>
-              <a:rPr lang="en-US" dirty="0" smtClean="0"/>
-              <a:t>\end{equation}</a:t>
-            </a:r>
           </a:p>
           <a:p>
             <a:pPr marL="0" indent="0">
@@ -7702,7 +7723,7 @@
       </p:sp>
       <p:sp>
         <p:nvSpPr>
-          <p:cNvPr id="5" name="Slide Number Placeholder 4"/>
+          <p:cNvPr id="2" name="Slide Number Placeholder 1"/>
           <p:cNvSpPr>
             <a:spLocks noGrp="1"/>
           </p:cNvSpPr>
@@ -7718,7 +7739,7 @@
             <a:fld id="{BA9B540C-44DA-4F69-89C9-7C84606640D3}" type="slidenum">
               <a:rPr lang="en-US" smtClean="0"/>
               <a:pPr/>
-              <a:t>23</a:t>
+              <a:t>24</a:t>
             </a:fld>
             <a:endParaRPr lang="en-US"/>
           </a:p>
@@ -7727,7 +7748,7 @@
     </p:spTree>
     <p:extLst>
       <p:ext uri="{BB962C8B-B14F-4D97-AF65-F5344CB8AC3E}">
-        <p14:creationId xmlns:p14="http://schemas.microsoft.com/office/powerpoint/2010/main" val="1993635300"/>
+        <p14:creationId xmlns:p14="http://schemas.microsoft.com/office/powerpoint/2010/main" val="3404430301"/>
       </p:ext>
     </p:extLst>
   </p:cSld>
@@ -7777,16 +7798,8 @@
           <a:lstStyle/>
           <a:p>
             <a:r>
-              <a:rPr lang="en-US" dirty="0"/>
-              <a:t>\usepackage{</a:t>
-            </a:r>
-            <a:r>
-              <a:rPr lang="en-US" dirty="0" err="1"/>
-              <a:t>amsmath</a:t>
-            </a:r>
-            <a:r>
-              <a:rPr lang="en-US" dirty="0" smtClean="0"/>
-              <a:t>} for math equations</a:t>
+              <a:rPr lang="en-US" dirty="0" smtClean="0"/>
+              <a:t>Inline math mode can be inserted using $ math equation here$</a:t>
             </a:r>
           </a:p>
           <a:p>
@@ -7819,43 +7832,25 @@
             <a:endParaRPr lang="en-US" dirty="0"/>
           </a:p>
           <a:p>
-            <a:r>
-              <a:rPr lang="en-US" dirty="0" smtClean="0"/>
-              <a:t>\begin{equation}</a:t>
-            </a:r>
+            <a:pPr marL="0" indent="0">
+              <a:buNone/>
+            </a:pPr>
+            <a:r>
+              <a:rPr lang="en-US" dirty="0"/>
+              <a:t>We can use inline math such as $f(x) = 2x^3 + 5x$ in </a:t>
+            </a:r>
+            <a:r>
+              <a:rPr lang="en-US" dirty="0" smtClean="0"/>
+              <a:t>between </a:t>
+            </a:r>
+            <a:r>
+              <a:rPr lang="en-US" dirty="0"/>
+              <a:t>text.</a:t>
+            </a:r>
+            <a:endParaRPr lang="en-US" dirty="0" smtClean="0"/>
+          </a:p>
+          <a:p>
             <a:endParaRPr lang="en-US" dirty="0"/>
-          </a:p>
-          <a:p>
-            <a:pPr marL="0" indent="0">
-              <a:buNone/>
-            </a:pPr>
-            <a:r>
-              <a:rPr lang="en-US" dirty="0" smtClean="0"/>
-              <a:t>	f(x) = \</a:t>
-            </a:r>
-            <a:r>
-              <a:rPr lang="en-US" dirty="0" err="1" smtClean="0"/>
-              <a:t>frac</a:t>
-            </a:r>
-            <a:r>
-              <a:rPr lang="en-US" dirty="0" smtClean="0"/>
-              <a:t>{x^2 + 1}{5} \</a:t>
-            </a:r>
-            <a:r>
-              <a:rPr lang="en-US" dirty="0" err="1" smtClean="0"/>
-              <a:t>int</a:t>
-            </a:r>
-            <a:r>
-              <a:rPr lang="en-US" dirty="0" smtClean="0"/>
-              <a:t> x dx</a:t>
-            </a:r>
-            <a:endParaRPr lang="en-US" dirty="0"/>
-          </a:p>
-          <a:p>
-            <a:r>
-              <a:rPr lang="en-US" dirty="0" smtClean="0"/>
-              <a:t>\end{equation}</a:t>
-            </a:r>
           </a:p>
           <a:p>
             <a:pPr marL="0" indent="0">
@@ -7893,39 +7888,15 @@
           </a:p>
         </p:txBody>
       </p:sp>
-      <p:sp>
-        <p:nvSpPr>
-          <p:cNvPr id="5" name="Slide Number Placeholder 4"/>
-          <p:cNvSpPr>
-            <a:spLocks noGrp="1"/>
-          </p:cNvSpPr>
-          <p:nvPr>
-            <p:ph type="sldNum" sz="quarter" idx="12"/>
-          </p:nvPr>
-        </p:nvSpPr>
-        <p:spPr/>
-        <p:txBody>
-          <a:bodyPr/>
-          <a:lstStyle/>
-          <a:p>
-            <a:fld id="{BA9B540C-44DA-4F69-89C9-7C84606640D3}" type="slidenum">
-              <a:rPr lang="en-US" smtClean="0"/>
-              <a:pPr/>
-              <a:t>24</a:t>
-            </a:fld>
-            <a:endParaRPr lang="en-US"/>
-          </a:p>
-        </p:txBody>
-      </p:sp>
       <p:pic>
         <p:nvPicPr>
-          <p:cNvPr id="2" name="Picture 1" descr="Screen Shot 2016-11-08 at 5.17.57 PM.png"/>
+          <p:cNvPr id="2" name="Picture 1" descr="Screen Shot 2016-11-08 at 5.22.11 PM.png"/>
           <p:cNvPicPr>
             <a:picLocks noChangeAspect="1"/>
           </p:cNvPicPr>
           <p:nvPr/>
         </p:nvPicPr>
-        <p:blipFill rotWithShape="1">
+        <p:blipFill>
           <a:blip r:embed="rId2">
             <a:extLst>
               <a:ext uri="{28A0092B-C50C-407E-A947-70E740481C1C}">
@@ -7933,23 +7904,48 @@
               </a:ext>
             </a:extLst>
           </a:blip>
-          <a:srcRect r="55602"/>
-          <a:stretch/>
+          <a:stretch>
+            <a:fillRect/>
+          </a:stretch>
         </p:blipFill>
         <p:spPr>
           <a:xfrm>
-            <a:off x="2302934" y="4526403"/>
-            <a:ext cx="4064000" cy="1599760"/>
+            <a:off x="0" y="4847167"/>
+            <a:ext cx="9144000" cy="480701"/>
           </a:xfrm>
           <a:prstGeom prst="rect">
             <a:avLst/>
           </a:prstGeom>
         </p:spPr>
       </p:pic>
+      <p:sp>
+        <p:nvSpPr>
+          <p:cNvPr id="6" name="Slide Number Placeholder 5"/>
+          <p:cNvSpPr>
+            <a:spLocks noGrp="1"/>
+          </p:cNvSpPr>
+          <p:nvPr>
+            <p:ph type="sldNum" sz="quarter" idx="12"/>
+          </p:nvPr>
+        </p:nvSpPr>
+        <p:spPr/>
+        <p:txBody>
+          <a:bodyPr/>
+          <a:lstStyle/>
+          <a:p>
+            <a:fld id="{BA9B540C-44DA-4F69-89C9-7C84606640D3}" type="slidenum">
+              <a:rPr lang="en-US" smtClean="0"/>
+              <a:pPr/>
+              <a:t>25</a:t>
+            </a:fld>
+            <a:endParaRPr lang="en-US"/>
+          </a:p>
+        </p:txBody>
+      </p:sp>
     </p:spTree>
     <p:extLst>
       <p:ext uri="{BB962C8B-B14F-4D97-AF65-F5344CB8AC3E}">
-        <p14:creationId xmlns:p14="http://schemas.microsoft.com/office/powerpoint/2010/main" val="1610396644"/>
+        <p14:creationId xmlns:p14="http://schemas.microsoft.com/office/powerpoint/2010/main" val="1196651011"/>
       </p:ext>
     </p:extLst>
   </p:cSld>
@@ -8000,20 +7996,91 @@
           <a:p>
             <a:r>
               <a:rPr lang="en-US" dirty="0" smtClean="0"/>
-              <a:t>Inline math mode can be inserted using $ math equation here$</a:t>
-            </a:r>
-          </a:p>
-          <a:p>
-            <a:pPr marL="0" indent="0">
-              <a:buNone/>
-            </a:pPr>
+              <a:t>\</a:t>
+            </a:r>
+            <a:r>
+              <a:rPr lang="en-US" dirty="0" err="1" smtClean="0"/>
+              <a:t>sqrt</a:t>
+            </a:r>
+            <a:r>
+              <a:rPr lang="en-US" dirty="0" smtClean="0"/>
+              <a:t>{x}</a:t>
+            </a:r>
+          </a:p>
+          <a:p>
+            <a:endParaRPr lang="en-US" dirty="0"/>
+          </a:p>
+          <a:p>
+            <a:r>
+              <a:rPr lang="en-US" dirty="0" smtClean="0"/>
+              <a:t>\</a:t>
+            </a:r>
+            <a:r>
+              <a:rPr lang="en-US" dirty="0" err="1" smtClean="0"/>
+              <a:t>frac</a:t>
+            </a:r>
+            <a:r>
+              <a:rPr lang="en-US" dirty="0" smtClean="0"/>
+              <a:t>{x}{y}</a:t>
+            </a:r>
+          </a:p>
+          <a:p>
+            <a:endParaRPr lang="en-US" dirty="0"/>
+          </a:p>
+          <a:p>
+            <a:r>
+              <a:rPr lang="en-US" dirty="0" smtClean="0"/>
+              <a:t>\</a:t>
+            </a:r>
+            <a:r>
+              <a:rPr lang="en-US" dirty="0" err="1" smtClean="0"/>
+              <a:t>int</a:t>
+            </a:r>
+            <a:r>
+              <a:rPr lang="en-US" dirty="0" smtClean="0"/>
+              <a:t> y </a:t>
+            </a:r>
+            <a:r>
+              <a:rPr lang="en-US" dirty="0" err="1" smtClean="0"/>
+              <a:t>dy</a:t>
+            </a:r>
             <a:endParaRPr lang="en-US" dirty="0" smtClean="0"/>
           </a:p>
-        </p:txBody>
-      </p:sp>
-      <p:sp>
-        <p:nvSpPr>
-          <p:cNvPr id="4" name="Title 1"/>
+          <a:p>
+            <a:endParaRPr lang="en-US" dirty="0"/>
+          </a:p>
+          <a:p>
+            <a:r>
+              <a:rPr lang="en-US" dirty="0" smtClean="0"/>
+              <a:t>\alpha, \beta, …</a:t>
+            </a:r>
+          </a:p>
+          <a:p>
+            <a:endParaRPr lang="en-US" dirty="0"/>
+          </a:p>
+          <a:p>
+            <a:r>
+              <a:rPr lang="en-US" dirty="0" smtClean="0"/>
+              <a:t>\</a:t>
+            </a:r>
+            <a:r>
+              <a:rPr lang="en-US" dirty="0" err="1" smtClean="0"/>
+              <a:t>frac</a:t>
+            </a:r>
+            <a:r>
+              <a:rPr lang="en-US" dirty="0" smtClean="0"/>
+              <a:t>{\partial f}{\partial x}</a:t>
+            </a:r>
+            <a:endParaRPr lang="en-US" dirty="0"/>
+          </a:p>
+          <a:p>
+            <a:endParaRPr lang="en-US" dirty="0"/>
+          </a:p>
+        </p:txBody>
+      </p:sp>
+      <p:sp>
+        <p:nvSpPr>
+          <p:cNvPr id="5" name="Title 1"/>
           <p:cNvSpPr>
             <a:spLocks noGrp="1"/>
           </p:cNvSpPr>
@@ -8039,9 +8106,39 @@
           </a:p>
         </p:txBody>
       </p:sp>
-      <p:sp>
-        <p:nvSpPr>
-          <p:cNvPr id="5" name="Slide Number Placeholder 4"/>
+      <p:pic>
+        <p:nvPicPr>
+          <p:cNvPr id="6" name="Picture 5" descr="Screen Shot 2016-11-09 at 12.29.56 AM.png"/>
+          <p:cNvPicPr>
+            <a:picLocks noChangeAspect="1"/>
+          </p:cNvPicPr>
+          <p:nvPr/>
+        </p:nvPicPr>
+        <p:blipFill>
+          <a:blip r:embed="rId2">
+            <a:extLst>
+              <a:ext uri="{28A0092B-C50C-407E-A947-70E740481C1C}">
+                <a14:useLocalDpi xmlns:a14="http://schemas.microsoft.com/office/drawing/2010/main" val="0"/>
+              </a:ext>
+            </a:extLst>
+          </a:blip>
+          <a:stretch>
+            <a:fillRect/>
+          </a:stretch>
+        </p:blipFill>
+        <p:spPr>
+          <a:xfrm>
+            <a:off x="5469468" y="1092209"/>
+            <a:ext cx="1769532" cy="4959198"/>
+          </a:xfrm>
+          <a:prstGeom prst="rect">
+            <a:avLst/>
+          </a:prstGeom>
+        </p:spPr>
+      </p:pic>
+      <p:sp>
+        <p:nvSpPr>
+          <p:cNvPr id="7" name="Slide Number Placeholder 6"/>
           <p:cNvSpPr>
             <a:spLocks noGrp="1"/>
           </p:cNvSpPr>
@@ -8057,7 +8154,7 @@
             <a:fld id="{BA9B540C-44DA-4F69-89C9-7C84606640D3}" type="slidenum">
               <a:rPr lang="en-US" smtClean="0"/>
               <a:pPr/>
-              <a:t>25</a:t>
+              <a:t>26</a:t>
             </a:fld>
             <a:endParaRPr lang="en-US"/>
           </a:p>
@@ -8066,7 +8163,7 @@
     </p:spTree>
     <p:extLst>
       <p:ext uri="{BB962C8B-B14F-4D97-AF65-F5344CB8AC3E}">
-        <p14:creationId xmlns:p14="http://schemas.microsoft.com/office/powerpoint/2010/main" val="956291851"/>
+        <p14:creationId xmlns:p14="http://schemas.microsoft.com/office/powerpoint/2010/main" val="353371289"/>
       </p:ext>
     </p:extLst>
   </p:cSld>
@@ -8110,59 +8207,33 @@
             <p:ph idx="1"/>
           </p:nvPr>
         </p:nvSpPr>
-        <p:spPr/>
-        <p:txBody>
-          <a:bodyPr/>
-          <a:lstStyle/>
-          <a:p>
-            <a:r>
-              <a:rPr lang="en-US" dirty="0" smtClean="0"/>
-              <a:t>Inline math mode can be inserted using $ math equation here$</a:t>
-            </a:r>
-          </a:p>
-          <a:p>
-            <a:pPr marL="0" indent="0">
-              <a:buNone/>
-            </a:pPr>
+        <p:spPr>
+          <a:xfrm>
+            <a:off x="457200" y="1380072"/>
+            <a:ext cx="8229600" cy="3603096"/>
+          </a:xfrm>
+        </p:spPr>
+        <p:txBody>
+          <a:bodyPr/>
+          <a:lstStyle/>
+          <a:p>
+            <a:r>
+              <a:rPr lang="en-US" dirty="0" smtClean="0">
+                <a:hlinkClick r:id="rId2"/>
+              </a:rPr>
+              <a:t>Daum Equation Editor</a:t>
+            </a:r>
             <a:endParaRPr lang="en-US" dirty="0" smtClean="0"/>
           </a:p>
           <a:p>
-            <a:pPr marL="0" indent="0">
-              <a:buNone/>
-            </a:pPr>
-            <a:r>
-              <a:rPr lang="en-US" b="1" dirty="0" smtClean="0">
-                <a:solidFill>
-                  <a:schemeClr val="tx2">
-                    <a:lumMod val="75000"/>
-                  </a:schemeClr>
-                </a:solidFill>
+            <a:endParaRPr lang="en-US" dirty="0"/>
+          </a:p>
+          <a:p>
+            <a:r>
+              <a:rPr lang="en-US" dirty="0" smtClean="0">
+                <a:hlinkClick r:id="rId3"/>
               </a:rPr>
-              <a:t>Example:</a:t>
-            </a:r>
-            <a:endParaRPr lang="en-US" b="1" dirty="0">
-              <a:solidFill>
-                <a:schemeClr val="tx2">
-                  <a:lumMod val="75000"/>
-                </a:schemeClr>
-              </a:solidFill>
-            </a:endParaRPr>
-          </a:p>
-          <a:p>
-            <a:pPr marL="0" indent="0">
-              <a:buNone/>
-            </a:pPr>
-            <a:r>
-              <a:rPr lang="en-US" dirty="0"/>
-              <a:t>We can use inline math such as $f(x) = 2x^3 + 5x$ in </a:t>
-            </a:r>
-            <a:r>
-              <a:rPr lang="en-US" dirty="0" smtClean="0"/>
-              <a:t>between </a:t>
-            </a:r>
-            <a:r>
-              <a:rPr lang="en-US" dirty="0"/>
-              <a:t>text.</a:t>
+              <a:t>Codecogs</a:t>
             </a:r>
             <a:endParaRPr lang="en-US" dirty="0" smtClean="0"/>
           </a:p>
@@ -8170,16 +8241,13 @@
             <a:endParaRPr lang="en-US" dirty="0"/>
           </a:p>
           <a:p>
-            <a:pPr marL="0" indent="0">
-              <a:buNone/>
-            </a:pPr>
             <a:endParaRPr lang="en-US" dirty="0"/>
           </a:p>
         </p:txBody>
       </p:sp>
       <p:sp>
         <p:nvSpPr>
-          <p:cNvPr id="4" name="Title 1"/>
+          <p:cNvPr id="5" name="Title 1"/>
           <p:cNvSpPr>
             <a:spLocks noGrp="1"/>
           </p:cNvSpPr>
@@ -8199,15 +8267,75 @@
           <a:p>
             <a:r>
               <a:rPr lang="en-US" dirty="0" smtClean="0"/>
-              <a:t>Equations</a:t>
+              <a:t>Online Equation Editors</a:t>
             </a:r>
             <a:endParaRPr lang="en-US" dirty="0"/>
           </a:p>
         </p:txBody>
       </p:sp>
-      <p:sp>
-        <p:nvSpPr>
-          <p:cNvPr id="5" name="Slide Number Placeholder 4"/>
+      <p:pic>
+        <p:nvPicPr>
+          <p:cNvPr id="7" name="Picture 6" descr="Screen Shot 2016-11-09 at 12.39.53 AM.png"/>
+          <p:cNvPicPr>
+            <a:picLocks noChangeAspect="1"/>
+          </p:cNvPicPr>
+          <p:nvPr/>
+        </p:nvPicPr>
+        <p:blipFill>
+          <a:blip r:embed="rId4">
+            <a:extLst>
+              <a:ext uri="{28A0092B-C50C-407E-A947-70E740481C1C}">
+                <a14:useLocalDpi xmlns:a14="http://schemas.microsoft.com/office/drawing/2010/main" val="0"/>
+              </a:ext>
+            </a:extLst>
+          </a:blip>
+          <a:stretch>
+            <a:fillRect/>
+          </a:stretch>
+        </p:blipFill>
+        <p:spPr>
+          <a:xfrm>
+            <a:off x="2904532" y="1909591"/>
+            <a:ext cx="6053202" cy="2785713"/>
+          </a:xfrm>
+          <a:prstGeom prst="rect">
+            <a:avLst/>
+          </a:prstGeom>
+        </p:spPr>
+      </p:pic>
+      <p:pic>
+        <p:nvPicPr>
+          <p:cNvPr id="6" name="Picture 5" descr="Screen Shot 2016-11-09 at 12.40.33 AM.png"/>
+          <p:cNvPicPr>
+            <a:picLocks noChangeAspect="1"/>
+          </p:cNvPicPr>
+          <p:nvPr/>
+        </p:nvPicPr>
+        <p:blipFill>
+          <a:blip r:embed="rId5">
+            <a:extLst>
+              <a:ext uri="{28A0092B-C50C-407E-A947-70E740481C1C}">
+                <a14:useLocalDpi xmlns:a14="http://schemas.microsoft.com/office/drawing/2010/main" val="0"/>
+              </a:ext>
+            </a:extLst>
+          </a:blip>
+          <a:stretch>
+            <a:fillRect/>
+          </a:stretch>
+        </p:blipFill>
+        <p:spPr>
+          <a:xfrm>
+            <a:off x="741892" y="4359728"/>
+            <a:ext cx="7801386" cy="2361747"/>
+          </a:xfrm>
+          <a:prstGeom prst="rect">
+            <a:avLst/>
+          </a:prstGeom>
+        </p:spPr>
+      </p:pic>
+      <p:sp>
+        <p:nvSpPr>
+          <p:cNvPr id="8" name="Slide Number Placeholder 7"/>
           <p:cNvSpPr>
             <a:spLocks noGrp="1"/>
           </p:cNvSpPr>
@@ -8223,7 +8351,7 @@
             <a:fld id="{BA9B540C-44DA-4F69-89C9-7C84606640D3}" type="slidenum">
               <a:rPr lang="en-US" smtClean="0"/>
               <a:pPr/>
-              <a:t>26</a:t>
+              <a:t>27</a:t>
             </a:fld>
             <a:endParaRPr lang="en-US"/>
           </a:p>
@@ -8232,7 +8360,7 @@
     </p:spTree>
     <p:extLst>
       <p:ext uri="{BB962C8B-B14F-4D97-AF65-F5344CB8AC3E}">
-        <p14:creationId xmlns:p14="http://schemas.microsoft.com/office/powerpoint/2010/main" val="3404430301"/>
+        <p14:creationId xmlns:p14="http://schemas.microsoft.com/office/powerpoint/2010/main" val="3371949926"/>
       </p:ext>
     </p:extLst>
   </p:cSld>
@@ -8281,37 +8409,25 @@
           <a:bodyPr/>
           <a:lstStyle/>
           <a:p>
-            <a:r>
-              <a:rPr lang="en-US" dirty="0" smtClean="0"/>
-              <a:t>Inline math mode can be inserted using $ math equation here$</a:t>
-            </a:r>
-          </a:p>
-          <a:p>
-            <a:endParaRPr lang="en-US" dirty="0" smtClean="0"/>
-          </a:p>
-          <a:p>
-            <a:pPr marL="0" indent="0">
-              <a:buNone/>
-            </a:pPr>
-            <a:r>
-              <a:rPr lang="en-US" b="1" dirty="0">
-                <a:solidFill>
-                  <a:schemeClr val="tx2">
-                    <a:lumMod val="75000"/>
-                  </a:schemeClr>
-                </a:solidFill>
-              </a:rPr>
-              <a:t>Example</a:t>
-            </a:r>
-            <a:r>
-              <a:rPr lang="en-US" b="1" dirty="0" smtClean="0">
-                <a:solidFill>
-                  <a:schemeClr val="tx2">
-                    <a:lumMod val="75000"/>
-                  </a:schemeClr>
-                </a:solidFill>
-              </a:rPr>
-              <a:t>:</a:t>
+            <a:pPr marL="0" indent="0">
+              <a:buNone/>
+            </a:pPr>
+            <a:r>
+              <a:rPr lang="en-US" dirty="0"/>
+              <a:t>\begin{tabular}{| l l l |}</a:t>
+            </a:r>
+          </a:p>
+          <a:p>
+            <a:pPr marL="0" indent="0">
+              <a:buNone/>
+            </a:pPr>
+            <a:r>
+              <a:rPr lang="en-US" dirty="0"/>
+              <a:t>\</a:t>
+            </a:r>
+            <a:r>
+              <a:rPr lang="en-US" dirty="0" err="1"/>
+              <a:t>hline</a:t>
             </a:r>
             <a:endParaRPr lang="en-US" dirty="0"/>
           </a:p>
@@ -8321,32 +8437,56 @@
             </a:pPr>
             <a:r>
               <a:rPr lang="en-US" dirty="0"/>
-              <a:t>We can use inline math such as $f(x) = 2x^3 + 5x$ in </a:t>
-            </a:r>
-            <a:r>
-              <a:rPr lang="en-US" dirty="0" smtClean="0"/>
-              <a:t>between </a:t>
-            </a:r>
+              <a:t>Column 1 &amp; Column 2 &amp; Column 3 \\ \</a:t>
+            </a:r>
+            <a:r>
+              <a:rPr lang="en-US" dirty="0" err="1" smtClean="0"/>
+              <a:t>hline</a:t>
+            </a:r>
+            <a:endParaRPr lang="en-US" dirty="0"/>
+          </a:p>
+          <a:p>
+            <a:pPr marL="0" indent="0">
+              <a:buNone/>
+            </a:pPr>
             <a:r>
               <a:rPr lang="en-US" dirty="0"/>
-              <a:t>text.</a:t>
-            </a:r>
-            <a:endParaRPr lang="en-US" dirty="0" smtClean="0"/>
-          </a:p>
-          <a:p>
+              <a:t>A &amp; B &amp; C \\ \</a:t>
+            </a:r>
+            <a:r>
+              <a:rPr lang="en-US" dirty="0" err="1"/>
+              <a:t>hline</a:t>
+            </a:r>
             <a:endParaRPr lang="en-US" dirty="0"/>
           </a:p>
           <a:p>
             <a:pPr marL="0" indent="0">
               <a:buNone/>
             </a:pPr>
+            <a:r>
+              <a:rPr lang="en-US" dirty="0"/>
+              <a:t>D &amp; E &amp; F \\ \</a:t>
+            </a:r>
+            <a:r>
+              <a:rPr lang="en-US" dirty="0" err="1"/>
+              <a:t>hline</a:t>
+            </a:r>
             <a:endParaRPr lang="en-US" dirty="0"/>
           </a:p>
-        </p:txBody>
-      </p:sp>
-      <p:sp>
-        <p:nvSpPr>
-          <p:cNvPr id="4" name="Title 1"/>
+          <a:p>
+            <a:pPr marL="0" indent="0">
+              <a:buNone/>
+            </a:pPr>
+            <a:r>
+              <a:rPr lang="en-US" dirty="0"/>
+              <a:t>\end{tabular}</a:t>
+            </a:r>
+          </a:p>
+        </p:txBody>
+      </p:sp>
+      <p:sp>
+        <p:nvSpPr>
+          <p:cNvPr id="5" name="Title 1"/>
           <p:cNvSpPr>
             <a:spLocks noGrp="1"/>
           </p:cNvSpPr>
@@ -8366,7 +8506,7 @@
           <a:p>
             <a:r>
               <a:rPr lang="en-US" dirty="0" smtClean="0"/>
-              <a:t>Equations</a:t>
+              <a:t>Tables</a:t>
             </a:r>
             <a:endParaRPr lang="en-US" dirty="0"/>
           </a:p>
@@ -8374,7 +8514,7 @@
       </p:sp>
       <p:sp>
         <p:nvSpPr>
-          <p:cNvPr id="5" name="Slide Number Placeholder 4"/>
+          <p:cNvPr id="7" name="Slide Number Placeholder 6"/>
           <p:cNvSpPr>
             <a:spLocks noGrp="1"/>
           </p:cNvSpPr>
@@ -8390,46 +8530,16 @@
             <a:fld id="{BA9B540C-44DA-4F69-89C9-7C84606640D3}" type="slidenum">
               <a:rPr lang="en-US" smtClean="0"/>
               <a:pPr/>
-              <a:t>27</a:t>
+              <a:t>28</a:t>
             </a:fld>
             <a:endParaRPr lang="en-US"/>
           </a:p>
         </p:txBody>
       </p:sp>
-      <p:pic>
-        <p:nvPicPr>
-          <p:cNvPr id="2" name="Picture 1" descr="Screen Shot 2016-11-08 at 5.22.11 PM.png"/>
-          <p:cNvPicPr>
-            <a:picLocks noChangeAspect="1"/>
-          </p:cNvPicPr>
-          <p:nvPr/>
-        </p:nvPicPr>
-        <p:blipFill>
-          <a:blip r:embed="rId2">
-            <a:extLst>
-              <a:ext uri="{28A0092B-C50C-407E-A947-70E740481C1C}">
-                <a14:useLocalDpi xmlns:a14="http://schemas.microsoft.com/office/drawing/2010/main" val="0"/>
-              </a:ext>
-            </a:extLst>
-          </a:blip>
-          <a:stretch>
-            <a:fillRect/>
-          </a:stretch>
-        </p:blipFill>
-        <p:spPr>
-          <a:xfrm>
-            <a:off x="0" y="4847167"/>
-            <a:ext cx="9144000" cy="480701"/>
-          </a:xfrm>
-          <a:prstGeom prst="rect">
-            <a:avLst/>
-          </a:prstGeom>
-        </p:spPr>
-      </p:pic>
     </p:spTree>
     <p:extLst>
       <p:ext uri="{BB962C8B-B14F-4D97-AF65-F5344CB8AC3E}">
-        <p14:creationId xmlns:p14="http://schemas.microsoft.com/office/powerpoint/2010/main" val="1196651011"/>
+        <p14:creationId xmlns:p14="http://schemas.microsoft.com/office/powerpoint/2010/main" val="246536554"/>
       </p:ext>
     </p:extLst>
   </p:cSld>
@@ -8473,65 +8583,83 @@
             <p:ph idx="1"/>
           </p:nvPr>
         </p:nvSpPr>
-        <p:spPr>
-          <a:xfrm>
-            <a:off x="457200" y="2523067"/>
-            <a:ext cx="8229600" cy="3603096"/>
-          </a:xfrm>
-        </p:spPr>
-        <p:txBody>
-          <a:bodyPr/>
-          <a:lstStyle/>
-          <a:p>
-            <a:r>
-              <a:rPr lang="en-US" dirty="0" smtClean="0">
-                <a:hlinkClick r:id="rId2"/>
-              </a:rPr>
-              <a:t>Daum Equation Editor</a:t>
-            </a:r>
-            <a:endParaRPr lang="en-US" dirty="0" smtClean="0"/>
-          </a:p>
-          <a:p>
+        <p:spPr/>
+        <p:txBody>
+          <a:bodyPr/>
+          <a:lstStyle/>
+          <a:p>
+            <a:pPr marL="0" indent="0">
+              <a:buNone/>
+            </a:pPr>
+            <a:r>
+              <a:rPr lang="en-US" dirty="0"/>
+              <a:t>\begin{tabular}{| l l l |}</a:t>
+            </a:r>
+          </a:p>
+          <a:p>
+            <a:pPr marL="0" indent="0">
+              <a:buNone/>
+            </a:pPr>
+            <a:r>
+              <a:rPr lang="en-US" dirty="0"/>
+              <a:t>\</a:t>
+            </a:r>
+            <a:r>
+              <a:rPr lang="en-US" dirty="0" err="1"/>
+              <a:t>hline</a:t>
+            </a:r>
             <a:endParaRPr lang="en-US" dirty="0"/>
           </a:p>
           <a:p>
-            <a:r>
-              <a:rPr lang="en-US" dirty="0" smtClean="0">
-                <a:hlinkClick r:id="rId3"/>
-              </a:rPr>
-              <a:t>Codecogs</a:t>
-            </a:r>
-            <a:endParaRPr lang="en-US" dirty="0" smtClean="0"/>
-          </a:p>
-          <a:p>
+            <a:pPr marL="0" indent="0">
+              <a:buNone/>
+            </a:pPr>
+            <a:r>
+              <a:rPr lang="en-US" dirty="0"/>
+              <a:t>Column 1 &amp; Column 2 &amp; Column 3 \\ \</a:t>
+            </a:r>
+            <a:r>
+              <a:rPr lang="en-US" dirty="0" err="1" smtClean="0"/>
+              <a:t>hline</a:t>
+            </a:r>
             <a:endParaRPr lang="en-US" dirty="0"/>
           </a:p>
           <a:p>
+            <a:pPr marL="0" indent="0">
+              <a:buNone/>
+            </a:pPr>
+            <a:r>
+              <a:rPr lang="en-US" dirty="0"/>
+              <a:t>A &amp; B &amp; C \\ \</a:t>
+            </a:r>
+            <a:r>
+              <a:rPr lang="en-US" dirty="0" err="1"/>
+              <a:t>hline</a:t>
+            </a:r>
             <a:endParaRPr lang="en-US" dirty="0"/>
           </a:p>
-        </p:txBody>
-      </p:sp>
-      <p:sp>
-        <p:nvSpPr>
-          <p:cNvPr id="4" name="Slide Number Placeholder 3"/>
-          <p:cNvSpPr>
-            <a:spLocks noGrp="1"/>
-          </p:cNvSpPr>
-          <p:nvPr>
-            <p:ph type="sldNum" sz="quarter" idx="12"/>
-          </p:nvPr>
-        </p:nvSpPr>
-        <p:spPr/>
-        <p:txBody>
-          <a:bodyPr/>
-          <a:lstStyle/>
-          <a:p>
-            <a:fld id="{BA9B540C-44DA-4F69-89C9-7C84606640D3}" type="slidenum">
-              <a:rPr lang="en-US" smtClean="0"/>
-              <a:pPr/>
-              <a:t>28</a:t>
-            </a:fld>
-            <a:endParaRPr lang="en-US"/>
+          <a:p>
+            <a:pPr marL="0" indent="0">
+              <a:buNone/>
+            </a:pPr>
+            <a:r>
+              <a:rPr lang="en-US" dirty="0"/>
+              <a:t>D &amp; E &amp; F \\ \</a:t>
+            </a:r>
+            <a:r>
+              <a:rPr lang="en-US" dirty="0" err="1"/>
+              <a:t>hline</a:t>
+            </a:r>
+            <a:endParaRPr lang="en-US" dirty="0"/>
+          </a:p>
+          <a:p>
+            <a:pPr marL="0" indent="0">
+              <a:buNone/>
+            </a:pPr>
+            <a:r>
+              <a:rPr lang="en-US" dirty="0"/>
+              <a:t>\end{tabular}</a:t>
+            </a:r>
           </a:p>
         </p:txBody>
       </p:sp>
@@ -8557,16 +8685,70 @@
           <a:p>
             <a:r>
               <a:rPr lang="en-US" dirty="0" smtClean="0"/>
-              <a:t>Online Equation Editors</a:t>
+              <a:t>Tables</a:t>
             </a:r>
             <a:endParaRPr lang="en-US" dirty="0"/>
+          </a:p>
+        </p:txBody>
+      </p:sp>
+      <p:pic>
+        <p:nvPicPr>
+          <p:cNvPr id="2" name="Picture 1" descr="Screen Shot 2016-11-09 at 12.37.30 AM.png"/>
+          <p:cNvPicPr>
+            <a:picLocks noChangeAspect="1"/>
+          </p:cNvPicPr>
+          <p:nvPr/>
+        </p:nvPicPr>
+        <p:blipFill>
+          <a:blip r:embed="rId2">
+            <a:extLst>
+              <a:ext uri="{28A0092B-C50C-407E-A947-70E740481C1C}">
+                <a14:useLocalDpi xmlns:a14="http://schemas.microsoft.com/office/drawing/2010/main" val="0"/>
+              </a:ext>
+            </a:extLst>
+          </a:blip>
+          <a:stretch>
+            <a:fillRect/>
+          </a:stretch>
+        </p:blipFill>
+        <p:spPr>
+          <a:xfrm>
+            <a:off x="812800" y="4457700"/>
+            <a:ext cx="7505700" cy="2070100"/>
+          </a:xfrm>
+          <a:prstGeom prst="rect">
+            <a:avLst/>
+          </a:prstGeom>
+        </p:spPr>
+      </p:pic>
+      <p:sp>
+        <p:nvSpPr>
+          <p:cNvPr id="6" name="Slide Number Placeholder 5"/>
+          <p:cNvSpPr>
+            <a:spLocks noGrp="1"/>
+          </p:cNvSpPr>
+          <p:nvPr>
+            <p:ph type="sldNum" sz="quarter" idx="12"/>
+          </p:nvPr>
+        </p:nvSpPr>
+        <p:spPr/>
+        <p:txBody>
+          <a:bodyPr/>
+          <a:lstStyle/>
+          <a:p>
+            <a:fld id="{BA9B540C-44DA-4F69-89C9-7C84606640D3}" type="slidenum">
+              <a:rPr lang="en-US" smtClean="0"/>
+              <a:pPr/>
+              <a:t>29</a:t>
+            </a:fld>
+            <a:endParaRPr lang="en-US"/>
           </a:p>
         </p:txBody>
       </p:sp>
     </p:spTree>
     <p:extLst>
       <p:ext uri="{BB962C8B-B14F-4D97-AF65-F5344CB8AC3E}">
-        <p14:creationId xmlns:p14="http://schemas.microsoft.com/office/powerpoint/2010/main" val="3371949926"/>
+        <p14:creationId xmlns:p14="http://schemas.microsoft.com/office/powerpoint/2010/main" val="3288684407"/>
       </p:ext>
     </p:extLst>
   </p:cSld>
@@ -8688,30 +8870,6 @@
           </a:p>
         </p:txBody>
       </p:sp>
-      <p:sp>
-        <p:nvSpPr>
-          <p:cNvPr id="6" name="Slide Number Placeholder 5"/>
-          <p:cNvSpPr>
-            <a:spLocks noGrp="1"/>
-          </p:cNvSpPr>
-          <p:nvPr>
-            <p:ph type="sldNum" sz="quarter" idx="12"/>
-          </p:nvPr>
-        </p:nvSpPr>
-        <p:spPr/>
-        <p:txBody>
-          <a:bodyPr/>
-          <a:lstStyle/>
-          <a:p>
-            <a:fld id="{BA9B540C-44DA-4F69-89C9-7C84606640D3}" type="slidenum">
-              <a:rPr lang="en-US" smtClean="0"/>
-              <a:pPr/>
-              <a:t>2</a:t>
-            </a:fld>
-            <a:endParaRPr lang="en-US"/>
-          </a:p>
-        </p:txBody>
-      </p:sp>
       <p:pic>
         <p:nvPicPr>
           <p:cNvPr id="7" name="Picture 6" descr="Screen Shot 2016-11-06 at 12.52.13 AM.png"/>
@@ -8742,6 +8900,30 @@
           </a:prstGeom>
         </p:spPr>
       </p:pic>
+      <p:sp>
+        <p:nvSpPr>
+          <p:cNvPr id="2" name="Slide Number Placeholder 1"/>
+          <p:cNvSpPr>
+            <a:spLocks noGrp="1"/>
+          </p:cNvSpPr>
+          <p:nvPr>
+            <p:ph type="sldNum" sz="quarter" idx="12"/>
+          </p:nvPr>
+        </p:nvSpPr>
+        <p:spPr/>
+        <p:txBody>
+          <a:bodyPr/>
+          <a:lstStyle/>
+          <a:p>
+            <a:fld id="{BA9B540C-44DA-4F69-89C9-7C84606640D3}" type="slidenum">
+              <a:rPr lang="en-US" smtClean="0"/>
+              <a:pPr/>
+              <a:t>3</a:t>
+            </a:fld>
+            <a:endParaRPr lang="en-US"/>
+          </a:p>
+        </p:txBody>
+      </p:sp>
     </p:spTree>
     <p:extLst>
       <p:ext uri="{BB962C8B-B14F-4D97-AF65-F5344CB8AC3E}">
@@ -8809,7 +8991,7 @@
       </p:sp>
       <p:sp>
         <p:nvSpPr>
-          <p:cNvPr id="5" name="Slide Number Placeholder 4"/>
+          <p:cNvPr id="2" name="Slide Number Placeholder 1"/>
           <p:cNvSpPr>
             <a:spLocks noGrp="1"/>
           </p:cNvSpPr>
@@ -8825,7 +9007,7 @@
             <a:fld id="{BA9B540C-44DA-4F69-89C9-7C84606640D3}" type="slidenum">
               <a:rPr lang="en-US" smtClean="0"/>
               <a:pPr/>
-              <a:t>29</a:t>
+              <a:t>30</a:t>
             </a:fld>
             <a:endParaRPr lang="en-US"/>
           </a:p>
@@ -8937,30 +9119,6 @@
           </a:p>
         </p:txBody>
       </p:sp>
-      <p:sp>
-        <p:nvSpPr>
-          <p:cNvPr id="5" name="Slide Number Placeholder 4"/>
-          <p:cNvSpPr>
-            <a:spLocks noGrp="1"/>
-          </p:cNvSpPr>
-          <p:nvPr>
-            <p:ph type="sldNum" sz="quarter" idx="12"/>
-          </p:nvPr>
-        </p:nvSpPr>
-        <p:spPr/>
-        <p:txBody>
-          <a:bodyPr/>
-          <a:lstStyle/>
-          <a:p>
-            <a:fld id="{BA9B540C-44DA-4F69-89C9-7C84606640D3}" type="slidenum">
-              <a:rPr lang="en-US" smtClean="0"/>
-              <a:pPr/>
-              <a:t>30</a:t>
-            </a:fld>
-            <a:endParaRPr lang="en-US"/>
-          </a:p>
-        </p:txBody>
-      </p:sp>
       <p:pic>
         <p:nvPicPr>
           <p:cNvPr id="2" name="Picture 1" descr="Screen Shot 2016-11-08 at 5.37.30 PM.png"/>
@@ -8990,6 +9148,30 @@
           </a:prstGeom>
         </p:spPr>
       </p:pic>
+      <p:sp>
+        <p:nvSpPr>
+          <p:cNvPr id="6" name="Slide Number Placeholder 5"/>
+          <p:cNvSpPr>
+            <a:spLocks noGrp="1"/>
+          </p:cNvSpPr>
+          <p:nvPr>
+            <p:ph type="sldNum" sz="quarter" idx="12"/>
+          </p:nvPr>
+        </p:nvSpPr>
+        <p:spPr/>
+        <p:txBody>
+          <a:bodyPr/>
+          <a:lstStyle/>
+          <a:p>
+            <a:fld id="{BA9B540C-44DA-4F69-89C9-7C84606640D3}" type="slidenum">
+              <a:rPr lang="en-US" smtClean="0"/>
+              <a:pPr/>
+              <a:t>31</a:t>
+            </a:fld>
+            <a:endParaRPr lang="en-US"/>
+          </a:p>
+        </p:txBody>
+      </p:sp>
     </p:spTree>
     <p:extLst>
       <p:ext uri="{BB962C8B-B14F-4D97-AF65-F5344CB8AC3E}">
@@ -9113,30 +9295,6 @@
           </a:p>
         </p:txBody>
       </p:sp>
-      <p:sp>
-        <p:nvSpPr>
-          <p:cNvPr id="5" name="Slide Number Placeholder 4"/>
-          <p:cNvSpPr>
-            <a:spLocks noGrp="1"/>
-          </p:cNvSpPr>
-          <p:nvPr>
-            <p:ph type="sldNum" sz="quarter" idx="12"/>
-          </p:nvPr>
-        </p:nvSpPr>
-        <p:spPr/>
-        <p:txBody>
-          <a:bodyPr/>
-          <a:lstStyle/>
-          <a:p>
-            <a:fld id="{BA9B540C-44DA-4F69-89C9-7C84606640D3}" type="slidenum">
-              <a:rPr lang="en-US" smtClean="0"/>
-              <a:pPr/>
-              <a:t>31</a:t>
-            </a:fld>
-            <a:endParaRPr lang="en-US"/>
-          </a:p>
-        </p:txBody>
-      </p:sp>
       <p:pic>
         <p:nvPicPr>
           <p:cNvPr id="2" name="Picture 1" descr="Screen Shot 2016-11-08 at 5.37.30 PM.png"/>
@@ -9166,6 +9324,30 @@
           </a:prstGeom>
         </p:spPr>
       </p:pic>
+      <p:sp>
+        <p:nvSpPr>
+          <p:cNvPr id="6" name="Slide Number Placeholder 5"/>
+          <p:cNvSpPr>
+            <a:spLocks noGrp="1"/>
+          </p:cNvSpPr>
+          <p:nvPr>
+            <p:ph type="sldNum" sz="quarter" idx="12"/>
+          </p:nvPr>
+        </p:nvSpPr>
+        <p:spPr/>
+        <p:txBody>
+          <a:bodyPr/>
+          <a:lstStyle/>
+          <a:p>
+            <a:fld id="{BA9B540C-44DA-4F69-89C9-7C84606640D3}" type="slidenum">
+              <a:rPr lang="en-US" smtClean="0"/>
+              <a:pPr/>
+              <a:t>32</a:t>
+            </a:fld>
+            <a:endParaRPr lang="en-US"/>
+          </a:p>
+        </p:txBody>
+      </p:sp>
     </p:spTree>
     <p:extLst>
       <p:ext uri="{BB962C8B-B14F-4D97-AF65-F5344CB8AC3E}">
@@ -9293,30 +9475,6 @@
           </a:p>
         </p:txBody>
       </p:sp>
-      <p:sp>
-        <p:nvSpPr>
-          <p:cNvPr id="5" name="Slide Number Placeholder 4"/>
-          <p:cNvSpPr>
-            <a:spLocks noGrp="1"/>
-          </p:cNvSpPr>
-          <p:nvPr>
-            <p:ph type="sldNum" sz="quarter" idx="12"/>
-          </p:nvPr>
-        </p:nvSpPr>
-        <p:spPr/>
-        <p:txBody>
-          <a:bodyPr/>
-          <a:lstStyle/>
-          <a:p>
-            <a:fld id="{BA9B540C-44DA-4F69-89C9-7C84606640D3}" type="slidenum">
-              <a:rPr lang="en-US" smtClean="0"/>
-              <a:pPr/>
-              <a:t>32</a:t>
-            </a:fld>
-            <a:endParaRPr lang="en-US"/>
-          </a:p>
-        </p:txBody>
-      </p:sp>
       <p:pic>
         <p:nvPicPr>
           <p:cNvPr id="2" name="Picture 1" descr="Screen Shot 2016-11-08 at 5.37.30 PM.png"/>
@@ -9347,6 +9505,30 @@
           </a:prstGeom>
         </p:spPr>
       </p:pic>
+      <p:sp>
+        <p:nvSpPr>
+          <p:cNvPr id="6" name="Slide Number Placeholder 5"/>
+          <p:cNvSpPr>
+            <a:spLocks noGrp="1"/>
+          </p:cNvSpPr>
+          <p:nvPr>
+            <p:ph type="sldNum" sz="quarter" idx="12"/>
+          </p:nvPr>
+        </p:nvSpPr>
+        <p:spPr/>
+        <p:txBody>
+          <a:bodyPr/>
+          <a:lstStyle/>
+          <a:p>
+            <a:fld id="{BA9B540C-44DA-4F69-89C9-7C84606640D3}" type="slidenum">
+              <a:rPr lang="en-US" smtClean="0"/>
+              <a:pPr/>
+              <a:t>33</a:t>
+            </a:fld>
+            <a:endParaRPr lang="en-US"/>
+          </a:p>
+        </p:txBody>
+      </p:sp>
     </p:spTree>
     <p:extLst>
       <p:ext uri="{BB962C8B-B14F-4D97-AF65-F5344CB8AC3E}">
@@ -9529,7 +9711,7 @@
       </p:sp>
       <p:sp>
         <p:nvSpPr>
-          <p:cNvPr id="5" name="Slide Number Placeholder 4"/>
+          <p:cNvPr id="2" name="Slide Number Placeholder 1"/>
           <p:cNvSpPr>
             <a:spLocks noGrp="1"/>
           </p:cNvSpPr>
@@ -9545,7 +9727,7 @@
             <a:fld id="{BA9B540C-44DA-4F69-89C9-7C84606640D3}" type="slidenum">
               <a:rPr lang="en-US" smtClean="0"/>
               <a:pPr/>
-              <a:t>33</a:t>
+              <a:t>34</a:t>
             </a:fld>
             <a:endParaRPr lang="en-US"/>
           </a:p>
@@ -9803,7 +9985,7 @@
       </p:sp>
       <p:sp>
         <p:nvSpPr>
-          <p:cNvPr id="5" name="Slide Number Placeholder 4"/>
+          <p:cNvPr id="2" name="Slide Number Placeholder 1"/>
           <p:cNvSpPr>
             <a:spLocks noGrp="1"/>
           </p:cNvSpPr>
@@ -9819,7 +10001,7 @@
             <a:fld id="{BA9B540C-44DA-4F69-89C9-7C84606640D3}" type="slidenum">
               <a:rPr lang="en-US" smtClean="0"/>
               <a:pPr/>
-              <a:t>34</a:t>
+              <a:t>35</a:t>
             </a:fld>
             <a:endParaRPr lang="en-US"/>
           </a:p>
@@ -10041,7 +10223,7 @@
       </p:sp>
       <p:sp>
         <p:nvSpPr>
-          <p:cNvPr id="5" name="Slide Number Placeholder 4"/>
+          <p:cNvPr id="2" name="Slide Number Placeholder 1"/>
           <p:cNvSpPr>
             <a:spLocks noGrp="1"/>
           </p:cNvSpPr>
@@ -10057,7 +10239,7 @@
             <a:fld id="{BA9B540C-44DA-4F69-89C9-7C84606640D3}" type="slidenum">
               <a:rPr lang="en-US" smtClean="0"/>
               <a:pPr/>
-              <a:t>35</a:t>
+              <a:t>36</a:t>
             </a:fld>
             <a:endParaRPr lang="en-US"/>
           </a:p>
@@ -10128,30 +10310,6 @@
           </a:p>
         </p:txBody>
       </p:sp>
-      <p:sp>
-        <p:nvSpPr>
-          <p:cNvPr id="5" name="Slide Number Placeholder 4"/>
-          <p:cNvSpPr>
-            <a:spLocks noGrp="1"/>
-          </p:cNvSpPr>
-          <p:nvPr>
-            <p:ph type="sldNum" sz="quarter" idx="12"/>
-          </p:nvPr>
-        </p:nvSpPr>
-        <p:spPr/>
-        <p:txBody>
-          <a:bodyPr/>
-          <a:lstStyle/>
-          <a:p>
-            <a:fld id="{BA9B540C-44DA-4F69-89C9-7C84606640D3}" type="slidenum">
-              <a:rPr lang="en-US" smtClean="0"/>
-              <a:pPr/>
-              <a:t>36</a:t>
-            </a:fld>
-            <a:endParaRPr lang="en-US"/>
-          </a:p>
-        </p:txBody>
-      </p:sp>
       <p:pic>
         <p:nvPicPr>
           <p:cNvPr id="2" name="Picture 1" descr="Screen Shot 2016-11-08 at 6.38.44 PM.png"/>
@@ -10182,6 +10340,30 @@
           </a:prstGeom>
         </p:spPr>
       </p:pic>
+      <p:sp>
+        <p:nvSpPr>
+          <p:cNvPr id="3" name="Slide Number Placeholder 2"/>
+          <p:cNvSpPr>
+            <a:spLocks noGrp="1"/>
+          </p:cNvSpPr>
+          <p:nvPr>
+            <p:ph type="sldNum" sz="quarter" idx="12"/>
+          </p:nvPr>
+        </p:nvSpPr>
+        <p:spPr/>
+        <p:txBody>
+          <a:bodyPr/>
+          <a:lstStyle/>
+          <a:p>
+            <a:fld id="{BA9B540C-44DA-4F69-89C9-7C84606640D3}" type="slidenum">
+              <a:rPr lang="en-US" smtClean="0"/>
+              <a:pPr/>
+              <a:t>37</a:t>
+            </a:fld>
+            <a:endParaRPr lang="en-US"/>
+          </a:p>
+        </p:txBody>
+      </p:sp>
     </p:spTree>
     <p:extLst>
       <p:ext uri="{BB962C8B-B14F-4D97-AF65-F5344CB8AC3E}">
@@ -10244,30 +10426,6 @@
               <a:t>Bibliography</a:t>
             </a:r>
             <a:endParaRPr lang="en-US" dirty="0"/>
-          </a:p>
-        </p:txBody>
-      </p:sp>
-      <p:sp>
-        <p:nvSpPr>
-          <p:cNvPr id="5" name="Slide Number Placeholder 4"/>
-          <p:cNvSpPr>
-            <a:spLocks noGrp="1"/>
-          </p:cNvSpPr>
-          <p:nvPr>
-            <p:ph type="sldNum" sz="quarter" idx="12"/>
-          </p:nvPr>
-        </p:nvSpPr>
-        <p:spPr/>
-        <p:txBody>
-          <a:bodyPr/>
-          <a:lstStyle/>
-          <a:p>
-            <a:fld id="{BA9B540C-44DA-4F69-89C9-7C84606640D3}" type="slidenum">
-              <a:rPr lang="en-US" smtClean="0"/>
-              <a:pPr/>
-              <a:t>37</a:t>
-            </a:fld>
-            <a:endParaRPr lang="en-US"/>
           </a:p>
         </p:txBody>
       </p:sp>
@@ -10587,6 +10745,30 @@
           </a:fontRef>
         </p:style>
       </p:cxnSp>
+      <p:sp>
+        <p:nvSpPr>
+          <p:cNvPr id="18" name="Slide Number Placeholder 17"/>
+          <p:cNvSpPr>
+            <a:spLocks noGrp="1"/>
+          </p:cNvSpPr>
+          <p:nvPr>
+            <p:ph type="sldNum" sz="quarter" idx="12"/>
+          </p:nvPr>
+        </p:nvSpPr>
+        <p:spPr/>
+        <p:txBody>
+          <a:bodyPr/>
+          <a:lstStyle/>
+          <a:p>
+            <a:fld id="{BA9B540C-44DA-4F69-89C9-7C84606640D3}" type="slidenum">
+              <a:rPr lang="en-US" smtClean="0"/>
+              <a:pPr/>
+              <a:t>38</a:t>
+            </a:fld>
+            <a:endParaRPr lang="en-US"/>
+          </a:p>
+        </p:txBody>
+      </p:sp>
     </p:spTree>
     <p:extLst>
       <p:ext uri="{BB962C8B-B14F-4D97-AF65-F5344CB8AC3E}">
@@ -10649,30 +10831,6 @@
               <a:t>Bibliography</a:t>
             </a:r>
             <a:endParaRPr lang="en-US" dirty="0"/>
-          </a:p>
-        </p:txBody>
-      </p:sp>
-      <p:sp>
-        <p:nvSpPr>
-          <p:cNvPr id="5" name="Slide Number Placeholder 4"/>
-          <p:cNvSpPr>
-            <a:spLocks noGrp="1"/>
-          </p:cNvSpPr>
-          <p:nvPr>
-            <p:ph type="sldNum" sz="quarter" idx="12"/>
-          </p:nvPr>
-        </p:nvSpPr>
-        <p:spPr/>
-        <p:txBody>
-          <a:bodyPr/>
-          <a:lstStyle/>
-          <a:p>
-            <a:fld id="{BA9B540C-44DA-4F69-89C9-7C84606640D3}" type="slidenum">
-              <a:rPr lang="en-US" smtClean="0"/>
-              <a:pPr/>
-              <a:t>38</a:t>
-            </a:fld>
-            <a:endParaRPr lang="en-US"/>
           </a:p>
         </p:txBody>
       </p:sp>
@@ -10990,6 +11148,30 @@
           </a:fontRef>
         </p:style>
       </p:cxnSp>
+      <p:sp>
+        <p:nvSpPr>
+          <p:cNvPr id="17" name="Slide Number Placeholder 16"/>
+          <p:cNvSpPr>
+            <a:spLocks noGrp="1"/>
+          </p:cNvSpPr>
+          <p:nvPr>
+            <p:ph type="sldNum" sz="quarter" idx="12"/>
+          </p:nvPr>
+        </p:nvSpPr>
+        <p:spPr/>
+        <p:txBody>
+          <a:bodyPr/>
+          <a:lstStyle/>
+          <a:p>
+            <a:fld id="{BA9B540C-44DA-4F69-89C9-7C84606640D3}" type="slidenum">
+              <a:rPr lang="en-US" smtClean="0"/>
+              <a:pPr/>
+              <a:t>39</a:t>
+            </a:fld>
+            <a:endParaRPr lang="en-US"/>
+          </a:p>
+        </p:txBody>
+      </p:sp>
     </p:spTree>
     <p:extLst>
       <p:ext uri="{BB962C8B-B14F-4D97-AF65-F5344CB8AC3E}">
@@ -11135,7 +11317,7 @@
       </p:sp>
       <p:sp>
         <p:nvSpPr>
-          <p:cNvPr id="6" name="Slide Number Placeholder 5"/>
+          <p:cNvPr id="2" name="Slide Number Placeholder 1"/>
           <p:cNvSpPr>
             <a:spLocks noGrp="1"/>
           </p:cNvSpPr>
@@ -11151,7 +11333,7 @@
             <a:fld id="{BA9B540C-44DA-4F69-89C9-7C84606640D3}" type="slidenum">
               <a:rPr lang="en-US" smtClean="0"/>
               <a:pPr/>
-              <a:t>3</a:t>
+              <a:t>4</a:t>
             </a:fld>
             <a:endParaRPr lang="en-US"/>
           </a:p>
@@ -11222,30 +11404,6 @@
           </a:p>
         </p:txBody>
       </p:sp>
-      <p:sp>
-        <p:nvSpPr>
-          <p:cNvPr id="5" name="Slide Number Placeholder 4"/>
-          <p:cNvSpPr>
-            <a:spLocks noGrp="1"/>
-          </p:cNvSpPr>
-          <p:nvPr>
-            <p:ph type="sldNum" sz="quarter" idx="12"/>
-          </p:nvPr>
-        </p:nvSpPr>
-        <p:spPr/>
-        <p:txBody>
-          <a:bodyPr/>
-          <a:lstStyle/>
-          <a:p>
-            <a:fld id="{BA9B540C-44DA-4F69-89C9-7C84606640D3}" type="slidenum">
-              <a:rPr lang="en-US" smtClean="0"/>
-              <a:pPr/>
-              <a:t>39</a:t>
-            </a:fld>
-            <a:endParaRPr lang="en-US"/>
-          </a:p>
-        </p:txBody>
-      </p:sp>
       <p:pic>
         <p:nvPicPr>
           <p:cNvPr id="2" name="Picture 1" descr="Screen Shot 2016-11-08 at 6.38.44 PM.png"/>
@@ -11457,6 +11615,30 @@
                 <a:srgbClr val="FF0000"/>
               </a:solidFill>
             </a:endParaRPr>
+          </a:p>
+        </p:txBody>
+      </p:sp>
+      <p:sp>
+        <p:nvSpPr>
+          <p:cNvPr id="3" name="Slide Number Placeholder 2"/>
+          <p:cNvSpPr>
+            <a:spLocks noGrp="1"/>
+          </p:cNvSpPr>
+          <p:nvPr>
+            <p:ph type="sldNum" sz="quarter" idx="12"/>
+          </p:nvPr>
+        </p:nvSpPr>
+        <p:spPr/>
+        <p:txBody>
+          <a:bodyPr/>
+          <a:lstStyle/>
+          <a:p>
+            <a:fld id="{BA9B540C-44DA-4F69-89C9-7C84606640D3}" type="slidenum">
+              <a:rPr lang="en-US" smtClean="0"/>
+              <a:pPr/>
+              <a:t>40</a:t>
+            </a:fld>
+            <a:endParaRPr lang="en-US"/>
           </a:p>
         </p:txBody>
       </p:sp>
@@ -11499,29 +11681,6 @@
       </p:grpSpPr>
       <p:sp>
         <p:nvSpPr>
-          <p:cNvPr id="2" name="Title 1"/>
-          <p:cNvSpPr>
-            <a:spLocks noGrp="1"/>
-          </p:cNvSpPr>
-          <p:nvPr>
-            <p:ph type="title"/>
-          </p:nvPr>
-        </p:nvSpPr>
-        <p:spPr/>
-        <p:txBody>
-          <a:bodyPr/>
-          <a:lstStyle/>
-          <a:p>
-            <a:r>
-              <a:rPr lang="en-US" dirty="0" smtClean="0"/>
-              <a:t>References</a:t>
-            </a:r>
-            <a:endParaRPr lang="en-US" dirty="0"/>
-          </a:p>
-        </p:txBody>
-      </p:sp>
-      <p:sp>
-        <p:nvSpPr>
           <p:cNvPr id="3" name="Content Placeholder 2"/>
           <p:cNvSpPr>
             <a:spLocks noGrp="1"/>
@@ -11601,7 +11760,63 @@
       </p:sp>
       <p:sp>
         <p:nvSpPr>
-          <p:cNvPr id="4" name="Slide Number Placeholder 3"/>
+          <p:cNvPr id="6" name="Title 1"/>
+          <p:cNvSpPr txBox="1">
+            <a:spLocks/>
+          </p:cNvSpPr>
+          <p:nvPr/>
+        </p:nvSpPr>
+        <p:spPr>
+          <a:xfrm>
+            <a:off x="457200" y="84676"/>
+            <a:ext cx="8229600" cy="1007533"/>
+          </a:xfrm>
+          <a:prstGeom prst="rect">
+            <a:avLst/>
+          </a:prstGeom>
+        </p:spPr>
+        <p:txBody>
+          <a:bodyPr vert="horz" lIns="91440" tIns="45720" rIns="91440" bIns="45720" rtlCol="0" anchor="b">
+            <a:noAutofit/>
+          </a:bodyPr>
+          <a:lstStyle>
+            <a:lvl1pPr algn="ctr" defTabSz="914400" rtl="0" eaLnBrk="1" latinLnBrk="0" hangingPunct="1">
+              <a:lnSpc>
+                <a:spcPts val="5800"/>
+              </a:lnSpc>
+              <a:spcBef>
+                <a:spcPct val="0"/>
+              </a:spcBef>
+              <a:buNone/>
+              <a:defRPr sz="5400" kern="1200">
+                <a:solidFill>
+                  <a:schemeClr val="tx2"/>
+                </a:solidFill>
+                <a:effectLst>
+                  <a:outerShdw blurRad="63500" dist="38100" dir="5400000" algn="t" rotWithShape="0">
+                    <a:prstClr val="black">
+                      <a:alpha val="25000"/>
+                    </a:prstClr>
+                  </a:outerShdw>
+                </a:effectLst>
+                <a:latin typeface="+mn-lt"/>
+                <a:ea typeface="+mj-ea"/>
+                <a:cs typeface="+mj-cs"/>
+              </a:defRPr>
+            </a:lvl1pPr>
+          </a:lstStyle>
+          <a:p>
+            <a:r>
+              <a:rPr lang="en-US" dirty="0" smtClean="0"/>
+              <a:t>References</a:t>
+            </a:r>
+            <a:endParaRPr lang="en-US" dirty="0"/>
+          </a:p>
+        </p:txBody>
+      </p:sp>
+      <p:sp>
+        <p:nvSpPr>
+          <p:cNvPr id="7" name="Slide Number Placeholder 6"/>
           <p:cNvSpPr>
             <a:spLocks noGrp="1"/>
           </p:cNvSpPr>
@@ -11617,7 +11832,7 @@
             <a:fld id="{BA9B540C-44DA-4F69-89C9-7C84606640D3}" type="slidenum">
               <a:rPr lang="en-US" smtClean="0"/>
               <a:pPr/>
-              <a:t>40</a:t>
+              <a:t>41</a:t>
             </a:fld>
             <a:endParaRPr lang="en-US"/>
           </a:p>
@@ -11633,6 +11848,600 @@
   <p:clrMapOvr>
     <a:masterClrMapping/>
   </p:clrMapOvr>
+  <p:timing>
+    <p:tnLst>
+      <p:par>
+        <p:cTn xmlns:p14="http://schemas.microsoft.com/office/powerpoint/2010/main" id="1" dur="indefinite" restart="never" nodeType="tmRoot"/>
+      </p:par>
+    </p:tnLst>
+  </p:timing>
+</p:sld>
+</file>
+
+<file path=ppt/slides/slide42.xml><?xml version="1.0" encoding="utf-8"?>
+<p:sld xmlns:a="http://schemas.openxmlformats.org/drawingml/2006/main" xmlns:r="http://schemas.openxmlformats.org/officeDocument/2006/relationships" xmlns:p="http://schemas.openxmlformats.org/presentationml/2006/main">
+  <p:cSld>
+    <p:spTree>
+      <p:nvGrpSpPr>
+        <p:cNvPr id="1" name=""/>
+        <p:cNvGrpSpPr/>
+        <p:nvPr/>
+      </p:nvGrpSpPr>
+      <p:grpSpPr>
+        <a:xfrm>
+          <a:off x="0" y="0"/>
+          <a:ext cx="0" cy="0"/>
+          <a:chOff x="0" y="0"/>
+          <a:chExt cx="0" cy="0"/>
+        </a:xfrm>
+      </p:grpSpPr>
+      <p:sp>
+        <p:nvSpPr>
+          <p:cNvPr id="5" name="Title 1"/>
+          <p:cNvSpPr>
+            <a:spLocks noGrp="1"/>
+          </p:cNvSpPr>
+          <p:nvPr>
+            <p:ph type="title"/>
+          </p:nvPr>
+        </p:nvSpPr>
+        <p:spPr>
+          <a:xfrm>
+            <a:off x="457200" y="2743210"/>
+            <a:ext cx="8229600" cy="1007533"/>
+          </a:xfrm>
+        </p:spPr>
+        <p:txBody>
+          <a:bodyPr/>
+          <a:lstStyle/>
+          <a:p>
+            <a:r>
+              <a:rPr lang="en-US" dirty="0" smtClean="0"/>
+              <a:t>Questions?</a:t>
+            </a:r>
+            <a:endParaRPr lang="en-US" dirty="0"/>
+          </a:p>
+        </p:txBody>
+      </p:sp>
+      <p:sp>
+        <p:nvSpPr>
+          <p:cNvPr id="6" name="Slide Number Placeholder 5"/>
+          <p:cNvSpPr>
+            <a:spLocks noGrp="1"/>
+          </p:cNvSpPr>
+          <p:nvPr>
+            <p:ph type="sldNum" sz="quarter" idx="12"/>
+          </p:nvPr>
+        </p:nvSpPr>
+        <p:spPr/>
+        <p:txBody>
+          <a:bodyPr/>
+          <a:lstStyle/>
+          <a:p>
+            <a:fld id="{BA9B540C-44DA-4F69-89C9-7C84606640D3}" type="slidenum">
+              <a:rPr lang="en-US" smtClean="0"/>
+              <a:pPr/>
+              <a:t>42</a:t>
+            </a:fld>
+            <a:endParaRPr lang="en-US"/>
+          </a:p>
+        </p:txBody>
+      </p:sp>
+    </p:spTree>
+    <p:extLst>
+      <p:ext uri="{BB962C8B-B14F-4D97-AF65-F5344CB8AC3E}">
+        <p14:creationId xmlns:p14="http://schemas.microsoft.com/office/powerpoint/2010/main" val="1915842421"/>
+      </p:ext>
+    </p:extLst>
+  </p:cSld>
+  <p:clrMapOvr>
+    <a:masterClrMapping/>
+  </p:clrMapOvr>
+</p:sld>
+</file>
+
+<file path=ppt/slides/slide43.xml><?xml version="1.0" encoding="utf-8"?>
+<p:sld xmlns:a="http://schemas.openxmlformats.org/drawingml/2006/main" xmlns:r="http://schemas.openxmlformats.org/officeDocument/2006/relationships" xmlns:p="http://schemas.openxmlformats.org/presentationml/2006/main">
+  <p:cSld>
+    <p:spTree>
+      <p:nvGrpSpPr>
+        <p:cNvPr id="1" name=""/>
+        <p:cNvGrpSpPr/>
+        <p:nvPr/>
+      </p:nvGrpSpPr>
+      <p:grpSpPr>
+        <a:xfrm>
+          <a:off x="0" y="0"/>
+          <a:ext cx="0" cy="0"/>
+          <a:chOff x="0" y="0"/>
+          <a:chExt cx="0" cy="0"/>
+        </a:xfrm>
+      </p:grpSpPr>
+      <p:sp>
+        <p:nvSpPr>
+          <p:cNvPr id="5" name="Title 1"/>
+          <p:cNvSpPr>
+            <a:spLocks noGrp="1"/>
+          </p:cNvSpPr>
+          <p:nvPr>
+            <p:ph type="title"/>
+          </p:nvPr>
+        </p:nvSpPr>
+        <p:spPr>
+          <a:xfrm>
+            <a:off x="457200" y="2912543"/>
+            <a:ext cx="8229600" cy="1007533"/>
+          </a:xfrm>
+        </p:spPr>
+        <p:txBody>
+          <a:bodyPr/>
+          <a:lstStyle/>
+          <a:p>
+            <a:r>
+              <a:rPr lang="en-US" dirty="0" smtClean="0"/>
+              <a:t>Extra Slides</a:t>
+            </a:r>
+            <a:endParaRPr lang="en-US" dirty="0"/>
+          </a:p>
+        </p:txBody>
+      </p:sp>
+      <p:sp>
+        <p:nvSpPr>
+          <p:cNvPr id="6" name="Slide Number Placeholder 5"/>
+          <p:cNvSpPr>
+            <a:spLocks noGrp="1"/>
+          </p:cNvSpPr>
+          <p:nvPr>
+            <p:ph type="sldNum" sz="quarter" idx="12"/>
+          </p:nvPr>
+        </p:nvSpPr>
+        <p:spPr/>
+        <p:txBody>
+          <a:bodyPr/>
+          <a:lstStyle/>
+          <a:p>
+            <a:fld id="{BA9B540C-44DA-4F69-89C9-7C84606640D3}" type="slidenum">
+              <a:rPr lang="en-US" smtClean="0"/>
+              <a:pPr/>
+              <a:t>43</a:t>
+            </a:fld>
+            <a:endParaRPr lang="en-US"/>
+          </a:p>
+        </p:txBody>
+      </p:sp>
+    </p:spTree>
+    <p:extLst>
+      <p:ext uri="{BB962C8B-B14F-4D97-AF65-F5344CB8AC3E}">
+        <p14:creationId xmlns:p14="http://schemas.microsoft.com/office/powerpoint/2010/main" val="1381885623"/>
+      </p:ext>
+    </p:extLst>
+  </p:cSld>
+  <p:clrMapOvr>
+    <a:masterClrMapping/>
+  </p:clrMapOvr>
+</p:sld>
+</file>
+
+<file path=ppt/slides/slide44.xml><?xml version="1.0" encoding="utf-8"?>
+<p:sld xmlns:a="http://schemas.openxmlformats.org/drawingml/2006/main" xmlns:r="http://schemas.openxmlformats.org/officeDocument/2006/relationships" xmlns:p="http://schemas.openxmlformats.org/presentationml/2006/main">
+  <p:cSld>
+    <p:spTree>
+      <p:nvGrpSpPr>
+        <p:cNvPr id="1" name=""/>
+        <p:cNvGrpSpPr/>
+        <p:nvPr/>
+      </p:nvGrpSpPr>
+      <p:grpSpPr>
+        <a:xfrm>
+          <a:off x="0" y="0"/>
+          <a:ext cx="0" cy="0"/>
+          <a:chOff x="0" y="0"/>
+          <a:chExt cx="0" cy="0"/>
+        </a:xfrm>
+      </p:grpSpPr>
+      <p:sp>
+        <p:nvSpPr>
+          <p:cNvPr id="3" name="Content Placeholder 2"/>
+          <p:cNvSpPr>
+            <a:spLocks noGrp="1"/>
+          </p:cNvSpPr>
+          <p:nvPr>
+            <p:ph idx="1"/>
+          </p:nvPr>
+        </p:nvSpPr>
+        <p:spPr>
+          <a:xfrm>
+            <a:off x="457200" y="1092209"/>
+            <a:ext cx="8229600" cy="5376323"/>
+          </a:xfrm>
+        </p:spPr>
+        <p:txBody>
+          <a:bodyPr>
+            <a:normAutofit fontScale="77500" lnSpcReduction="20000"/>
+          </a:bodyPr>
+          <a:lstStyle/>
+          <a:p>
+            <a:pPr marL="0" indent="0">
+              <a:buNone/>
+            </a:pPr>
+            <a:r>
+              <a:rPr lang="en-US" dirty="0"/>
+              <a:t>\begin{table}[h!]</a:t>
+            </a:r>
+          </a:p>
+          <a:p>
+            <a:pPr marL="0" indent="0">
+              <a:buNone/>
+            </a:pPr>
+            <a:r>
+              <a:rPr lang="en-US" dirty="0"/>
+              <a:t>\caption{Title} % title of Table</a:t>
+            </a:r>
+          </a:p>
+          <a:p>
+            <a:pPr marL="0" indent="0">
+              <a:buNone/>
+            </a:pPr>
+            <a:r>
+              <a:rPr lang="en-US" dirty="0"/>
+              <a:t>\</a:t>
+            </a:r>
+            <a:r>
+              <a:rPr lang="en-US" dirty="0" smtClean="0"/>
+              <a:t>centering       </a:t>
+            </a:r>
+            <a:r>
+              <a:rPr lang="en-US" dirty="0"/>
+              <a:t>% used for centering table</a:t>
+            </a:r>
+          </a:p>
+          <a:p>
+            <a:pPr marL="0" indent="0">
+              <a:buNone/>
+            </a:pPr>
+            <a:r>
+              <a:rPr lang="en-US" dirty="0"/>
+              <a:t>\begin{tabular}{| c | c | c | c | } % centered columns (4 columns)</a:t>
+            </a:r>
+          </a:p>
+          <a:p>
+            <a:pPr marL="0" indent="0">
+              <a:buNone/>
+            </a:pPr>
+            <a:r>
+              <a:rPr lang="en-US" dirty="0"/>
+              <a:t>\</a:t>
+            </a:r>
+            <a:r>
+              <a:rPr lang="en-US" dirty="0" err="1"/>
+              <a:t>hline</a:t>
+            </a:r>
+            <a:r>
+              <a:rPr lang="en-US" dirty="0"/>
+              <a:t> %inserts double horizontal lines</a:t>
+            </a:r>
+          </a:p>
+          <a:p>
+            <a:pPr marL="0" indent="0">
+              <a:buNone/>
+            </a:pPr>
+            <a:r>
+              <a:rPr lang="en-US" dirty="0"/>
+              <a:t> &amp;  Column 1 &amp;  Column 2 &amp; Column 3  \\ [0.5ex] % inserts table</a:t>
+            </a:r>
+          </a:p>
+          <a:p>
+            <a:pPr marL="0" indent="0">
+              <a:buNone/>
+            </a:pPr>
+            <a:endParaRPr lang="en-US" dirty="0"/>
+          </a:p>
+          <a:p>
+            <a:pPr marL="0" indent="0">
+              <a:buNone/>
+            </a:pPr>
+            <a:r>
+              <a:rPr lang="en-US" dirty="0"/>
+              <a:t>%heading</a:t>
+            </a:r>
+          </a:p>
+          <a:p>
+            <a:pPr marL="0" indent="0">
+              <a:buNone/>
+            </a:pPr>
+            <a:r>
+              <a:rPr lang="en-US" dirty="0"/>
+              <a:t>\</a:t>
+            </a:r>
+            <a:r>
+              <a:rPr lang="en-US" dirty="0" err="1"/>
+              <a:t>hline</a:t>
+            </a:r>
+            <a:r>
+              <a:rPr lang="en-US" dirty="0"/>
+              <a:t> % inserts single horizontal line</a:t>
+            </a:r>
+          </a:p>
+          <a:p>
+            <a:pPr marL="0" indent="0">
+              <a:buNone/>
+            </a:pPr>
+            <a:r>
+              <a:rPr lang="en-US" dirty="0"/>
+              <a:t>                   </a:t>
+            </a:r>
+          </a:p>
+          <a:p>
+            <a:pPr marL="0" indent="0">
+              <a:buNone/>
+            </a:pPr>
+            <a:r>
+              <a:rPr lang="en-US" dirty="0"/>
+              <a:t>Row 1 &amp; 1 &amp;  2  &amp;  3   \\ \</a:t>
+            </a:r>
+            <a:r>
+              <a:rPr lang="en-US" dirty="0" err="1"/>
+              <a:t>hline</a:t>
+            </a:r>
+            <a:endParaRPr lang="en-US" dirty="0"/>
+          </a:p>
+          <a:p>
+            <a:pPr marL="0" indent="0">
+              <a:buNone/>
+            </a:pPr>
+            <a:r>
+              <a:rPr lang="en-US" dirty="0"/>
+              <a:t>Row 2 &amp; 4 &amp;  5  &amp;  6   \\ \</a:t>
+            </a:r>
+            <a:r>
+              <a:rPr lang="en-US" dirty="0" err="1"/>
+              <a:t>hline</a:t>
+            </a:r>
+            <a:endParaRPr lang="en-US" dirty="0"/>
+          </a:p>
+          <a:p>
+            <a:pPr marL="0" indent="0">
+              <a:buNone/>
+            </a:pPr>
+            <a:r>
+              <a:rPr lang="en-US" dirty="0"/>
+              <a:t>Ro2 3 &amp; 7 &amp;  8  &amp;   9  \\%[1ex] %adds vertical space</a:t>
+            </a:r>
+          </a:p>
+          <a:p>
+            <a:pPr marL="0" indent="0">
+              <a:buNone/>
+            </a:pPr>
+            <a:r>
+              <a:rPr lang="en-US" dirty="0"/>
+              <a:t>\</a:t>
+            </a:r>
+            <a:r>
+              <a:rPr lang="en-US" dirty="0" err="1"/>
+              <a:t>hline</a:t>
+            </a:r>
+            <a:r>
+              <a:rPr lang="en-US" dirty="0"/>
+              <a:t> %inserts single line</a:t>
+            </a:r>
+          </a:p>
+          <a:p>
+            <a:pPr marL="0" indent="0">
+              <a:buNone/>
+            </a:pPr>
+            <a:r>
+              <a:rPr lang="en-US" dirty="0"/>
+              <a:t>\end{tabular}</a:t>
+            </a:r>
+          </a:p>
+          <a:p>
+            <a:pPr marL="0" indent="0">
+              <a:buNone/>
+            </a:pPr>
+            <a:r>
+              <a:rPr lang="en-US" dirty="0"/>
+              <a:t>\label{table:table1} % is used to refer this table in the text</a:t>
+            </a:r>
+          </a:p>
+          <a:p>
+            <a:pPr marL="0" indent="0">
+              <a:buNone/>
+            </a:pPr>
+            <a:r>
+              <a:rPr lang="en-US" dirty="0"/>
+              <a:t>\end{table}</a:t>
+            </a:r>
+          </a:p>
+        </p:txBody>
+      </p:sp>
+      <p:sp>
+        <p:nvSpPr>
+          <p:cNvPr id="4" name="Title 1"/>
+          <p:cNvSpPr>
+            <a:spLocks noGrp="1"/>
+          </p:cNvSpPr>
+          <p:nvPr>
+            <p:ph type="title"/>
+          </p:nvPr>
+        </p:nvSpPr>
+        <p:spPr>
+          <a:xfrm>
+            <a:off x="457200" y="84676"/>
+            <a:ext cx="8229600" cy="1007533"/>
+          </a:xfrm>
+        </p:spPr>
+        <p:txBody>
+          <a:bodyPr/>
+          <a:lstStyle/>
+          <a:p>
+            <a:r>
+              <a:rPr lang="en-US" dirty="0" smtClean="0"/>
+              <a:t>Tables</a:t>
+            </a:r>
+            <a:endParaRPr lang="en-US" dirty="0"/>
+          </a:p>
+        </p:txBody>
+      </p:sp>
+      <p:sp>
+        <p:nvSpPr>
+          <p:cNvPr id="2" name="Slide Number Placeholder 1"/>
+          <p:cNvSpPr>
+            <a:spLocks noGrp="1"/>
+          </p:cNvSpPr>
+          <p:nvPr>
+            <p:ph type="sldNum" sz="quarter" idx="12"/>
+          </p:nvPr>
+        </p:nvSpPr>
+        <p:spPr/>
+        <p:txBody>
+          <a:bodyPr/>
+          <a:lstStyle/>
+          <a:p>
+            <a:fld id="{BA9B540C-44DA-4F69-89C9-7C84606640D3}" type="slidenum">
+              <a:rPr lang="en-US" smtClean="0"/>
+              <a:pPr/>
+              <a:t>44</a:t>
+            </a:fld>
+            <a:endParaRPr lang="en-US"/>
+          </a:p>
+        </p:txBody>
+      </p:sp>
+    </p:spTree>
+    <p:extLst>
+      <p:ext uri="{BB962C8B-B14F-4D97-AF65-F5344CB8AC3E}">
+        <p14:creationId xmlns:p14="http://schemas.microsoft.com/office/powerpoint/2010/main" val="2862636576"/>
+      </p:ext>
+    </p:extLst>
+  </p:cSld>
+  <p:clrMapOvr>
+    <a:masterClrMapping/>
+  </p:clrMapOvr>
+  <p:timing>
+    <p:tnLst>
+      <p:par>
+        <p:cTn xmlns:p14="http://schemas.microsoft.com/office/powerpoint/2010/main" id="1" dur="indefinite" restart="never" nodeType="tmRoot"/>
+      </p:par>
+    </p:tnLst>
+  </p:timing>
+</p:sld>
+</file>
+
+<file path=ppt/slides/slide45.xml><?xml version="1.0" encoding="utf-8"?>
+<p:sld xmlns:a="http://schemas.openxmlformats.org/drawingml/2006/main" xmlns:r="http://schemas.openxmlformats.org/officeDocument/2006/relationships" xmlns:p="http://schemas.openxmlformats.org/presentationml/2006/main">
+  <p:cSld>
+    <p:spTree>
+      <p:nvGrpSpPr>
+        <p:cNvPr id="1" name=""/>
+        <p:cNvGrpSpPr/>
+        <p:nvPr/>
+      </p:nvGrpSpPr>
+      <p:grpSpPr>
+        <a:xfrm>
+          <a:off x="0" y="0"/>
+          <a:ext cx="0" cy="0"/>
+          <a:chOff x="0" y="0"/>
+          <a:chExt cx="0" cy="0"/>
+        </a:xfrm>
+      </p:grpSpPr>
+      <p:sp>
+        <p:nvSpPr>
+          <p:cNvPr id="4" name="Title 1"/>
+          <p:cNvSpPr>
+            <a:spLocks noGrp="1"/>
+          </p:cNvSpPr>
+          <p:nvPr>
+            <p:ph type="title"/>
+          </p:nvPr>
+        </p:nvSpPr>
+        <p:spPr>
+          <a:xfrm>
+            <a:off x="457200" y="84676"/>
+            <a:ext cx="8229600" cy="1007533"/>
+          </a:xfrm>
+        </p:spPr>
+        <p:txBody>
+          <a:bodyPr/>
+          <a:lstStyle/>
+          <a:p>
+            <a:r>
+              <a:rPr lang="en-US" dirty="0" smtClean="0"/>
+              <a:t>Tables</a:t>
+            </a:r>
+            <a:endParaRPr lang="en-US" dirty="0"/>
+          </a:p>
+        </p:txBody>
+      </p:sp>
+      <p:pic>
+        <p:nvPicPr>
+          <p:cNvPr id="5" name="Picture 4" descr="Screen Shot 2016-11-06 at 12.48.57 AM.png"/>
+          <p:cNvPicPr>
+            <a:picLocks noChangeAspect="1"/>
+          </p:cNvPicPr>
+          <p:nvPr/>
+        </p:nvPicPr>
+        <p:blipFill>
+          <a:blip r:embed="rId3">
+            <a:extLst>
+              <a:ext uri="{28A0092B-C50C-407E-A947-70E740481C1C}">
+                <a14:useLocalDpi xmlns:a14="http://schemas.microsoft.com/office/drawing/2010/main" val="0"/>
+              </a:ext>
+            </a:extLst>
+          </a:blip>
+          <a:stretch>
+            <a:fillRect/>
+          </a:stretch>
+        </p:blipFill>
+        <p:spPr>
+          <a:xfrm>
+            <a:off x="237071" y="1828080"/>
+            <a:ext cx="8686800" cy="3364523"/>
+          </a:xfrm>
+          <a:prstGeom prst="rect">
+            <a:avLst/>
+          </a:prstGeom>
+        </p:spPr>
+      </p:pic>
+      <p:sp>
+        <p:nvSpPr>
+          <p:cNvPr id="2" name="Slide Number Placeholder 1"/>
+          <p:cNvSpPr>
+            <a:spLocks noGrp="1"/>
+          </p:cNvSpPr>
+          <p:nvPr>
+            <p:ph type="sldNum" sz="quarter" idx="12"/>
+          </p:nvPr>
+        </p:nvSpPr>
+        <p:spPr/>
+        <p:txBody>
+          <a:bodyPr/>
+          <a:lstStyle/>
+          <a:p>
+            <a:fld id="{BA9B540C-44DA-4F69-89C9-7C84606640D3}" type="slidenum">
+              <a:rPr lang="en-US" smtClean="0"/>
+              <a:pPr/>
+              <a:t>45</a:t>
+            </a:fld>
+            <a:endParaRPr lang="en-US"/>
+          </a:p>
+        </p:txBody>
+      </p:sp>
+    </p:spTree>
+    <p:extLst>
+      <p:ext uri="{BB962C8B-B14F-4D97-AF65-F5344CB8AC3E}">
+        <p14:creationId xmlns:p14="http://schemas.microsoft.com/office/powerpoint/2010/main" val="994163287"/>
+      </p:ext>
+    </p:extLst>
+  </p:cSld>
+  <p:clrMapOvr>
+    <a:masterClrMapping/>
+  </p:clrMapOvr>
+  <p:timing>
+    <p:tnLst>
+      <p:par>
+        <p:cTn xmlns:p14="http://schemas.microsoft.com/office/powerpoint/2010/main" id="1" dur="indefinite" restart="never" nodeType="tmRoot"/>
+      </p:par>
+    </p:tnLst>
+  </p:timing>
 </p:sld>
 </file>
 
@@ -11707,30 +12516,6 @@
       </p:sp>
       <p:sp>
         <p:nvSpPr>
-          <p:cNvPr id="4" name="Slide Number Placeholder 3"/>
-          <p:cNvSpPr>
-            <a:spLocks noGrp="1"/>
-          </p:cNvSpPr>
-          <p:nvPr>
-            <p:ph type="sldNum" sz="quarter" idx="12"/>
-          </p:nvPr>
-        </p:nvSpPr>
-        <p:spPr/>
-        <p:txBody>
-          <a:bodyPr/>
-          <a:lstStyle/>
-          <a:p>
-            <a:fld id="{BA9B540C-44DA-4F69-89C9-7C84606640D3}" type="slidenum">
-              <a:rPr lang="en-US" smtClean="0"/>
-              <a:pPr/>
-              <a:t>4</a:t>
-            </a:fld>
-            <a:endParaRPr lang="en-US"/>
-          </a:p>
-        </p:txBody>
-      </p:sp>
-      <p:sp>
-        <p:nvSpPr>
           <p:cNvPr id="5" name="Title 1"/>
           <p:cNvSpPr txBox="1">
             <a:spLocks/>
@@ -11782,6 +12567,30 @@
               <a:t>Structure</a:t>
             </a:r>
             <a:endParaRPr lang="en-US" dirty="0"/>
+          </a:p>
+        </p:txBody>
+      </p:sp>
+      <p:sp>
+        <p:nvSpPr>
+          <p:cNvPr id="6" name="Slide Number Placeholder 5"/>
+          <p:cNvSpPr>
+            <a:spLocks noGrp="1"/>
+          </p:cNvSpPr>
+          <p:nvPr>
+            <p:ph type="sldNum" sz="quarter" idx="12"/>
+          </p:nvPr>
+        </p:nvSpPr>
+        <p:spPr/>
+        <p:txBody>
+          <a:bodyPr/>
+          <a:lstStyle/>
+          <a:p>
+            <a:fld id="{BA9B540C-44DA-4F69-89C9-7C84606640D3}" type="slidenum">
+              <a:rPr lang="en-US" smtClean="0"/>
+              <a:pPr/>
+              <a:t>5</a:t>
+            </a:fld>
+            <a:endParaRPr lang="en-US"/>
           </a:p>
         </p:txBody>
       </p:sp>
@@ -11993,7 +12802,7 @@
       </p:sp>
       <p:sp>
         <p:nvSpPr>
-          <p:cNvPr id="6" name="Slide Number Placeholder 5"/>
+          <p:cNvPr id="2" name="Slide Number Placeholder 1"/>
           <p:cNvSpPr>
             <a:spLocks noGrp="1"/>
           </p:cNvSpPr>
@@ -12009,7 +12818,7 @@
             <a:fld id="{BA9B540C-44DA-4F69-89C9-7C84606640D3}" type="slidenum">
               <a:rPr lang="en-US" smtClean="0"/>
               <a:pPr/>
-              <a:t>5</a:t>
+              <a:t>6</a:t>
             </a:fld>
             <a:endParaRPr lang="en-US"/>
           </a:p>
@@ -12230,7 +13039,7 @@
       </p:sp>
       <p:sp>
         <p:nvSpPr>
-          <p:cNvPr id="6" name="Slide Number Placeholder 5"/>
+          <p:cNvPr id="4" name="Slide Number Placeholder 3"/>
           <p:cNvSpPr>
             <a:spLocks noGrp="1"/>
           </p:cNvSpPr>
@@ -12246,7 +13055,7 @@
             <a:fld id="{BA9B540C-44DA-4F69-89C9-7C84606640D3}" type="slidenum">
               <a:rPr lang="en-US" smtClean="0"/>
               <a:pPr/>
-              <a:t>6</a:t>
+              <a:t>7</a:t>
             </a:fld>
             <a:endParaRPr lang="en-US"/>
           </a:p>
@@ -12467,30 +13276,6 @@
       </p:sp>
       <p:sp>
         <p:nvSpPr>
-          <p:cNvPr id="6" name="Slide Number Placeholder 5"/>
-          <p:cNvSpPr>
-            <a:spLocks noGrp="1"/>
-          </p:cNvSpPr>
-          <p:nvPr>
-            <p:ph type="sldNum" sz="quarter" idx="12"/>
-          </p:nvPr>
-        </p:nvSpPr>
-        <p:spPr/>
-        <p:txBody>
-          <a:bodyPr/>
-          <a:lstStyle/>
-          <a:p>
-            <a:fld id="{BA9B540C-44DA-4F69-89C9-7C84606640D3}" type="slidenum">
-              <a:rPr lang="en-US" smtClean="0"/>
-              <a:pPr/>
-              <a:t>7</a:t>
-            </a:fld>
-            <a:endParaRPr lang="en-US"/>
-          </a:p>
-        </p:txBody>
-      </p:sp>
-      <p:sp>
-        <p:nvSpPr>
           <p:cNvPr id="7" name="Rectangle 6"/>
           <p:cNvSpPr/>
           <p:nvPr/>
@@ -12569,6 +13354,30 @@
                 <a:srgbClr val="C70016"/>
               </a:solidFill>
             </a:endParaRPr>
+          </a:p>
+        </p:txBody>
+      </p:sp>
+      <p:sp>
+        <p:nvSpPr>
+          <p:cNvPr id="4" name="Slide Number Placeholder 3"/>
+          <p:cNvSpPr>
+            <a:spLocks noGrp="1"/>
+          </p:cNvSpPr>
+          <p:nvPr>
+            <p:ph type="sldNum" sz="quarter" idx="12"/>
+          </p:nvPr>
+        </p:nvSpPr>
+        <p:spPr/>
+        <p:txBody>
+          <a:bodyPr/>
+          <a:lstStyle/>
+          <a:p>
+            <a:fld id="{BA9B540C-44DA-4F69-89C9-7C84606640D3}" type="slidenum">
+              <a:rPr lang="en-US" smtClean="0"/>
+              <a:pPr/>
+              <a:t>8</a:t>
+            </a:fld>
+            <a:endParaRPr lang="en-US"/>
           </a:p>
         </p:txBody>
       </p:sp>
@@ -12787,30 +13596,6 @@
       </p:sp>
       <p:sp>
         <p:nvSpPr>
-          <p:cNvPr id="6" name="Slide Number Placeholder 5"/>
-          <p:cNvSpPr>
-            <a:spLocks noGrp="1"/>
-          </p:cNvSpPr>
-          <p:nvPr>
-            <p:ph type="sldNum" sz="quarter" idx="12"/>
-          </p:nvPr>
-        </p:nvSpPr>
-        <p:spPr/>
-        <p:txBody>
-          <a:bodyPr/>
-          <a:lstStyle/>
-          <a:p>
-            <a:fld id="{BA9B540C-44DA-4F69-89C9-7C84606640D3}" type="slidenum">
-              <a:rPr lang="en-US" smtClean="0"/>
-              <a:pPr/>
-              <a:t>8</a:t>
-            </a:fld>
-            <a:endParaRPr lang="en-US"/>
-          </a:p>
-        </p:txBody>
-      </p:sp>
-      <p:sp>
-        <p:nvSpPr>
           <p:cNvPr id="7" name="Rectangle 6"/>
           <p:cNvSpPr/>
           <p:nvPr/>
@@ -12889,6 +13674,30 @@
                 <a:srgbClr val="C70016"/>
               </a:solidFill>
             </a:endParaRPr>
+          </a:p>
+        </p:txBody>
+      </p:sp>
+      <p:sp>
+        <p:nvSpPr>
+          <p:cNvPr id="4" name="Slide Number Placeholder 3"/>
+          <p:cNvSpPr>
+            <a:spLocks noGrp="1"/>
+          </p:cNvSpPr>
+          <p:nvPr>
+            <p:ph type="sldNum" sz="quarter" idx="12"/>
+          </p:nvPr>
+        </p:nvSpPr>
+        <p:spPr/>
+        <p:txBody>
+          <a:bodyPr/>
+          <a:lstStyle/>
+          <a:p>
+            <a:fld id="{BA9B540C-44DA-4F69-89C9-7C84606640D3}" type="slidenum">
+              <a:rPr lang="en-US" smtClean="0"/>
+              <a:pPr/>
+              <a:t>9</a:t>
+            </a:fld>
+            <a:endParaRPr lang="en-US"/>
           </a:p>
         </p:txBody>
       </p:sp>

</xml_diff>